<commit_message>
Chore: Revue exo 4 plus
</commit_message>
<xml_diff>
--- a/source/Chapitre 10 - Les tuples.pptx
+++ b/source/Chapitre 10 - Les tuples.pptx
@@ -5,7 +5,7 @@
     <p:sldMasterId id="2147483804" r:id="rId1"/>
   </p:sldMasterIdLst>
   <p:notesMasterIdLst>
-    <p:notesMasterId r:id="rId19"/>
+    <p:notesMasterId r:id="rId23"/>
   </p:notesMasterIdLst>
   <p:sldIdLst>
     <p:sldId id="257" r:id="rId2"/>
@@ -22,9 +22,13 @@
     <p:sldId id="303" r:id="rId13"/>
     <p:sldId id="301" r:id="rId14"/>
     <p:sldId id="304" r:id="rId15"/>
-    <p:sldId id="306" r:id="rId16"/>
-    <p:sldId id="293" r:id="rId17"/>
-    <p:sldId id="284" r:id="rId18"/>
+    <p:sldId id="307" r:id="rId16"/>
+    <p:sldId id="308" r:id="rId17"/>
+    <p:sldId id="306" r:id="rId18"/>
+    <p:sldId id="293" r:id="rId19"/>
+    <p:sldId id="309" r:id="rId20"/>
+    <p:sldId id="310" r:id="rId21"/>
+    <p:sldId id="284" r:id="rId22"/>
   </p:sldIdLst>
   <p:sldSz cx="12192000" cy="6858000"/>
   <p:notesSz cx="6858000" cy="9144000"/>
@@ -134,7 +138,7 @@
 <file path=ppt/revisionInfo.xml><?xml version="1.0" encoding="utf-8"?>
 <p1510:revInfo xmlns:a="http://schemas.openxmlformats.org/drawingml/2006/main" xmlns:r="http://schemas.openxmlformats.org/officeDocument/2006/relationships" xmlns:p1510="http://schemas.microsoft.com/office/powerpoint/2015/10/main">
   <p1510:revLst>
-    <p1510:client id="{20AE7FCD-B62D-499A-891E-30FD03C16E0C}" v="12" dt="2024-03-17T13:19:37.238"/>
+    <p1510:client id="{20AE7FCD-B62D-499A-891E-30FD03C16E0C}" v="17" dt="2024-03-22T14:13:03.807"/>
   </p1510:revLst>
 </p1510:revInfo>
 </file>
@@ -144,7 +148,7 @@
   <pc:docChgLst>
     <pc:chgData name="Ismaël Tuo" userId="fca7baf0e513a1e6" providerId="LiveId" clId="{20AE7FCD-B62D-499A-891E-30FD03C16E0C}"/>
     <pc:docChg chg="custSel addSld delSld modSld sldOrd">
-      <pc:chgData name="Ismaël Tuo" userId="fca7baf0e513a1e6" providerId="LiveId" clId="{20AE7FCD-B62D-499A-891E-30FD03C16E0C}" dt="2024-03-17T13:32:28.322" v="593" actId="20577"/>
+      <pc:chgData name="Ismaël Tuo" userId="fca7baf0e513a1e6" providerId="LiveId" clId="{20AE7FCD-B62D-499A-891E-30FD03C16E0C}" dt="2024-03-22T14:17:01.220" v="1060" actId="20577"/>
       <pc:docMkLst>
         <pc:docMk/>
       </pc:docMkLst>
@@ -193,8 +197,8 @@
           </ac:spMkLst>
         </pc:spChg>
       </pc:sldChg>
-      <pc:sldChg chg="modSp mod">
-        <pc:chgData name="Ismaël Tuo" userId="fca7baf0e513a1e6" providerId="LiveId" clId="{20AE7FCD-B62D-499A-891E-30FD03C16E0C}" dt="2024-03-17T13:30:07.259" v="585" actId="20577"/>
+      <pc:sldChg chg="addSp modSp mod">
+        <pc:chgData name="Ismaël Tuo" userId="fca7baf0e513a1e6" providerId="LiveId" clId="{20AE7FCD-B62D-499A-891E-30FD03C16E0C}" dt="2024-03-22T14:17:01.220" v="1060" actId="20577"/>
         <pc:sldMkLst>
           <pc:docMk/>
           <pc:sldMk cId="1332028687" sldId="293"/>
@@ -213,6 +217,22 @@
             <pc:docMk/>
             <pc:sldMk cId="1332028687" sldId="293"/>
             <ac:spMk id="7" creationId="{990321CC-02EF-ED64-0AA9-789ED60F60B1}"/>
+          </ac:spMkLst>
+        </pc:spChg>
+        <pc:spChg chg="add mod">
+          <ac:chgData name="Ismaël Tuo" userId="fca7baf0e513a1e6" providerId="LiveId" clId="{20AE7FCD-B62D-499A-891E-30FD03C16E0C}" dt="2024-03-22T14:13:01.594" v="696" actId="1076"/>
+          <ac:spMkLst>
+            <pc:docMk/>
+            <pc:sldMk cId="1332028687" sldId="293"/>
+            <ac:spMk id="8" creationId="{4708017B-B18C-FDEC-C8DB-6E471AF09806}"/>
+          </ac:spMkLst>
+        </pc:spChg>
+        <pc:spChg chg="add mod">
+          <ac:chgData name="Ismaël Tuo" userId="fca7baf0e513a1e6" providerId="LiveId" clId="{20AE7FCD-B62D-499A-891E-30FD03C16E0C}" dt="2024-03-22T14:17:01.220" v="1060" actId="20577"/>
+          <ac:spMkLst>
+            <pc:docMk/>
+            <pc:sldMk cId="1332028687" sldId="293"/>
+            <ac:spMk id="9" creationId="{0B027DD6-C7AB-F422-3CB7-279D83C3276B}"/>
           </ac:spMkLst>
         </pc:spChg>
       </pc:sldChg>
@@ -444,6 +464,178 @@
           </ac:spMkLst>
         </pc:spChg>
       </pc:sldChg>
+      <pc:sldChg chg="modSp add mod">
+        <pc:chgData name="Ismaël Tuo" userId="fca7baf0e513a1e6" providerId="LiveId" clId="{20AE7FCD-B62D-499A-891E-30FD03C16E0C}" dt="2024-03-22T13:27:16.410" v="627" actId="313"/>
+        <pc:sldMkLst>
+          <pc:docMk/>
+          <pc:sldMk cId="513514576" sldId="307"/>
+        </pc:sldMkLst>
+        <pc:spChg chg="mod">
+          <ac:chgData name="Ismaël Tuo" userId="fca7baf0e513a1e6" providerId="LiveId" clId="{20AE7FCD-B62D-499A-891E-30FD03C16E0C}" dt="2024-03-22T13:27:16.410" v="627" actId="313"/>
+          <ac:spMkLst>
+            <pc:docMk/>
+            <pc:sldMk cId="513514576" sldId="307"/>
+            <ac:spMk id="6" creationId="{84F10693-2FE8-EFC8-8DB6-84BFD181D260}"/>
+          </ac:spMkLst>
+        </pc:spChg>
+        <pc:spChg chg="mod">
+          <ac:chgData name="Ismaël Tuo" userId="fca7baf0e513a1e6" providerId="LiveId" clId="{20AE7FCD-B62D-499A-891E-30FD03C16E0C}" dt="2024-03-22T13:27:13.406" v="626"/>
+          <ac:spMkLst>
+            <pc:docMk/>
+            <pc:sldMk cId="513514576" sldId="307"/>
+            <ac:spMk id="7" creationId="{B31AF22B-77AC-398F-8B32-17C6B4914236}"/>
+          </ac:spMkLst>
+        </pc:spChg>
+      </pc:sldChg>
+      <pc:sldChg chg="modSp add mod">
+        <pc:chgData name="Ismaël Tuo" userId="fca7baf0e513a1e6" providerId="LiveId" clId="{20AE7FCD-B62D-499A-891E-30FD03C16E0C}" dt="2024-03-22T13:27:26.572" v="639" actId="20577"/>
+        <pc:sldMkLst>
+          <pc:docMk/>
+          <pc:sldMk cId="426974449" sldId="308"/>
+        </pc:sldMkLst>
+        <pc:spChg chg="mod">
+          <ac:chgData name="Ismaël Tuo" userId="fca7baf0e513a1e6" providerId="LiveId" clId="{20AE7FCD-B62D-499A-891E-30FD03C16E0C}" dt="2024-03-22T13:27:26.572" v="639" actId="20577"/>
+          <ac:spMkLst>
+            <pc:docMk/>
+            <pc:sldMk cId="426974449" sldId="308"/>
+            <ac:spMk id="6" creationId="{84F10693-2FE8-EFC8-8DB6-84BFD181D260}"/>
+          </ac:spMkLst>
+        </pc:spChg>
+      </pc:sldChg>
+      <pc:sldChg chg="addSp delSp modSp add mod">
+        <pc:chgData name="Ismaël Tuo" userId="fca7baf0e513a1e6" providerId="LiveId" clId="{20AE7FCD-B62D-499A-891E-30FD03C16E0C}" dt="2024-03-22T14:04:07.869" v="648"/>
+        <pc:sldMkLst>
+          <pc:docMk/>
+          <pc:sldMk cId="1218833506" sldId="309"/>
+        </pc:sldMkLst>
+        <pc:spChg chg="del">
+          <ac:chgData name="Ismaël Tuo" userId="fca7baf0e513a1e6" providerId="LiveId" clId="{20AE7FCD-B62D-499A-891E-30FD03C16E0C}" dt="2024-03-22T14:03:56.560" v="644" actId="478"/>
+          <ac:spMkLst>
+            <pc:docMk/>
+            <pc:sldMk cId="1218833506" sldId="309"/>
+            <ac:spMk id="2" creationId="{598CC1F4-92B5-97D6-5630-8A3701211AA4}"/>
+          </ac:spMkLst>
+        </pc:spChg>
+        <pc:spChg chg="del">
+          <ac:chgData name="Ismaël Tuo" userId="fca7baf0e513a1e6" providerId="LiveId" clId="{20AE7FCD-B62D-499A-891E-30FD03C16E0C}" dt="2024-03-22T14:03:49.790" v="641" actId="478"/>
+          <ac:spMkLst>
+            <pc:docMk/>
+            <pc:sldMk cId="1218833506" sldId="309"/>
+            <ac:spMk id="7" creationId="{990321CC-02EF-ED64-0AA9-789ED60F60B1}"/>
+          </ac:spMkLst>
+        </pc:spChg>
+        <pc:spChg chg="add mod">
+          <ac:chgData name="Ismaël Tuo" userId="fca7baf0e513a1e6" providerId="LiveId" clId="{20AE7FCD-B62D-499A-891E-30FD03C16E0C}" dt="2024-03-22T14:04:01.137" v="647" actId="20577"/>
+          <ac:spMkLst>
+            <pc:docMk/>
+            <pc:sldMk cId="1218833506" sldId="309"/>
+            <ac:spMk id="8" creationId="{5BA0D3A7-9417-F401-A3A9-F9D415C2D14B}"/>
+          </ac:spMkLst>
+        </pc:spChg>
+        <pc:spChg chg="add mod">
+          <ac:chgData name="Ismaël Tuo" userId="fca7baf0e513a1e6" providerId="LiveId" clId="{20AE7FCD-B62D-499A-891E-30FD03C16E0C}" dt="2024-03-22T14:04:07.869" v="648"/>
+          <ac:spMkLst>
+            <pc:docMk/>
+            <pc:sldMk cId="1218833506" sldId="309"/>
+            <ac:spMk id="9" creationId="{6F6AE9C0-502A-7B4D-5F00-2D2B4B210060}"/>
+          </ac:spMkLst>
+        </pc:spChg>
+        <pc:spChg chg="add mod">
+          <ac:chgData name="Ismaël Tuo" userId="fca7baf0e513a1e6" providerId="LiveId" clId="{20AE7FCD-B62D-499A-891E-30FD03C16E0C}" dt="2024-03-22T14:04:07.869" v="648"/>
+          <ac:spMkLst>
+            <pc:docMk/>
+            <pc:sldMk cId="1218833506" sldId="309"/>
+            <ac:spMk id="10" creationId="{24A064B1-8B26-5E29-0A60-6894F448BCCC}"/>
+          </ac:spMkLst>
+        </pc:spChg>
+        <pc:spChg chg="add mod">
+          <ac:chgData name="Ismaël Tuo" userId="fca7baf0e513a1e6" providerId="LiveId" clId="{20AE7FCD-B62D-499A-891E-30FD03C16E0C}" dt="2024-03-22T14:04:07.869" v="648"/>
+          <ac:spMkLst>
+            <pc:docMk/>
+            <pc:sldMk cId="1218833506" sldId="309"/>
+            <ac:spMk id="11" creationId="{9D23BAA4-A604-5A95-6DE1-DC134EEEC409}"/>
+          </ac:spMkLst>
+        </pc:spChg>
+      </pc:sldChg>
+      <pc:sldChg chg="addSp delSp modSp add mod">
+        <pc:chgData name="Ismaël Tuo" userId="fca7baf0e513a1e6" providerId="LiveId" clId="{20AE7FCD-B62D-499A-891E-30FD03C16E0C}" dt="2024-03-22T14:05:25.488" v="691" actId="1076"/>
+        <pc:sldMkLst>
+          <pc:docMk/>
+          <pc:sldMk cId="88089300" sldId="310"/>
+        </pc:sldMkLst>
+        <pc:spChg chg="add mod">
+          <ac:chgData name="Ismaël Tuo" userId="fca7baf0e513a1e6" providerId="LiveId" clId="{20AE7FCD-B62D-499A-891E-30FD03C16E0C}" dt="2024-03-22T14:05:18.480" v="690" actId="20577"/>
+          <ac:spMkLst>
+            <pc:docMk/>
+            <pc:sldMk cId="88089300" sldId="310"/>
+            <ac:spMk id="2" creationId="{218863FB-835F-3C29-E372-96EEDF5955F7}"/>
+          </ac:spMkLst>
+        </pc:spChg>
+        <pc:spChg chg="add mod">
+          <ac:chgData name="Ismaël Tuo" userId="fca7baf0e513a1e6" providerId="LiveId" clId="{20AE7FCD-B62D-499A-891E-30FD03C16E0C}" dt="2024-03-22T14:05:25.488" v="691" actId="1076"/>
+          <ac:spMkLst>
+            <pc:docMk/>
+            <pc:sldMk cId="88089300" sldId="310"/>
+            <ac:spMk id="7" creationId="{0013674F-05FF-460F-46AC-C319C49B4842}"/>
+          </ac:spMkLst>
+        </pc:spChg>
+        <pc:spChg chg="del">
+          <ac:chgData name="Ismaël Tuo" userId="fca7baf0e513a1e6" providerId="LiveId" clId="{20AE7FCD-B62D-499A-891E-30FD03C16E0C}" dt="2024-03-22T14:04:25.936" v="650" actId="478"/>
+          <ac:spMkLst>
+            <pc:docMk/>
+            <pc:sldMk cId="88089300" sldId="310"/>
+            <ac:spMk id="8" creationId="{5BA0D3A7-9417-F401-A3A9-F9D415C2D14B}"/>
+          </ac:spMkLst>
+        </pc:spChg>
+        <pc:spChg chg="del">
+          <ac:chgData name="Ismaël Tuo" userId="fca7baf0e513a1e6" providerId="LiveId" clId="{20AE7FCD-B62D-499A-891E-30FD03C16E0C}" dt="2024-03-22T14:04:25.936" v="650" actId="478"/>
+          <ac:spMkLst>
+            <pc:docMk/>
+            <pc:sldMk cId="88089300" sldId="310"/>
+            <ac:spMk id="9" creationId="{6F6AE9C0-502A-7B4D-5F00-2D2B4B210060}"/>
+          </ac:spMkLst>
+        </pc:spChg>
+        <pc:spChg chg="del">
+          <ac:chgData name="Ismaël Tuo" userId="fca7baf0e513a1e6" providerId="LiveId" clId="{20AE7FCD-B62D-499A-891E-30FD03C16E0C}" dt="2024-03-22T14:04:25.936" v="650" actId="478"/>
+          <ac:spMkLst>
+            <pc:docMk/>
+            <pc:sldMk cId="88089300" sldId="310"/>
+            <ac:spMk id="10" creationId="{24A064B1-8B26-5E29-0A60-6894F448BCCC}"/>
+          </ac:spMkLst>
+        </pc:spChg>
+        <pc:spChg chg="del">
+          <ac:chgData name="Ismaël Tuo" userId="fca7baf0e513a1e6" providerId="LiveId" clId="{20AE7FCD-B62D-499A-891E-30FD03C16E0C}" dt="2024-03-22T14:04:25.936" v="650" actId="478"/>
+          <ac:spMkLst>
+            <pc:docMk/>
+            <pc:sldMk cId="88089300" sldId="310"/>
+            <ac:spMk id="11" creationId="{9D23BAA4-A604-5A95-6DE1-DC134EEEC409}"/>
+          </ac:spMkLst>
+        </pc:spChg>
+        <pc:spChg chg="add mod">
+          <ac:chgData name="Ismaël Tuo" userId="fca7baf0e513a1e6" providerId="LiveId" clId="{20AE7FCD-B62D-499A-891E-30FD03C16E0C}" dt="2024-03-22T14:04:39.821" v="651"/>
+          <ac:spMkLst>
+            <pc:docMk/>
+            <pc:sldMk cId="88089300" sldId="310"/>
+            <ac:spMk id="12" creationId="{D6DD0778-C36E-1EA9-42D5-2CDADF55E9F7}"/>
+          </ac:spMkLst>
+        </pc:spChg>
+        <pc:picChg chg="add mod">
+          <ac:chgData name="Ismaël Tuo" userId="fca7baf0e513a1e6" providerId="LiveId" clId="{20AE7FCD-B62D-499A-891E-30FD03C16E0C}" dt="2024-03-22T14:04:39.821" v="651"/>
+          <ac:picMkLst>
+            <pc:docMk/>
+            <pc:sldMk cId="88089300" sldId="310"/>
+            <ac:picMk id="13" creationId="{1CCF12D0-7CE0-76AA-E98F-C35B69CCC68F}"/>
+          </ac:picMkLst>
+        </pc:picChg>
+        <pc:picChg chg="add mod">
+          <ac:chgData name="Ismaël Tuo" userId="fca7baf0e513a1e6" providerId="LiveId" clId="{20AE7FCD-B62D-499A-891E-30FD03C16E0C}" dt="2024-03-22T14:04:39.821" v="651"/>
+          <ac:picMkLst>
+            <pc:docMk/>
+            <pc:sldMk cId="88089300" sldId="310"/>
+            <ac:picMk id="14" creationId="{A10C9E07-D42D-46F7-F5F9-9EFF8FF9FA9D}"/>
+          </ac:picMkLst>
+        </pc:picChg>
+      </pc:sldChg>
     </pc:docChg>
   </pc:docChgLst>
 </pc:chgInfo>
@@ -531,7 +723,7 @@
           <a:p>
             <a:fld id="{5D1B8971-FAD5-A544-A565-5C81831E2E08}" type="datetimeFigureOut">
               <a:rPr lang="fr-FR" smtClean="0"/>
-              <a:t>17/03/2024</a:t>
+              <a:t>22/03/2024</a:t>
             </a:fld>
             <a:endParaRPr lang="fr-FR"/>
           </a:p>
@@ -961,7 +1153,7 @@
           <a:p>
             <a:fld id="{446AF453-C717-E044-9B61-C449088DBB9F}" type="datetime1">
               <a:rPr lang="fr-FR" smtClean="0"/>
-              <a:t>17/03/2024</a:t>
+              <a:t>22/03/2024</a:t>
             </a:fld>
             <a:endParaRPr lang="fr-FR"/>
           </a:p>
@@ -1135,7 +1327,7 @@
           <a:p>
             <a:fld id="{0AD74B8B-4B66-A54B-A7E1-EB9F6C09CE67}" type="datetime1">
               <a:rPr lang="fr-FR" smtClean="0"/>
-              <a:t>17/03/2024</a:t>
+              <a:t>22/03/2024</a:t>
             </a:fld>
             <a:endParaRPr lang="fr-FR"/>
           </a:p>
@@ -1319,7 +1511,7 @@
           <a:p>
             <a:fld id="{9584F9F2-42A0-CD42-8013-986AEAF97421}" type="datetime1">
               <a:rPr lang="fr-FR" smtClean="0"/>
-              <a:t>17/03/2024</a:t>
+              <a:t>22/03/2024</a:t>
             </a:fld>
             <a:endParaRPr lang="fr-FR"/>
           </a:p>
@@ -1493,7 +1685,7 @@
           <a:p>
             <a:fld id="{DAB9BD9F-3179-BB4C-96AB-C40862581685}" type="datetime1">
               <a:rPr lang="fr-FR" smtClean="0"/>
-              <a:t>17/03/2024</a:t>
+              <a:t>22/03/2024</a:t>
             </a:fld>
             <a:endParaRPr lang="fr-FR"/>
           </a:p>
@@ -1765,7 +1957,7 @@
           <a:p>
             <a:fld id="{A664DE96-64FF-BC43-8A9C-18ED43A528D6}" type="datetime1">
               <a:rPr lang="fr-FR" smtClean="0"/>
-              <a:t>17/03/2024</a:t>
+              <a:t>22/03/2024</a:t>
             </a:fld>
             <a:endParaRPr lang="fr-FR"/>
           </a:p>
@@ -2001,7 +2193,7 @@
           <a:p>
             <a:fld id="{2C8FE800-9F9B-1C4F-A1CD-9EF46842C4CA}" type="datetime1">
               <a:rPr lang="fr-FR" smtClean="0"/>
-              <a:t>17/03/2024</a:t>
+              <a:t>22/03/2024</a:t>
             </a:fld>
             <a:endParaRPr lang="fr-FR"/>
           </a:p>
@@ -2364,7 +2556,7 @@
           <a:p>
             <a:fld id="{0F7DED4E-8CB4-EF40-A349-EFC02EC7784E}" type="datetime1">
               <a:rPr lang="fr-FR" smtClean="0"/>
-              <a:t>17/03/2024</a:t>
+              <a:t>22/03/2024</a:t>
             </a:fld>
             <a:endParaRPr lang="fr-FR"/>
           </a:p>
@@ -2509,7 +2701,7 @@
           <a:p>
             <a:fld id="{5BB88D77-E8A2-E24F-81D2-817E60779F3E}" type="datetime1">
               <a:rPr lang="fr-FR" smtClean="0"/>
-              <a:t>17/03/2024</a:t>
+              <a:t>22/03/2024</a:t>
             </a:fld>
             <a:endParaRPr lang="fr-FR"/>
           </a:p>
@@ -2608,7 +2800,7 @@
           <a:p>
             <a:fld id="{817F964E-5B57-884A-A1B8-925BFA5276AF}" type="datetime1">
               <a:rPr lang="fr-FR" smtClean="0"/>
-              <a:t>17/03/2024</a:t>
+              <a:t>22/03/2024</a:t>
             </a:fld>
             <a:endParaRPr lang="fr-FR"/>
           </a:p>
@@ -2969,7 +3161,7 @@
           <a:p>
             <a:fld id="{D5636CD0-A2E6-1543-A0E5-C829C16FEE55}" type="datetime1">
               <a:rPr lang="fr-FR" smtClean="0"/>
-              <a:t>17/03/2024</a:t>
+              <a:t>22/03/2024</a:t>
             </a:fld>
             <a:endParaRPr lang="fr-FR"/>
           </a:p>
@@ -3330,7 +3522,7 @@
           <a:p>
             <a:fld id="{CEE5CE4A-5B1A-1846-BA66-722BDB7A9525}" type="datetime1">
               <a:rPr lang="fr-FR" smtClean="0"/>
-              <a:t>17/03/2024</a:t>
+              <a:t>22/03/2024</a:t>
             </a:fld>
             <a:endParaRPr lang="fr-FR"/>
           </a:p>
@@ -3577,7 +3769,7 @@
           <a:p>
             <a:fld id="{55A13D9C-CA6E-9C45-8634-4423EBFFD553}" type="datetime1">
               <a:rPr lang="fr-FR" smtClean="0"/>
-              <a:t>17/03/2024</a:t>
+              <a:t>22/03/2024</a:t>
             </a:fld>
             <a:endParaRPr lang="fr-FR"/>
           </a:p>
@@ -5590,14 +5782,14 @@
                 <a:latin typeface="Times New Roman" panose="02020603050405020304" pitchFamily="18" charset="0"/>
                 <a:cs typeface="Times New Roman" panose="02020603050405020304" pitchFamily="18" charset="0"/>
               </a:rPr>
-              <a:t>La fonction id avec </a:t>
-            </a:r>
-            <a:r>
-              <a:rPr lang="fr-FR" sz="2400" b="1">
+              <a:t>Similitudes entre tuple et </a:t>
+            </a:r>
+            <a:r>
+              <a:rPr lang="fr-FR" sz="2400" b="1" dirty="0" err="1">
                 <a:latin typeface="Times New Roman" panose="02020603050405020304" pitchFamily="18" charset="0"/>
                 <a:cs typeface="Times New Roman" panose="02020603050405020304" pitchFamily="18" charset="0"/>
               </a:rPr>
-              <a:t>les tuples</a:t>
+              <a:t>list</a:t>
             </a:r>
             <a:endParaRPr lang="fr-FR" sz="2400" b="1" i="1" dirty="0">
               <a:latin typeface="Times New Roman" panose="02020603050405020304" pitchFamily="18" charset="0"/>
@@ -5660,7 +5852,7 @@
         <p:spPr>
           <a:xfrm>
             <a:off x="500932" y="941801"/>
-            <a:ext cx="11441731" cy="707886"/>
+            <a:ext cx="11441731" cy="400110"/>
           </a:xfrm>
           <a:prstGeom prst="rect">
             <a:avLst/>
@@ -5678,77 +5870,15 @@
                 <a:latin typeface="Times New Roman" panose="02020603050405020304" pitchFamily="18" charset="0"/>
                 <a:cs typeface="Times New Roman" panose="02020603050405020304" pitchFamily="18" charset="0"/>
               </a:rPr>
-              <a:t>Voir docs et ajouter lien vers documentation python</a:t>
-            </a:r>
-          </a:p>
-          <a:p>
-            <a:r>
-              <a:rPr lang="fr-FR" sz="2000" dirty="0">
-                <a:latin typeface="Times New Roman" panose="02020603050405020304" pitchFamily="18" charset="0"/>
-                <a:cs typeface="Times New Roman" panose="02020603050405020304" pitchFamily="18" charset="0"/>
-              </a:rPr>
-              <a:t>X in liste , </a:t>
-            </a:r>
-            <a:r>
-              <a:rPr lang="fr-FR" sz="2000" dirty="0" err="1">
-                <a:latin typeface="Times New Roman" panose="02020603050405020304" pitchFamily="18" charset="0"/>
-                <a:cs typeface="Times New Roman" panose="02020603050405020304" pitchFamily="18" charset="0"/>
-              </a:rPr>
-              <a:t>Contains</a:t>
-            </a:r>
-            <a:r>
-              <a:rPr lang="fr-FR" sz="2000" dirty="0">
-                <a:latin typeface="Times New Roman" panose="02020603050405020304" pitchFamily="18" charset="0"/>
-                <a:cs typeface="Times New Roman" panose="02020603050405020304" pitchFamily="18" charset="0"/>
-              </a:rPr>
-              <a:t>, </a:t>
-            </a:r>
-            <a:r>
-              <a:rPr lang="fr-FR" sz="2000" dirty="0" err="1">
-                <a:latin typeface="Times New Roman" panose="02020603050405020304" pitchFamily="18" charset="0"/>
-                <a:cs typeface="Times New Roman" panose="02020603050405020304" pitchFamily="18" charset="0"/>
-              </a:rPr>
-              <a:t>clear</a:t>
-            </a:r>
-            <a:r>
-              <a:rPr lang="fr-FR" sz="2000" dirty="0">
-                <a:latin typeface="Times New Roman" panose="02020603050405020304" pitchFamily="18" charset="0"/>
-                <a:cs typeface="Times New Roman" panose="02020603050405020304" pitchFamily="18" charset="0"/>
-              </a:rPr>
-              <a:t>, count, </a:t>
-            </a:r>
-            <a:r>
-              <a:rPr lang="fr-FR" sz="2000" dirty="0" err="1">
-                <a:latin typeface="Times New Roman" panose="02020603050405020304" pitchFamily="18" charset="0"/>
-                <a:cs typeface="Times New Roman" panose="02020603050405020304" pitchFamily="18" charset="0"/>
-              </a:rPr>
-              <a:t>extend</a:t>
-            </a:r>
-            <a:r>
-              <a:rPr lang="fr-FR" sz="2000" dirty="0">
-                <a:latin typeface="Times New Roman" panose="02020603050405020304" pitchFamily="18" charset="0"/>
-                <a:cs typeface="Times New Roman" panose="02020603050405020304" pitchFamily="18" charset="0"/>
-              </a:rPr>
-              <a:t>, pop, reverse, sort, </a:t>
-            </a:r>
-            <a:r>
-              <a:rPr lang="fr-FR" sz="2000" dirty="0" err="1">
-                <a:latin typeface="Times New Roman" panose="02020603050405020304" pitchFamily="18" charset="0"/>
-                <a:cs typeface="Times New Roman" panose="02020603050405020304" pitchFamily="18" charset="0"/>
-              </a:rPr>
-              <a:t>sorted</a:t>
-            </a:r>
-            <a:endParaRPr lang="fr-FR" sz="2000" dirty="0">
-              <a:latin typeface="Times New Roman" panose="02020603050405020304" pitchFamily="18" charset="0"/>
-              <a:cs typeface="Times New Roman" panose="02020603050405020304" pitchFamily="18" charset="0"/>
-            </a:endParaRPr>
+              <a:t>https://geekflare.com/fr/python-tuple-vs-list/</a:t>
+            </a:r>
           </a:p>
         </p:txBody>
       </p:sp>
     </p:spTree>
     <p:extLst>
       <p:ext uri="{BB962C8B-B14F-4D97-AF65-F5344CB8AC3E}">
-        <p14:creationId xmlns:p14="http://schemas.microsoft.com/office/powerpoint/2010/main" val="1127859648"/>
+        <p14:creationId xmlns:p14="http://schemas.microsoft.com/office/powerpoint/2010/main" val="513514576"/>
       </p:ext>
     </p:extLst>
   </p:cSld>
@@ -5847,8 +5977,8 @@
         </p:nvSpPr>
         <p:spPr>
           <a:xfrm>
-            <a:off x="397564" y="218526"/>
-            <a:ext cx="5795005" cy="461665"/>
+            <a:off x="397565" y="218526"/>
+            <a:ext cx="5577722" cy="461665"/>
           </a:xfrm>
           <a:prstGeom prst="rect">
             <a:avLst/>
@@ -5866,8 +5996,19 @@
                 <a:latin typeface="Times New Roman" panose="02020603050405020304" pitchFamily="18" charset="0"/>
                 <a:cs typeface="Times New Roman" panose="02020603050405020304" pitchFamily="18" charset="0"/>
               </a:rPr>
-              <a:t>Exercices</a:t>
-            </a:r>
+              <a:t>Différences entre tuple et </a:t>
+            </a:r>
+            <a:r>
+              <a:rPr lang="fr-FR" sz="2400" b="1" dirty="0" err="1">
+                <a:latin typeface="Times New Roman" panose="02020603050405020304" pitchFamily="18" charset="0"/>
+                <a:cs typeface="Times New Roman" panose="02020603050405020304" pitchFamily="18" charset="0"/>
+              </a:rPr>
+              <a:t>list</a:t>
+            </a:r>
+            <a:endParaRPr lang="fr-FR" sz="2400" b="1" i="1" dirty="0">
+              <a:latin typeface="Times New Roman" panose="02020603050405020304" pitchFamily="18" charset="0"/>
+              <a:cs typeface="Times New Roman" panose="02020603050405020304" pitchFamily="18" charset="0"/>
+            </a:endParaRPr>
           </a:p>
         </p:txBody>
       </p:sp>
@@ -5912,6 +6053,485 @@
       </p:cxnSp>
       <p:sp>
         <p:nvSpPr>
+          <p:cNvPr id="7" name="ZoneTexte 6">
+            <a:extLst>
+              <a:ext uri="{FF2B5EF4-FFF2-40B4-BE49-F238E27FC236}">
+                <a16:creationId xmlns:a16="http://schemas.microsoft.com/office/drawing/2014/main" id="{B31AF22B-77AC-398F-8B32-17C6B4914236}"/>
+              </a:ext>
+            </a:extLst>
+          </p:cNvPr>
+          <p:cNvSpPr txBox="1"/>
+          <p:nvPr/>
+        </p:nvSpPr>
+        <p:spPr>
+          <a:xfrm>
+            <a:off x="500932" y="941801"/>
+            <a:ext cx="11441731" cy="400110"/>
+          </a:xfrm>
+          <a:prstGeom prst="rect">
+            <a:avLst/>
+          </a:prstGeom>
+          <a:noFill/>
+        </p:spPr>
+        <p:txBody>
+          <a:bodyPr wrap="square" rtlCol="0">
+            <a:spAutoFit/>
+          </a:bodyPr>
+          <a:lstStyle/>
+          <a:p>
+            <a:r>
+              <a:rPr lang="fr-FR" sz="2000" dirty="0">
+                <a:latin typeface="Times New Roman" panose="02020603050405020304" pitchFamily="18" charset="0"/>
+                <a:cs typeface="Times New Roman" panose="02020603050405020304" pitchFamily="18" charset="0"/>
+              </a:rPr>
+              <a:t>https://geekflare.com/fr/python-tuple-vs-list/</a:t>
+            </a:r>
+          </a:p>
+        </p:txBody>
+      </p:sp>
+    </p:spTree>
+    <p:extLst>
+      <p:ext uri="{BB962C8B-B14F-4D97-AF65-F5344CB8AC3E}">
+        <p14:creationId xmlns:p14="http://schemas.microsoft.com/office/powerpoint/2010/main" val="426974449"/>
+      </p:ext>
+    </p:extLst>
+  </p:cSld>
+  <p:clrMapOvr>
+    <a:masterClrMapping/>
+  </p:clrMapOvr>
+</p:sld>
+</file>
+
+<file path=ppt/slides/slide17.xml><?xml version="1.0" encoding="utf-8"?>
+<p:sld xmlns:a="http://schemas.openxmlformats.org/drawingml/2006/main" xmlns:r="http://schemas.openxmlformats.org/officeDocument/2006/relationships" xmlns:p="http://schemas.openxmlformats.org/presentationml/2006/main">
+  <p:cSld>
+    <p:spTree>
+      <p:nvGrpSpPr>
+        <p:cNvPr id="1" name=""/>
+        <p:cNvGrpSpPr/>
+        <p:nvPr/>
+      </p:nvGrpSpPr>
+      <p:grpSpPr>
+        <a:xfrm>
+          <a:off x="0" y="0"/>
+          <a:ext cx="0" cy="0"/>
+          <a:chOff x="0" y="0"/>
+          <a:chExt cx="0" cy="0"/>
+        </a:xfrm>
+      </p:grpSpPr>
+      <p:sp>
+        <p:nvSpPr>
+          <p:cNvPr id="4" name="Espace réservé du pied de page 3">
+            <a:extLst>
+              <a:ext uri="{FF2B5EF4-FFF2-40B4-BE49-F238E27FC236}">
+                <a16:creationId xmlns:a16="http://schemas.microsoft.com/office/drawing/2014/main" id="{8FEEC940-4BFF-956C-713A-1CE73C436B6F}"/>
+              </a:ext>
+            </a:extLst>
+          </p:cNvPr>
+          <p:cNvSpPr>
+            <a:spLocks noGrp="1"/>
+          </p:cNvSpPr>
+          <p:nvPr>
+            <p:ph type="ftr" sz="quarter" idx="11"/>
+          </p:nvPr>
+        </p:nvSpPr>
+        <p:spPr/>
+        <p:txBody>
+          <a:bodyPr/>
+          <a:lstStyle/>
+          <a:p>
+            <a:r>
+              <a:rPr lang="fr-FR"/>
+              <a:t>Cours: Python | Auteur: TUO N. Ismaël Maurice 
+</a:t>
+            </a:r>
+          </a:p>
+        </p:txBody>
+      </p:sp>
+      <p:sp>
+        <p:nvSpPr>
+          <p:cNvPr id="5" name="Espace réservé du numéro de diapositive 4">
+            <a:extLst>
+              <a:ext uri="{FF2B5EF4-FFF2-40B4-BE49-F238E27FC236}">
+                <a16:creationId xmlns:a16="http://schemas.microsoft.com/office/drawing/2014/main" id="{CE50FB16-F89F-D7CA-C6AA-CFC075094990}"/>
+              </a:ext>
+            </a:extLst>
+          </p:cNvPr>
+          <p:cNvSpPr>
+            <a:spLocks noGrp="1"/>
+          </p:cNvSpPr>
+          <p:nvPr>
+            <p:ph type="sldNum" sz="quarter" idx="12"/>
+          </p:nvPr>
+        </p:nvSpPr>
+        <p:spPr/>
+        <p:txBody>
+          <a:bodyPr/>
+          <a:lstStyle/>
+          <a:p>
+            <a:fld id="{B8C3BB88-DD29-4D42-B62E-D7D541DB4348}" type="slidenum">
+              <a:rPr lang="fr-FR" smtClean="0"/>
+              <a:t>17</a:t>
+            </a:fld>
+            <a:endParaRPr lang="fr-FR"/>
+          </a:p>
+        </p:txBody>
+      </p:sp>
+      <p:sp>
+        <p:nvSpPr>
+          <p:cNvPr id="6" name="ZoneTexte 5">
+            <a:extLst>
+              <a:ext uri="{FF2B5EF4-FFF2-40B4-BE49-F238E27FC236}">
+                <a16:creationId xmlns:a16="http://schemas.microsoft.com/office/drawing/2014/main" id="{84F10693-2FE8-EFC8-8DB6-84BFD181D260}"/>
+              </a:ext>
+            </a:extLst>
+          </p:cNvPr>
+          <p:cNvSpPr txBox="1"/>
+          <p:nvPr/>
+        </p:nvSpPr>
+        <p:spPr>
+          <a:xfrm>
+            <a:off x="397565" y="218526"/>
+            <a:ext cx="5577722" cy="461665"/>
+          </a:xfrm>
+          <a:prstGeom prst="rect">
+            <a:avLst/>
+          </a:prstGeom>
+          <a:noFill/>
+        </p:spPr>
+        <p:txBody>
+          <a:bodyPr wrap="square" rtlCol="0">
+            <a:spAutoFit/>
+          </a:bodyPr>
+          <a:lstStyle/>
+          <a:p>
+            <a:r>
+              <a:rPr lang="fr-FR" sz="2400" b="1" dirty="0">
+                <a:latin typeface="Times New Roman" panose="02020603050405020304" pitchFamily="18" charset="0"/>
+                <a:cs typeface="Times New Roman" panose="02020603050405020304" pitchFamily="18" charset="0"/>
+              </a:rPr>
+              <a:t>La fonction id avec </a:t>
+            </a:r>
+            <a:r>
+              <a:rPr lang="fr-FR" sz="2400" b="1">
+                <a:latin typeface="Times New Roman" panose="02020603050405020304" pitchFamily="18" charset="0"/>
+                <a:cs typeface="Times New Roman" panose="02020603050405020304" pitchFamily="18" charset="0"/>
+              </a:rPr>
+              <a:t>les tuples</a:t>
+            </a:r>
+            <a:endParaRPr lang="fr-FR" sz="2400" b="1" i="1" dirty="0">
+              <a:latin typeface="Times New Roman" panose="02020603050405020304" pitchFamily="18" charset="0"/>
+              <a:cs typeface="Times New Roman" panose="02020603050405020304" pitchFamily="18" charset="0"/>
+            </a:endParaRPr>
+          </a:p>
+        </p:txBody>
+      </p:sp>
+      <p:cxnSp>
+        <p:nvCxnSpPr>
+          <p:cNvPr id="3" name="Connecteur droit 2">
+            <a:extLst>
+              <a:ext uri="{FF2B5EF4-FFF2-40B4-BE49-F238E27FC236}">
+                <a16:creationId xmlns:a16="http://schemas.microsoft.com/office/drawing/2014/main" id="{6AC8021D-4898-08B9-18A0-60AC71EF613E}"/>
+              </a:ext>
+            </a:extLst>
+          </p:cNvPr>
+          <p:cNvCxnSpPr>
+            <a:cxnSpLocks/>
+          </p:cNvCxnSpPr>
+          <p:nvPr/>
+        </p:nvCxnSpPr>
+        <p:spPr>
+          <a:xfrm>
+            <a:off x="500932" y="680191"/>
+            <a:ext cx="11178450" cy="0"/>
+          </a:xfrm>
+          <a:prstGeom prst="line">
+            <a:avLst/>
+          </a:prstGeom>
+          <a:ln/>
+        </p:spPr>
+        <p:style>
+          <a:lnRef idx="3">
+            <a:schemeClr val="accent3"/>
+          </a:lnRef>
+          <a:fillRef idx="0">
+            <a:schemeClr val="accent3"/>
+          </a:fillRef>
+          <a:effectRef idx="2">
+            <a:schemeClr val="accent3"/>
+          </a:effectRef>
+          <a:fontRef idx="minor">
+            <a:schemeClr val="tx1"/>
+          </a:fontRef>
+        </p:style>
+      </p:cxnSp>
+      <p:sp>
+        <p:nvSpPr>
+          <p:cNvPr id="7" name="ZoneTexte 6">
+            <a:extLst>
+              <a:ext uri="{FF2B5EF4-FFF2-40B4-BE49-F238E27FC236}">
+                <a16:creationId xmlns:a16="http://schemas.microsoft.com/office/drawing/2014/main" id="{B31AF22B-77AC-398F-8B32-17C6B4914236}"/>
+              </a:ext>
+            </a:extLst>
+          </p:cNvPr>
+          <p:cNvSpPr txBox="1"/>
+          <p:nvPr/>
+        </p:nvSpPr>
+        <p:spPr>
+          <a:xfrm>
+            <a:off x="500932" y="941801"/>
+            <a:ext cx="11441731" cy="707886"/>
+          </a:xfrm>
+          <a:prstGeom prst="rect">
+            <a:avLst/>
+          </a:prstGeom>
+          <a:noFill/>
+        </p:spPr>
+        <p:txBody>
+          <a:bodyPr wrap="square" rtlCol="0">
+            <a:spAutoFit/>
+          </a:bodyPr>
+          <a:lstStyle/>
+          <a:p>
+            <a:r>
+              <a:rPr lang="fr-FR" sz="2000" dirty="0">
+                <a:latin typeface="Times New Roman" panose="02020603050405020304" pitchFamily="18" charset="0"/>
+                <a:cs typeface="Times New Roman" panose="02020603050405020304" pitchFamily="18" charset="0"/>
+              </a:rPr>
+              <a:t>Voir docs et ajouter lien vers documentation python</a:t>
+            </a:r>
+          </a:p>
+          <a:p>
+            <a:r>
+              <a:rPr lang="fr-FR" sz="2000" dirty="0">
+                <a:latin typeface="Times New Roman" panose="02020603050405020304" pitchFamily="18" charset="0"/>
+                <a:cs typeface="Times New Roman" panose="02020603050405020304" pitchFamily="18" charset="0"/>
+              </a:rPr>
+              <a:t>X in liste , </a:t>
+            </a:r>
+            <a:r>
+              <a:rPr lang="fr-FR" sz="2000" dirty="0" err="1">
+                <a:latin typeface="Times New Roman" panose="02020603050405020304" pitchFamily="18" charset="0"/>
+                <a:cs typeface="Times New Roman" panose="02020603050405020304" pitchFamily="18" charset="0"/>
+              </a:rPr>
+              <a:t>Contains</a:t>
+            </a:r>
+            <a:r>
+              <a:rPr lang="fr-FR" sz="2000" dirty="0">
+                <a:latin typeface="Times New Roman" panose="02020603050405020304" pitchFamily="18" charset="0"/>
+                <a:cs typeface="Times New Roman" panose="02020603050405020304" pitchFamily="18" charset="0"/>
+              </a:rPr>
+              <a:t>, </a:t>
+            </a:r>
+            <a:r>
+              <a:rPr lang="fr-FR" sz="2000" dirty="0" err="1">
+                <a:latin typeface="Times New Roman" panose="02020603050405020304" pitchFamily="18" charset="0"/>
+                <a:cs typeface="Times New Roman" panose="02020603050405020304" pitchFamily="18" charset="0"/>
+              </a:rPr>
+              <a:t>clear</a:t>
+            </a:r>
+            <a:r>
+              <a:rPr lang="fr-FR" sz="2000" dirty="0">
+                <a:latin typeface="Times New Roman" panose="02020603050405020304" pitchFamily="18" charset="0"/>
+                <a:cs typeface="Times New Roman" panose="02020603050405020304" pitchFamily="18" charset="0"/>
+              </a:rPr>
+              <a:t>, count, </a:t>
+            </a:r>
+            <a:r>
+              <a:rPr lang="fr-FR" sz="2000" dirty="0" err="1">
+                <a:latin typeface="Times New Roman" panose="02020603050405020304" pitchFamily="18" charset="0"/>
+                <a:cs typeface="Times New Roman" panose="02020603050405020304" pitchFamily="18" charset="0"/>
+              </a:rPr>
+              <a:t>extend</a:t>
+            </a:r>
+            <a:r>
+              <a:rPr lang="fr-FR" sz="2000" dirty="0">
+                <a:latin typeface="Times New Roman" panose="02020603050405020304" pitchFamily="18" charset="0"/>
+                <a:cs typeface="Times New Roman" panose="02020603050405020304" pitchFamily="18" charset="0"/>
+              </a:rPr>
+              <a:t>, pop, reverse, sort, </a:t>
+            </a:r>
+            <a:r>
+              <a:rPr lang="fr-FR" sz="2000" dirty="0" err="1">
+                <a:latin typeface="Times New Roman" panose="02020603050405020304" pitchFamily="18" charset="0"/>
+                <a:cs typeface="Times New Roman" panose="02020603050405020304" pitchFamily="18" charset="0"/>
+              </a:rPr>
+              <a:t>sorted</a:t>
+            </a:r>
+            <a:endParaRPr lang="fr-FR" sz="2000" dirty="0">
+              <a:latin typeface="Times New Roman" panose="02020603050405020304" pitchFamily="18" charset="0"/>
+              <a:cs typeface="Times New Roman" panose="02020603050405020304" pitchFamily="18" charset="0"/>
+            </a:endParaRPr>
+          </a:p>
+        </p:txBody>
+      </p:sp>
+    </p:spTree>
+    <p:extLst>
+      <p:ext uri="{BB962C8B-B14F-4D97-AF65-F5344CB8AC3E}">
+        <p14:creationId xmlns:p14="http://schemas.microsoft.com/office/powerpoint/2010/main" val="1127859648"/>
+      </p:ext>
+    </p:extLst>
+  </p:cSld>
+  <p:clrMapOvr>
+    <a:masterClrMapping/>
+  </p:clrMapOvr>
+</p:sld>
+</file>
+
+<file path=ppt/slides/slide18.xml><?xml version="1.0" encoding="utf-8"?>
+<p:sld xmlns:a="http://schemas.openxmlformats.org/drawingml/2006/main" xmlns:r="http://schemas.openxmlformats.org/officeDocument/2006/relationships" xmlns:p="http://schemas.openxmlformats.org/presentationml/2006/main">
+  <p:cSld>
+    <p:spTree>
+      <p:nvGrpSpPr>
+        <p:cNvPr id="1" name=""/>
+        <p:cNvGrpSpPr/>
+        <p:nvPr/>
+      </p:nvGrpSpPr>
+      <p:grpSpPr>
+        <a:xfrm>
+          <a:off x="0" y="0"/>
+          <a:ext cx="0" cy="0"/>
+          <a:chOff x="0" y="0"/>
+          <a:chExt cx="0" cy="0"/>
+        </a:xfrm>
+      </p:grpSpPr>
+      <p:sp>
+        <p:nvSpPr>
+          <p:cNvPr id="4" name="Espace réservé du pied de page 3">
+            <a:extLst>
+              <a:ext uri="{FF2B5EF4-FFF2-40B4-BE49-F238E27FC236}">
+                <a16:creationId xmlns:a16="http://schemas.microsoft.com/office/drawing/2014/main" id="{8FEEC940-4BFF-956C-713A-1CE73C436B6F}"/>
+              </a:ext>
+            </a:extLst>
+          </p:cNvPr>
+          <p:cNvSpPr>
+            <a:spLocks noGrp="1"/>
+          </p:cNvSpPr>
+          <p:nvPr>
+            <p:ph type="ftr" sz="quarter" idx="11"/>
+          </p:nvPr>
+        </p:nvSpPr>
+        <p:spPr/>
+        <p:txBody>
+          <a:bodyPr/>
+          <a:lstStyle/>
+          <a:p>
+            <a:r>
+              <a:rPr lang="fr-FR"/>
+              <a:t>Cours: Python | Auteur: TUO N. Ismaël Maurice 
+</a:t>
+            </a:r>
+          </a:p>
+        </p:txBody>
+      </p:sp>
+      <p:sp>
+        <p:nvSpPr>
+          <p:cNvPr id="5" name="Espace réservé du numéro de diapositive 4">
+            <a:extLst>
+              <a:ext uri="{FF2B5EF4-FFF2-40B4-BE49-F238E27FC236}">
+                <a16:creationId xmlns:a16="http://schemas.microsoft.com/office/drawing/2014/main" id="{CE50FB16-F89F-D7CA-C6AA-CFC075094990}"/>
+              </a:ext>
+            </a:extLst>
+          </p:cNvPr>
+          <p:cNvSpPr>
+            <a:spLocks noGrp="1"/>
+          </p:cNvSpPr>
+          <p:nvPr>
+            <p:ph type="sldNum" sz="quarter" idx="12"/>
+          </p:nvPr>
+        </p:nvSpPr>
+        <p:spPr/>
+        <p:txBody>
+          <a:bodyPr/>
+          <a:lstStyle/>
+          <a:p>
+            <a:fld id="{B8C3BB88-DD29-4D42-B62E-D7D541DB4348}" type="slidenum">
+              <a:rPr lang="fr-FR" smtClean="0"/>
+              <a:t>18</a:t>
+            </a:fld>
+            <a:endParaRPr lang="fr-FR"/>
+          </a:p>
+        </p:txBody>
+      </p:sp>
+      <p:sp>
+        <p:nvSpPr>
+          <p:cNvPr id="6" name="ZoneTexte 5">
+            <a:extLst>
+              <a:ext uri="{FF2B5EF4-FFF2-40B4-BE49-F238E27FC236}">
+                <a16:creationId xmlns:a16="http://schemas.microsoft.com/office/drawing/2014/main" id="{84F10693-2FE8-EFC8-8DB6-84BFD181D260}"/>
+              </a:ext>
+            </a:extLst>
+          </p:cNvPr>
+          <p:cNvSpPr txBox="1"/>
+          <p:nvPr/>
+        </p:nvSpPr>
+        <p:spPr>
+          <a:xfrm>
+            <a:off x="397564" y="218526"/>
+            <a:ext cx="5795005" cy="461665"/>
+          </a:xfrm>
+          <a:prstGeom prst="rect">
+            <a:avLst/>
+          </a:prstGeom>
+          <a:noFill/>
+        </p:spPr>
+        <p:txBody>
+          <a:bodyPr wrap="square" rtlCol="0">
+            <a:spAutoFit/>
+          </a:bodyPr>
+          <a:lstStyle/>
+          <a:p>
+            <a:r>
+              <a:rPr lang="fr-FR" sz="2400" b="1" dirty="0">
+                <a:latin typeface="Times New Roman" panose="02020603050405020304" pitchFamily="18" charset="0"/>
+                <a:cs typeface="Times New Roman" panose="02020603050405020304" pitchFamily="18" charset="0"/>
+              </a:rPr>
+              <a:t>Exercices</a:t>
+            </a:r>
+          </a:p>
+        </p:txBody>
+      </p:sp>
+      <p:cxnSp>
+        <p:nvCxnSpPr>
+          <p:cNvPr id="3" name="Connecteur droit 2">
+            <a:extLst>
+              <a:ext uri="{FF2B5EF4-FFF2-40B4-BE49-F238E27FC236}">
+                <a16:creationId xmlns:a16="http://schemas.microsoft.com/office/drawing/2014/main" id="{6AC8021D-4898-08B9-18A0-60AC71EF613E}"/>
+              </a:ext>
+            </a:extLst>
+          </p:cNvPr>
+          <p:cNvCxnSpPr>
+            <a:cxnSpLocks/>
+          </p:cNvCxnSpPr>
+          <p:nvPr/>
+        </p:nvCxnSpPr>
+        <p:spPr>
+          <a:xfrm>
+            <a:off x="500932" y="680191"/>
+            <a:ext cx="11178450" cy="0"/>
+          </a:xfrm>
+          <a:prstGeom prst="line">
+            <a:avLst/>
+          </a:prstGeom>
+          <a:ln/>
+        </p:spPr>
+        <p:style>
+          <a:lnRef idx="3">
+            <a:schemeClr val="accent3"/>
+          </a:lnRef>
+          <a:fillRef idx="0">
+            <a:schemeClr val="accent3"/>
+          </a:fillRef>
+          <a:effectRef idx="2">
+            <a:schemeClr val="accent3"/>
+          </a:effectRef>
+          <a:fontRef idx="minor">
+            <a:schemeClr val="tx1"/>
+          </a:fontRef>
+        </p:style>
+      </p:cxnSp>
+      <p:sp>
+        <p:nvSpPr>
           <p:cNvPr id="2" name="ZoneTexte 1">
             <a:extLst>
               <a:ext uri="{FF2B5EF4-FFF2-40B4-BE49-F238E27FC236}">
@@ -6024,6 +6644,109 @@
               </a:rPr>
               <a:t>Faire des tests des fonctions dans une fonction main.</a:t>
             </a:r>
+          </a:p>
+        </p:txBody>
+      </p:sp>
+      <p:sp>
+        <p:nvSpPr>
+          <p:cNvPr id="8" name="ZoneTexte 7">
+            <a:extLst>
+              <a:ext uri="{FF2B5EF4-FFF2-40B4-BE49-F238E27FC236}">
+                <a16:creationId xmlns:a16="http://schemas.microsoft.com/office/drawing/2014/main" id="{4708017B-B18C-FDEC-C8DB-6E471AF09806}"/>
+              </a:ext>
+            </a:extLst>
+          </p:cNvPr>
+          <p:cNvSpPr txBox="1"/>
+          <p:nvPr/>
+        </p:nvSpPr>
+        <p:spPr>
+          <a:xfrm>
+            <a:off x="397564" y="2722101"/>
+            <a:ext cx="11569148" cy="400110"/>
+          </a:xfrm>
+          <a:prstGeom prst="rect">
+            <a:avLst/>
+          </a:prstGeom>
+          <a:noFill/>
+        </p:spPr>
+        <p:txBody>
+          <a:bodyPr wrap="square" rtlCol="0">
+            <a:spAutoFit/>
+          </a:bodyPr>
+          <a:lstStyle/>
+          <a:p>
+            <a:r>
+              <a:rPr lang="fr-FR" sz="2000" b="1" u="sng" dirty="0">
+                <a:latin typeface="Times New Roman" panose="02020603050405020304" pitchFamily="18" charset="0"/>
+                <a:cs typeface="Times New Roman" panose="02020603050405020304" pitchFamily="18" charset="0"/>
+              </a:rPr>
+              <a:t>Exercice 2</a:t>
+            </a:r>
+          </a:p>
+        </p:txBody>
+      </p:sp>
+      <p:sp>
+        <p:nvSpPr>
+          <p:cNvPr id="9" name="ZoneTexte 8">
+            <a:extLst>
+              <a:ext uri="{FF2B5EF4-FFF2-40B4-BE49-F238E27FC236}">
+                <a16:creationId xmlns:a16="http://schemas.microsoft.com/office/drawing/2014/main" id="{0B027DD6-C7AB-F422-3CB7-279D83C3276B}"/>
+              </a:ext>
+            </a:extLst>
+          </p:cNvPr>
+          <p:cNvSpPr txBox="1"/>
+          <p:nvPr/>
+        </p:nvSpPr>
+        <p:spPr>
+          <a:xfrm>
+            <a:off x="397564" y="3122211"/>
+            <a:ext cx="11088982" cy="1015663"/>
+          </a:xfrm>
+          <a:prstGeom prst="rect">
+            <a:avLst/>
+          </a:prstGeom>
+          <a:noFill/>
+        </p:spPr>
+        <p:txBody>
+          <a:bodyPr wrap="square" rtlCol="0">
+            <a:spAutoFit/>
+          </a:bodyPr>
+          <a:lstStyle>
+            <a:defPPr>
+              <a:defRPr lang="en-US"/>
+            </a:defPPr>
+            <a:lvl1pPr>
+              <a:defRPr sz="2000"/>
+            </a:lvl1pPr>
+          </a:lstStyle>
+          <a:p>
+            <a:r>
+              <a:rPr lang="fr-FR" dirty="0">
+                <a:latin typeface="Times New Roman" panose="02020603050405020304" pitchFamily="18" charset="0"/>
+                <a:cs typeface="Times New Roman" panose="02020603050405020304" pitchFamily="18" charset="0"/>
+              </a:rPr>
+              <a:t>Ecrire une fonction qui prends 1 paramètre composé de 2 tuples de nombre dont le deuxième élément est le nombre de nombres après le premier nombre.</a:t>
+            </a:r>
+          </a:p>
+          <a:p>
+            <a:r>
+              <a:rPr lang="fr-FR" dirty="0">
+                <a:latin typeface="Times New Roman" panose="02020603050405020304" pitchFamily="18" charset="0"/>
+                <a:cs typeface="Times New Roman" panose="02020603050405020304" pitchFamily="18" charset="0"/>
+              </a:rPr>
+              <a:t>Par exemple si les paramètres sont 1, 10 le programme doit retourner le tuple 2, 3, 4</a:t>
+            </a:r>
+            <a:r>
+              <a:rPr lang="fr-FR">
+                <a:latin typeface="Times New Roman" panose="02020603050405020304" pitchFamily="18" charset="0"/>
+                <a:cs typeface="Times New Roman" panose="02020603050405020304" pitchFamily="18" charset="0"/>
+              </a:rPr>
+              <a:t>,…,11.</a:t>
+            </a:r>
+            <a:endParaRPr lang="fr-FR" dirty="0">
+              <a:latin typeface="Times New Roman" panose="02020603050405020304" pitchFamily="18" charset="0"/>
+              <a:cs typeface="Times New Roman" panose="02020603050405020304" pitchFamily="18" charset="0"/>
+            </a:endParaRPr>
           </a:p>
         </p:txBody>
       </p:sp>
@@ -6040,7 +6763,1203 @@
 </p:sld>
 </file>
 
-<file path=ppt/slides/slide17.xml><?xml version="1.0" encoding="utf-8"?>
+<file path=ppt/slides/slide19.xml><?xml version="1.0" encoding="utf-8"?>
+<p:sld xmlns:a="http://schemas.openxmlformats.org/drawingml/2006/main" xmlns:r="http://schemas.openxmlformats.org/officeDocument/2006/relationships" xmlns:p="http://schemas.openxmlformats.org/presentationml/2006/main">
+  <p:cSld>
+    <p:spTree>
+      <p:nvGrpSpPr>
+        <p:cNvPr id="1" name=""/>
+        <p:cNvGrpSpPr/>
+        <p:nvPr/>
+      </p:nvGrpSpPr>
+      <p:grpSpPr>
+        <a:xfrm>
+          <a:off x="0" y="0"/>
+          <a:ext cx="0" cy="0"/>
+          <a:chOff x="0" y="0"/>
+          <a:chExt cx="0" cy="0"/>
+        </a:xfrm>
+      </p:grpSpPr>
+      <p:sp>
+        <p:nvSpPr>
+          <p:cNvPr id="4" name="Espace réservé du pied de page 3">
+            <a:extLst>
+              <a:ext uri="{FF2B5EF4-FFF2-40B4-BE49-F238E27FC236}">
+                <a16:creationId xmlns:a16="http://schemas.microsoft.com/office/drawing/2014/main" id="{8FEEC940-4BFF-956C-713A-1CE73C436B6F}"/>
+              </a:ext>
+            </a:extLst>
+          </p:cNvPr>
+          <p:cNvSpPr>
+            <a:spLocks noGrp="1"/>
+          </p:cNvSpPr>
+          <p:nvPr>
+            <p:ph type="ftr" sz="quarter" idx="11"/>
+          </p:nvPr>
+        </p:nvSpPr>
+        <p:spPr/>
+        <p:txBody>
+          <a:bodyPr/>
+          <a:lstStyle/>
+          <a:p>
+            <a:r>
+              <a:rPr lang="fr-FR"/>
+              <a:t>Cours: Python | Auteur: TUO N. Ismaël Maurice 
+</a:t>
+            </a:r>
+          </a:p>
+        </p:txBody>
+      </p:sp>
+      <p:sp>
+        <p:nvSpPr>
+          <p:cNvPr id="5" name="Espace réservé du numéro de diapositive 4">
+            <a:extLst>
+              <a:ext uri="{FF2B5EF4-FFF2-40B4-BE49-F238E27FC236}">
+                <a16:creationId xmlns:a16="http://schemas.microsoft.com/office/drawing/2014/main" id="{CE50FB16-F89F-D7CA-C6AA-CFC075094990}"/>
+              </a:ext>
+            </a:extLst>
+          </p:cNvPr>
+          <p:cNvSpPr>
+            <a:spLocks noGrp="1"/>
+          </p:cNvSpPr>
+          <p:nvPr>
+            <p:ph type="sldNum" sz="quarter" idx="12"/>
+          </p:nvPr>
+        </p:nvSpPr>
+        <p:spPr/>
+        <p:txBody>
+          <a:bodyPr/>
+          <a:lstStyle/>
+          <a:p>
+            <a:fld id="{B8C3BB88-DD29-4D42-B62E-D7D541DB4348}" type="slidenum">
+              <a:rPr lang="fr-FR" smtClean="0"/>
+              <a:t>19</a:t>
+            </a:fld>
+            <a:endParaRPr lang="fr-FR"/>
+          </a:p>
+        </p:txBody>
+      </p:sp>
+      <p:sp>
+        <p:nvSpPr>
+          <p:cNvPr id="6" name="ZoneTexte 5">
+            <a:extLst>
+              <a:ext uri="{FF2B5EF4-FFF2-40B4-BE49-F238E27FC236}">
+                <a16:creationId xmlns:a16="http://schemas.microsoft.com/office/drawing/2014/main" id="{84F10693-2FE8-EFC8-8DB6-84BFD181D260}"/>
+              </a:ext>
+            </a:extLst>
+          </p:cNvPr>
+          <p:cNvSpPr txBox="1"/>
+          <p:nvPr/>
+        </p:nvSpPr>
+        <p:spPr>
+          <a:xfrm>
+            <a:off x="397564" y="218526"/>
+            <a:ext cx="5795005" cy="461665"/>
+          </a:xfrm>
+          <a:prstGeom prst="rect">
+            <a:avLst/>
+          </a:prstGeom>
+          <a:noFill/>
+        </p:spPr>
+        <p:txBody>
+          <a:bodyPr wrap="square" rtlCol="0">
+            <a:spAutoFit/>
+          </a:bodyPr>
+          <a:lstStyle/>
+          <a:p>
+            <a:r>
+              <a:rPr lang="fr-FR" sz="2400" b="1" dirty="0">
+                <a:latin typeface="Times New Roman" panose="02020603050405020304" pitchFamily="18" charset="0"/>
+                <a:cs typeface="Times New Roman" panose="02020603050405020304" pitchFamily="18" charset="0"/>
+              </a:rPr>
+              <a:t>Exercices</a:t>
+            </a:r>
+          </a:p>
+        </p:txBody>
+      </p:sp>
+      <p:cxnSp>
+        <p:nvCxnSpPr>
+          <p:cNvPr id="3" name="Connecteur droit 2">
+            <a:extLst>
+              <a:ext uri="{FF2B5EF4-FFF2-40B4-BE49-F238E27FC236}">
+                <a16:creationId xmlns:a16="http://schemas.microsoft.com/office/drawing/2014/main" id="{6AC8021D-4898-08B9-18A0-60AC71EF613E}"/>
+              </a:ext>
+            </a:extLst>
+          </p:cNvPr>
+          <p:cNvCxnSpPr>
+            <a:cxnSpLocks/>
+          </p:cNvCxnSpPr>
+          <p:nvPr/>
+        </p:nvCxnSpPr>
+        <p:spPr>
+          <a:xfrm>
+            <a:off x="500932" y="680191"/>
+            <a:ext cx="11178450" cy="0"/>
+          </a:xfrm>
+          <a:prstGeom prst="line">
+            <a:avLst/>
+          </a:prstGeom>
+          <a:ln/>
+        </p:spPr>
+        <p:style>
+          <a:lnRef idx="3">
+            <a:schemeClr val="accent3"/>
+          </a:lnRef>
+          <a:fillRef idx="0">
+            <a:schemeClr val="accent3"/>
+          </a:fillRef>
+          <a:effectRef idx="2">
+            <a:schemeClr val="accent3"/>
+          </a:effectRef>
+          <a:fontRef idx="minor">
+            <a:schemeClr val="tx1"/>
+          </a:fontRef>
+        </p:style>
+      </p:cxnSp>
+      <p:sp>
+        <p:nvSpPr>
+          <p:cNvPr id="8" name="ZoneTexte 7">
+            <a:extLst>
+              <a:ext uri="{FF2B5EF4-FFF2-40B4-BE49-F238E27FC236}">
+                <a16:creationId xmlns:a16="http://schemas.microsoft.com/office/drawing/2014/main" id="{5BA0D3A7-9417-F401-A3A9-F9D415C2D14B}"/>
+              </a:ext>
+            </a:extLst>
+          </p:cNvPr>
+          <p:cNvSpPr txBox="1"/>
+          <p:nvPr/>
+        </p:nvSpPr>
+        <p:spPr>
+          <a:xfrm>
+            <a:off x="397564" y="680191"/>
+            <a:ext cx="11569148" cy="400110"/>
+          </a:xfrm>
+          <a:prstGeom prst="rect">
+            <a:avLst/>
+          </a:prstGeom>
+          <a:noFill/>
+        </p:spPr>
+        <p:txBody>
+          <a:bodyPr wrap="square" rtlCol="0">
+            <a:spAutoFit/>
+          </a:bodyPr>
+          <a:lstStyle/>
+          <a:p>
+            <a:r>
+              <a:rPr lang="fr-FR" sz="2000" b="1" u="sng" dirty="0">
+                <a:latin typeface="Times New Roman" panose="02020603050405020304" pitchFamily="18" charset="0"/>
+                <a:cs typeface="Times New Roman" panose="02020603050405020304" pitchFamily="18" charset="0"/>
+              </a:rPr>
+              <a:t>Mini-Projet 1</a:t>
+            </a:r>
+          </a:p>
+        </p:txBody>
+      </p:sp>
+      <p:sp>
+        <p:nvSpPr>
+          <p:cNvPr id="9" name="ZoneTexte 8">
+            <a:extLst>
+              <a:ext uri="{FF2B5EF4-FFF2-40B4-BE49-F238E27FC236}">
+                <a16:creationId xmlns:a16="http://schemas.microsoft.com/office/drawing/2014/main" id="{6F6AE9C0-502A-7B4D-5F00-2D2B4B210060}"/>
+              </a:ext>
+            </a:extLst>
+          </p:cNvPr>
+          <p:cNvSpPr txBox="1"/>
+          <p:nvPr/>
+        </p:nvSpPr>
+        <p:spPr>
+          <a:xfrm>
+            <a:off x="397564" y="1141856"/>
+            <a:ext cx="11088982" cy="707886"/>
+          </a:xfrm>
+          <a:prstGeom prst="rect">
+            <a:avLst/>
+          </a:prstGeom>
+          <a:noFill/>
+        </p:spPr>
+        <p:txBody>
+          <a:bodyPr wrap="square" rtlCol="0">
+            <a:spAutoFit/>
+          </a:bodyPr>
+          <a:lstStyle>
+            <a:defPPr>
+              <a:defRPr lang="en-US"/>
+            </a:defPPr>
+            <a:lvl1pPr>
+              <a:defRPr sz="2000"/>
+            </a:lvl1pPr>
+          </a:lstStyle>
+          <a:p>
+            <a:r>
+              <a:rPr lang="fr-FR" dirty="0">
+                <a:latin typeface="Times New Roman" panose="02020603050405020304" pitchFamily="18" charset="0"/>
+                <a:cs typeface="Times New Roman" panose="02020603050405020304" pitchFamily="18" charset="0"/>
+              </a:rPr>
+              <a:t>Le chiffre de César (ou chiffrement par décalage) est un algorithme de chiffrement très simple que Jules César utilisait pour chiffrer certains messages qu’il envoyait.</a:t>
+            </a:r>
+          </a:p>
+        </p:txBody>
+      </p:sp>
+      <mc:AlternateContent xmlns:mc="http://schemas.openxmlformats.org/markup-compatibility/2006">
+        <mc:Choice xmlns:a14="http://schemas.microsoft.com/office/drawing/2010/main" Requires="a14">
+          <p:sp>
+            <p:nvSpPr>
+              <p:cNvPr id="10" name="ZoneTexte 9">
+                <a:extLst>
+                  <a:ext uri="{FF2B5EF4-FFF2-40B4-BE49-F238E27FC236}">
+                    <a16:creationId xmlns:a16="http://schemas.microsoft.com/office/drawing/2014/main" id="{24A064B1-8B26-5E29-0A60-6894F448BCCC}"/>
+                  </a:ext>
+                </a:extLst>
+              </p:cNvPr>
+              <p:cNvSpPr txBox="1"/>
+              <p:nvPr/>
+            </p:nvSpPr>
+            <p:spPr>
+              <a:xfrm>
+                <a:off x="397564" y="1976103"/>
+                <a:ext cx="11088982" cy="3170099"/>
+              </a:xfrm>
+              <a:prstGeom prst="rect">
+                <a:avLst/>
+              </a:prstGeom>
+              <a:noFill/>
+            </p:spPr>
+            <p:txBody>
+              <a:bodyPr wrap="square" rtlCol="0">
+                <a:spAutoFit/>
+              </a:bodyPr>
+              <a:lstStyle>
+                <a:defPPr>
+                  <a:defRPr lang="en-US"/>
+                </a:defPPr>
+                <a:lvl1pPr>
+                  <a:defRPr sz="2000"/>
+                </a:lvl1pPr>
+              </a:lstStyle>
+              <a:p>
+                <a:r>
+                  <a:rPr lang="fr-FR" dirty="0">
+                    <a:latin typeface="Times New Roman" panose="02020603050405020304" pitchFamily="18" charset="0"/>
+                    <a:cs typeface="Times New Roman" panose="02020603050405020304" pitchFamily="18" charset="0"/>
+                  </a:rPr>
+                  <a:t>Le principe du chiffrement est le suivant:</a:t>
+                </a:r>
+              </a:p>
+              <a:p>
+                <a:r>
+                  <a:rPr lang="fr-FR" dirty="0">
+                    <a:latin typeface="Times New Roman" panose="02020603050405020304" pitchFamily="18" charset="0"/>
+                    <a:cs typeface="Times New Roman" panose="02020603050405020304" pitchFamily="18" charset="0"/>
+                  </a:rPr>
+                  <a:t>Pour un message à chiffrer, on remplace chaque lettre par une lettre différente, située </a:t>
+                </a:r>
+                <a14:m>
+                  <m:oMath xmlns:m="http://schemas.openxmlformats.org/officeDocument/2006/math">
+                    <m:r>
+                      <a:rPr lang="fr-FR" b="0" i="1" smtClean="0">
+                        <a:latin typeface="Cambria Math" panose="02040503050406030204" pitchFamily="18" charset="0"/>
+                        <a:cs typeface="Times New Roman" panose="02020603050405020304" pitchFamily="18" charset="0"/>
+                      </a:rPr>
+                      <m:t>𝑥</m:t>
+                    </m:r>
+                  </m:oMath>
+                </a14:m>
+                <a:r>
+                  <a:rPr lang="fr-FR" dirty="0">
+                    <a:latin typeface="Times New Roman" panose="02020603050405020304" pitchFamily="18" charset="0"/>
+                    <a:cs typeface="Times New Roman" panose="02020603050405020304" pitchFamily="18" charset="0"/>
+                  </a:rPr>
+                  <a:t> lettres après dans l’alphabet où </a:t>
+                </a:r>
+                <a14:m>
+                  <m:oMath xmlns:m="http://schemas.openxmlformats.org/officeDocument/2006/math">
+                    <m:r>
+                      <a:rPr lang="fr-FR" b="0" i="1" smtClean="0">
+                        <a:latin typeface="Cambria Math" panose="02040503050406030204" pitchFamily="18" charset="0"/>
+                        <a:cs typeface="Times New Roman" panose="02020603050405020304" pitchFamily="18" charset="0"/>
+                      </a:rPr>
+                      <m:t>𝑥</m:t>
+                    </m:r>
+                  </m:oMath>
+                </a14:m>
+                <a:r>
+                  <a:rPr lang="fr-FR" dirty="0">
+                    <a:latin typeface="Times New Roman" panose="02020603050405020304" pitchFamily="18" charset="0"/>
+                    <a:cs typeface="Times New Roman" panose="02020603050405020304" pitchFamily="18" charset="0"/>
+                  </a:rPr>
+                  <a:t> est la valeur de la clé de chiffrement.</a:t>
+                </a:r>
+              </a:p>
+              <a:p>
+                <a:r>
+                  <a:rPr lang="fr-FR" dirty="0">
+                    <a:latin typeface="Times New Roman" panose="02020603050405020304" pitchFamily="18" charset="0"/>
+                    <a:cs typeface="Times New Roman" panose="02020603050405020304" pitchFamily="18" charset="0"/>
+                  </a:rPr>
+                  <a:t>Si l’on considère que chaque lettre de l’alphabet est numérotée de 0 à 25 (A=0, B=1,…,Z=25), cela revient à additionner la valeur de la lettre du texte en clair avec la valeur de la clé pour trouver la valeur de la lettre qui va remplacer la lettre non chiffrée.</a:t>
+                </a:r>
+              </a:p>
+              <a:p>
+                <a:r>
+                  <a:rPr lang="fr-FR" dirty="0">
+                    <a:latin typeface="Times New Roman" panose="02020603050405020304" pitchFamily="18" charset="0"/>
+                    <a:cs typeface="Times New Roman" panose="02020603050405020304" pitchFamily="18" charset="0"/>
+                  </a:rPr>
+                  <a:t>Par exemple pour chiffrer la chaine </a:t>
+                </a:r>
+                <a14:m>
+                  <m:oMath xmlns:m="http://schemas.openxmlformats.org/officeDocument/2006/math">
+                    <m:r>
+                      <a:rPr lang="fr-FR" b="0" i="1" smtClean="0">
+                        <a:latin typeface="Cambria Math" panose="02040503050406030204" pitchFamily="18" charset="0"/>
+                        <a:cs typeface="Times New Roman" panose="02020603050405020304" pitchFamily="18" charset="0"/>
+                      </a:rPr>
+                      <m:t>𝑍𝐸𝑇𝐴</m:t>
+                    </m:r>
+                  </m:oMath>
+                </a14:m>
+                <a:r>
+                  <a:rPr lang="fr-FR" dirty="0">
+                    <a:latin typeface="Times New Roman" panose="02020603050405020304" pitchFamily="18" charset="0"/>
+                    <a:cs typeface="Times New Roman" panose="02020603050405020304" pitchFamily="18" charset="0"/>
+                  </a:rPr>
+                  <a:t> avec une clé de chiffrement 1 on aura comme mot chiffré: </a:t>
+                </a:r>
+                <a14:m>
+                  <m:oMath xmlns:m="http://schemas.openxmlformats.org/officeDocument/2006/math">
+                    <m:r>
+                      <a:rPr lang="fr-FR" b="0" i="1" smtClean="0">
+                        <a:latin typeface="Cambria Math" panose="02040503050406030204" pitchFamily="18" charset="0"/>
+                        <a:cs typeface="Times New Roman" panose="02020603050405020304" pitchFamily="18" charset="0"/>
+                      </a:rPr>
+                      <m:t>𝐴𝐹𝑈𝐵</m:t>
+                    </m:r>
+                  </m:oMath>
+                </a14:m>
+                <a:r>
+                  <a:rPr lang="fr-FR" dirty="0">
+                    <a:latin typeface="Times New Roman" panose="02020603050405020304" pitchFamily="18" charset="0"/>
+                    <a:cs typeface="Times New Roman" panose="02020603050405020304" pitchFamily="18" charset="0"/>
+                  </a:rPr>
+                  <a:t> car la lettre 1 pas après Z est A et on recommence au début quand on arrive à la fin du tableau. On obtient le mot chiffré de </a:t>
+                </a:r>
+                <a14:m>
+                  <m:oMath xmlns:m="http://schemas.openxmlformats.org/officeDocument/2006/math">
+                    <m:r>
+                      <a:rPr lang="fr-FR" b="0" i="1" smtClean="0">
+                        <a:latin typeface="Cambria Math" panose="02040503050406030204" pitchFamily="18" charset="0"/>
+                        <a:cs typeface="Times New Roman" panose="02020603050405020304" pitchFamily="18" charset="0"/>
+                      </a:rPr>
+                      <m:t>𝑍𝐸𝑇𝐴</m:t>
+                    </m:r>
+                  </m:oMath>
+                </a14:m>
+                <a:r>
+                  <a:rPr lang="fr-FR" dirty="0">
+                    <a:latin typeface="Times New Roman" panose="02020603050405020304" pitchFamily="18" charset="0"/>
+                    <a:cs typeface="Times New Roman" panose="02020603050405020304" pitchFamily="18" charset="0"/>
+                  </a:rPr>
+                  <a:t> en remplaçant chaque lettre par la lettre qui la suit puisque le nombre de décalage est 1. </a:t>
+                </a:r>
+              </a:p>
+            </p:txBody>
+          </p:sp>
+        </mc:Choice>
+        <mc:Fallback>
+          <p:sp>
+            <p:nvSpPr>
+              <p:cNvPr id="10" name="ZoneTexte 9">
+                <a:extLst>
+                  <a:ext uri="{FF2B5EF4-FFF2-40B4-BE49-F238E27FC236}">
+                    <a16:creationId xmlns:a16="http://schemas.microsoft.com/office/drawing/2014/main" id="{24A064B1-8B26-5E29-0A60-6894F448BCCC}"/>
+                  </a:ext>
+                </a:extLst>
+              </p:cNvPr>
+              <p:cNvSpPr txBox="1">
+                <a:spLocks noRot="1" noChangeAspect="1" noMove="1" noResize="1" noEditPoints="1" noAdjustHandles="1" noChangeArrowheads="1" noChangeShapeType="1" noTextEdit="1"/>
+              </p:cNvSpPr>
+              <p:nvPr/>
+            </p:nvSpPr>
+            <p:spPr>
+              <a:xfrm>
+                <a:off x="397564" y="1976103"/>
+                <a:ext cx="11088982" cy="3170099"/>
+              </a:xfrm>
+              <a:prstGeom prst="rect">
+                <a:avLst/>
+              </a:prstGeom>
+              <a:blipFill>
+                <a:blip r:embed="rId2"/>
+                <a:stretch>
+                  <a:fillRect l="-550" t="-962" r="-880" b="-2500"/>
+                </a:stretch>
+              </a:blipFill>
+            </p:spPr>
+            <p:txBody>
+              <a:bodyPr/>
+              <a:lstStyle/>
+              <a:p>
+                <a:r>
+                  <a:rPr lang="fr-FR">
+                    <a:noFill/>
+                  </a:rPr>
+                  <a:t> </a:t>
+                </a:r>
+              </a:p>
+            </p:txBody>
+          </p:sp>
+        </mc:Fallback>
+      </mc:AlternateContent>
+      <mc:AlternateContent xmlns:mc="http://schemas.openxmlformats.org/markup-compatibility/2006">
+        <mc:Choice xmlns:a14="http://schemas.microsoft.com/office/drawing/2010/main" Requires="a14">
+          <p:sp>
+            <p:nvSpPr>
+              <p:cNvPr id="11" name="ZoneTexte 10">
+                <a:extLst>
+                  <a:ext uri="{FF2B5EF4-FFF2-40B4-BE49-F238E27FC236}">
+                    <a16:creationId xmlns:a16="http://schemas.microsoft.com/office/drawing/2014/main" id="{9D23BAA4-A604-5A95-6DE1-DC134EEEC409}"/>
+                  </a:ext>
+                </a:extLst>
+              </p:cNvPr>
+              <p:cNvSpPr txBox="1"/>
+              <p:nvPr/>
+            </p:nvSpPr>
+            <p:spPr>
+              <a:xfrm>
+                <a:off x="397564" y="5220545"/>
+                <a:ext cx="11088982" cy="1015663"/>
+              </a:xfrm>
+              <a:prstGeom prst="rect">
+                <a:avLst/>
+              </a:prstGeom>
+              <a:noFill/>
+            </p:spPr>
+            <p:txBody>
+              <a:bodyPr wrap="square" rtlCol="0">
+                <a:spAutoFit/>
+              </a:bodyPr>
+              <a:lstStyle>
+                <a:defPPr>
+                  <a:defRPr lang="en-US"/>
+                </a:defPPr>
+                <a:lvl1pPr>
+                  <a:defRPr sz="2000"/>
+                </a:lvl1pPr>
+              </a:lstStyle>
+              <a:p>
+                <a:r>
+                  <a:rPr lang="fr-FR" dirty="0">
+                    <a:latin typeface="Times New Roman" panose="02020603050405020304" pitchFamily="18" charset="0"/>
+                    <a:cs typeface="Times New Roman" panose="02020603050405020304" pitchFamily="18" charset="0"/>
+                  </a:rPr>
+                  <a:t>Dans le cas du déchiffrement on fait des sauts en arrière contrairement au chiffrement qui fait des sauts en avant. Une lettre chiffrée par une clé </a:t>
+                </a:r>
+                <a14:m>
+                  <m:oMath xmlns:m="http://schemas.openxmlformats.org/officeDocument/2006/math">
+                    <m:r>
+                      <a:rPr lang="fr-FR" b="0" i="1" smtClean="0">
+                        <a:latin typeface="Cambria Math" panose="02040503050406030204" pitchFamily="18" charset="0"/>
+                        <a:cs typeface="Times New Roman" panose="02020603050405020304" pitchFamily="18" charset="0"/>
+                      </a:rPr>
+                      <m:t>𝑥</m:t>
+                    </m:r>
+                  </m:oMath>
+                </a14:m>
+                <a:r>
+                  <a:rPr lang="fr-FR" dirty="0">
+                    <a:latin typeface="Times New Roman" panose="02020603050405020304" pitchFamily="18" charset="0"/>
+                    <a:cs typeface="Times New Roman" panose="02020603050405020304" pitchFamily="18" charset="0"/>
+                  </a:rPr>
+                  <a:t> est déchiffrée par la lettre se trouvant à </a:t>
+                </a:r>
+                <a14:m>
+                  <m:oMath xmlns:m="http://schemas.openxmlformats.org/officeDocument/2006/math">
+                    <m:r>
+                      <a:rPr lang="fr-FR" b="0" i="1" smtClean="0">
+                        <a:latin typeface="Cambria Math" panose="02040503050406030204" pitchFamily="18" charset="0"/>
+                        <a:cs typeface="Times New Roman" panose="02020603050405020304" pitchFamily="18" charset="0"/>
+                      </a:rPr>
+                      <m:t>𝑥</m:t>
+                    </m:r>
+                  </m:oMath>
+                </a14:m>
+                <a:r>
+                  <a:rPr lang="fr-FR" dirty="0">
+                    <a:latin typeface="Times New Roman" panose="02020603050405020304" pitchFamily="18" charset="0"/>
+                    <a:cs typeface="Times New Roman" panose="02020603050405020304" pitchFamily="18" charset="0"/>
+                  </a:rPr>
+                  <a:t> caractères avant la lettre dans l’alphabet.</a:t>
+                </a:r>
+              </a:p>
+            </p:txBody>
+          </p:sp>
+        </mc:Choice>
+        <mc:Fallback>
+          <p:sp>
+            <p:nvSpPr>
+              <p:cNvPr id="11" name="ZoneTexte 10">
+                <a:extLst>
+                  <a:ext uri="{FF2B5EF4-FFF2-40B4-BE49-F238E27FC236}">
+                    <a16:creationId xmlns:a16="http://schemas.microsoft.com/office/drawing/2014/main" id="{9D23BAA4-A604-5A95-6DE1-DC134EEEC409}"/>
+                  </a:ext>
+                </a:extLst>
+              </p:cNvPr>
+              <p:cNvSpPr txBox="1">
+                <a:spLocks noRot="1" noChangeAspect="1" noMove="1" noResize="1" noEditPoints="1" noAdjustHandles="1" noChangeArrowheads="1" noChangeShapeType="1" noTextEdit="1"/>
+              </p:cNvSpPr>
+              <p:nvPr/>
+            </p:nvSpPr>
+            <p:spPr>
+              <a:xfrm>
+                <a:off x="397564" y="5220545"/>
+                <a:ext cx="11088982" cy="1015663"/>
+              </a:xfrm>
+              <a:prstGeom prst="rect">
+                <a:avLst/>
+              </a:prstGeom>
+              <a:blipFill>
+                <a:blip r:embed="rId3"/>
+                <a:stretch>
+                  <a:fillRect l="-550" t="-2994" b="-9581"/>
+                </a:stretch>
+              </a:blipFill>
+            </p:spPr>
+            <p:txBody>
+              <a:bodyPr/>
+              <a:lstStyle/>
+              <a:p>
+                <a:r>
+                  <a:rPr lang="fr-FR">
+                    <a:noFill/>
+                  </a:rPr>
+                  <a:t> </a:t>
+                </a:r>
+              </a:p>
+            </p:txBody>
+          </p:sp>
+        </mc:Fallback>
+      </mc:AlternateContent>
+    </p:spTree>
+    <p:extLst>
+      <p:ext uri="{BB962C8B-B14F-4D97-AF65-F5344CB8AC3E}">
+        <p14:creationId xmlns:p14="http://schemas.microsoft.com/office/powerpoint/2010/main" val="1218833506"/>
+      </p:ext>
+    </p:extLst>
+  </p:cSld>
+  <p:clrMapOvr>
+    <a:masterClrMapping/>
+  </p:clrMapOvr>
+</p:sld>
+</file>
+
+<file path=ppt/slides/slide2.xml><?xml version="1.0" encoding="utf-8"?>
+<p:sld xmlns:a="http://schemas.openxmlformats.org/drawingml/2006/main" xmlns:r="http://schemas.openxmlformats.org/officeDocument/2006/relationships" xmlns:p="http://schemas.openxmlformats.org/presentationml/2006/main">
+  <p:cSld>
+    <p:spTree>
+      <p:nvGrpSpPr>
+        <p:cNvPr id="1" name=""/>
+        <p:cNvGrpSpPr/>
+        <p:nvPr/>
+      </p:nvGrpSpPr>
+      <p:grpSpPr>
+        <a:xfrm>
+          <a:off x="0" y="0"/>
+          <a:ext cx="0" cy="0"/>
+          <a:chOff x="0" y="0"/>
+          <a:chExt cx="0" cy="0"/>
+        </a:xfrm>
+      </p:grpSpPr>
+      <p:sp>
+        <p:nvSpPr>
+          <p:cNvPr id="4" name="Espace réservé du pied de page 3">
+            <a:extLst>
+              <a:ext uri="{FF2B5EF4-FFF2-40B4-BE49-F238E27FC236}">
+                <a16:creationId xmlns:a16="http://schemas.microsoft.com/office/drawing/2014/main" id="{8FEEC940-4BFF-956C-713A-1CE73C436B6F}"/>
+              </a:ext>
+            </a:extLst>
+          </p:cNvPr>
+          <p:cNvSpPr>
+            <a:spLocks noGrp="1"/>
+          </p:cNvSpPr>
+          <p:nvPr>
+            <p:ph type="ftr" sz="quarter" idx="11"/>
+          </p:nvPr>
+        </p:nvSpPr>
+        <p:spPr/>
+        <p:txBody>
+          <a:bodyPr/>
+          <a:lstStyle/>
+          <a:p>
+            <a:r>
+              <a:rPr lang="fr-FR"/>
+              <a:t>Cours: Python | Auteur: TUO N. Ismaël Maurice 
+</a:t>
+            </a:r>
+            <a:endParaRPr lang="fr-FR" dirty="0"/>
+          </a:p>
+        </p:txBody>
+      </p:sp>
+      <p:sp>
+        <p:nvSpPr>
+          <p:cNvPr id="5" name="Espace réservé du numéro de diapositive 4">
+            <a:extLst>
+              <a:ext uri="{FF2B5EF4-FFF2-40B4-BE49-F238E27FC236}">
+                <a16:creationId xmlns:a16="http://schemas.microsoft.com/office/drawing/2014/main" id="{CE50FB16-F89F-D7CA-C6AA-CFC075094990}"/>
+              </a:ext>
+            </a:extLst>
+          </p:cNvPr>
+          <p:cNvSpPr>
+            <a:spLocks noGrp="1"/>
+          </p:cNvSpPr>
+          <p:nvPr>
+            <p:ph type="sldNum" sz="quarter" idx="12"/>
+          </p:nvPr>
+        </p:nvSpPr>
+        <p:spPr/>
+        <p:txBody>
+          <a:bodyPr/>
+          <a:lstStyle/>
+          <a:p>
+            <a:fld id="{B8C3BB88-DD29-4D42-B62E-D7D541DB4348}" type="slidenum">
+              <a:rPr lang="fr-FR" smtClean="0"/>
+              <a:t>2</a:t>
+            </a:fld>
+            <a:endParaRPr lang="fr-FR" dirty="0"/>
+          </a:p>
+        </p:txBody>
+      </p:sp>
+      <p:sp>
+        <p:nvSpPr>
+          <p:cNvPr id="6" name="ZoneTexte 5">
+            <a:extLst>
+              <a:ext uri="{FF2B5EF4-FFF2-40B4-BE49-F238E27FC236}">
+                <a16:creationId xmlns:a16="http://schemas.microsoft.com/office/drawing/2014/main" id="{84F10693-2FE8-EFC8-8DB6-84BFD181D260}"/>
+              </a:ext>
+            </a:extLst>
+          </p:cNvPr>
+          <p:cNvSpPr txBox="1"/>
+          <p:nvPr/>
+        </p:nvSpPr>
+        <p:spPr>
+          <a:xfrm>
+            <a:off x="397565" y="95416"/>
+            <a:ext cx="3069204" cy="523220"/>
+          </a:xfrm>
+          <a:prstGeom prst="rect">
+            <a:avLst/>
+          </a:prstGeom>
+          <a:noFill/>
+        </p:spPr>
+        <p:txBody>
+          <a:bodyPr wrap="square" rtlCol="0">
+            <a:spAutoFit/>
+          </a:bodyPr>
+          <a:lstStyle/>
+          <a:p>
+            <a:r>
+              <a:rPr lang="fr-FR" sz="2800" b="1" dirty="0">
+                <a:latin typeface="Times New Roman" panose="02020603050405020304" pitchFamily="18" charset="0"/>
+                <a:cs typeface="Times New Roman" panose="02020603050405020304" pitchFamily="18" charset="0"/>
+              </a:rPr>
+              <a:t>Sommaire</a:t>
+            </a:r>
+          </a:p>
+        </p:txBody>
+      </p:sp>
+      <p:sp>
+        <p:nvSpPr>
+          <p:cNvPr id="11" name="ZoneTexte 10">
+            <a:extLst>
+              <a:ext uri="{FF2B5EF4-FFF2-40B4-BE49-F238E27FC236}">
+                <a16:creationId xmlns:a16="http://schemas.microsoft.com/office/drawing/2014/main" id="{C27A3656-3CB0-8161-AE9F-B92FBE4F5083}"/>
+              </a:ext>
+            </a:extLst>
+          </p:cNvPr>
+          <p:cNvSpPr txBox="1"/>
+          <p:nvPr/>
+        </p:nvSpPr>
+        <p:spPr>
+          <a:xfrm>
+            <a:off x="397565" y="948002"/>
+            <a:ext cx="9192515" cy="830997"/>
+          </a:xfrm>
+          <a:prstGeom prst="rect">
+            <a:avLst/>
+          </a:prstGeom>
+          <a:noFill/>
+        </p:spPr>
+        <p:txBody>
+          <a:bodyPr wrap="square" rtlCol="0">
+            <a:spAutoFit/>
+          </a:bodyPr>
+          <a:lstStyle/>
+          <a:p>
+            <a:pPr marL="342900" indent="-342900">
+              <a:buFont typeface="+mj-lt"/>
+              <a:buAutoNum type="arabicPeriod"/>
+            </a:pPr>
+            <a:r>
+              <a:rPr lang="fr-FR" sz="2400" dirty="0">
+                <a:latin typeface="Times New Roman" panose="02020603050405020304" pitchFamily="18" charset="0"/>
+                <a:cs typeface="Times New Roman" panose="02020603050405020304" pitchFamily="18" charset="0"/>
+                <a:hlinkClick r:id="rId2" action="ppaction://hlinksldjump"/>
+              </a:rPr>
+              <a:t>Définition</a:t>
+            </a:r>
+            <a:endParaRPr lang="fr-FR" sz="2400" dirty="0">
+              <a:latin typeface="Times New Roman" panose="02020603050405020304" pitchFamily="18" charset="0"/>
+              <a:cs typeface="Times New Roman" panose="02020603050405020304" pitchFamily="18" charset="0"/>
+            </a:endParaRPr>
+          </a:p>
+          <a:p>
+            <a:pPr marL="342900" indent="-342900">
+              <a:buFont typeface="+mj-lt"/>
+              <a:buAutoNum type="arabicPeriod"/>
+            </a:pPr>
+            <a:r>
+              <a:rPr lang="fr-FR" sz="2400" dirty="0">
+                <a:latin typeface="Times New Roman" panose="02020603050405020304" pitchFamily="18" charset="0"/>
+                <a:cs typeface="Times New Roman" panose="02020603050405020304" pitchFamily="18" charset="0"/>
+                <a:hlinkClick r:id="rId3" action="ppaction://hlinksldjump"/>
+              </a:rPr>
+              <a:t>Exercices</a:t>
+            </a:r>
+            <a:endParaRPr lang="fr-FR" sz="2400" dirty="0">
+              <a:latin typeface="Times New Roman" panose="02020603050405020304" pitchFamily="18" charset="0"/>
+              <a:cs typeface="Times New Roman" panose="02020603050405020304" pitchFamily="18" charset="0"/>
+            </a:endParaRPr>
+          </a:p>
+        </p:txBody>
+      </p:sp>
+      <p:cxnSp>
+        <p:nvCxnSpPr>
+          <p:cNvPr id="3" name="Connecteur droit 2">
+            <a:extLst>
+              <a:ext uri="{FF2B5EF4-FFF2-40B4-BE49-F238E27FC236}">
+                <a16:creationId xmlns:a16="http://schemas.microsoft.com/office/drawing/2014/main" id="{F5400574-BA21-AA27-C7D0-975B208CF325}"/>
+              </a:ext>
+            </a:extLst>
+          </p:cNvPr>
+          <p:cNvCxnSpPr>
+            <a:cxnSpLocks/>
+          </p:cNvCxnSpPr>
+          <p:nvPr/>
+        </p:nvCxnSpPr>
+        <p:spPr>
+          <a:xfrm>
+            <a:off x="500932" y="680191"/>
+            <a:ext cx="11178450" cy="0"/>
+          </a:xfrm>
+          <a:prstGeom prst="line">
+            <a:avLst/>
+          </a:prstGeom>
+          <a:ln/>
+        </p:spPr>
+        <p:style>
+          <a:lnRef idx="3">
+            <a:schemeClr val="accent3"/>
+          </a:lnRef>
+          <a:fillRef idx="0">
+            <a:schemeClr val="accent3"/>
+          </a:fillRef>
+          <a:effectRef idx="2">
+            <a:schemeClr val="accent3"/>
+          </a:effectRef>
+          <a:fontRef idx="minor">
+            <a:schemeClr val="tx1"/>
+          </a:fontRef>
+        </p:style>
+      </p:cxnSp>
+    </p:spTree>
+    <p:extLst>
+      <p:ext uri="{BB962C8B-B14F-4D97-AF65-F5344CB8AC3E}">
+        <p14:creationId xmlns:p14="http://schemas.microsoft.com/office/powerpoint/2010/main" val="1268069196"/>
+      </p:ext>
+    </p:extLst>
+  </p:cSld>
+  <p:clrMapOvr>
+    <a:masterClrMapping/>
+  </p:clrMapOvr>
+</p:sld>
+</file>
+
+<file path=ppt/slides/slide20.xml><?xml version="1.0" encoding="utf-8"?>
+<p:sld xmlns:a="http://schemas.openxmlformats.org/drawingml/2006/main" xmlns:r="http://schemas.openxmlformats.org/officeDocument/2006/relationships" xmlns:p="http://schemas.openxmlformats.org/presentationml/2006/main">
+  <p:cSld>
+    <p:spTree>
+      <p:nvGrpSpPr>
+        <p:cNvPr id="1" name=""/>
+        <p:cNvGrpSpPr/>
+        <p:nvPr/>
+      </p:nvGrpSpPr>
+      <p:grpSpPr>
+        <a:xfrm>
+          <a:off x="0" y="0"/>
+          <a:ext cx="0" cy="0"/>
+          <a:chOff x="0" y="0"/>
+          <a:chExt cx="0" cy="0"/>
+        </a:xfrm>
+      </p:grpSpPr>
+      <p:sp>
+        <p:nvSpPr>
+          <p:cNvPr id="4" name="Espace réservé du pied de page 3">
+            <a:extLst>
+              <a:ext uri="{FF2B5EF4-FFF2-40B4-BE49-F238E27FC236}">
+                <a16:creationId xmlns:a16="http://schemas.microsoft.com/office/drawing/2014/main" id="{8FEEC940-4BFF-956C-713A-1CE73C436B6F}"/>
+              </a:ext>
+            </a:extLst>
+          </p:cNvPr>
+          <p:cNvSpPr>
+            <a:spLocks noGrp="1"/>
+          </p:cNvSpPr>
+          <p:nvPr>
+            <p:ph type="ftr" sz="quarter" idx="11"/>
+          </p:nvPr>
+        </p:nvSpPr>
+        <p:spPr/>
+        <p:txBody>
+          <a:bodyPr/>
+          <a:lstStyle/>
+          <a:p>
+            <a:r>
+              <a:rPr lang="fr-FR"/>
+              <a:t>Cours: Python | Auteur: TUO N. Ismaël Maurice 
+</a:t>
+            </a:r>
+          </a:p>
+        </p:txBody>
+      </p:sp>
+      <p:sp>
+        <p:nvSpPr>
+          <p:cNvPr id="5" name="Espace réservé du numéro de diapositive 4">
+            <a:extLst>
+              <a:ext uri="{FF2B5EF4-FFF2-40B4-BE49-F238E27FC236}">
+                <a16:creationId xmlns:a16="http://schemas.microsoft.com/office/drawing/2014/main" id="{CE50FB16-F89F-D7CA-C6AA-CFC075094990}"/>
+              </a:ext>
+            </a:extLst>
+          </p:cNvPr>
+          <p:cNvSpPr>
+            <a:spLocks noGrp="1"/>
+          </p:cNvSpPr>
+          <p:nvPr>
+            <p:ph type="sldNum" sz="quarter" idx="12"/>
+          </p:nvPr>
+        </p:nvSpPr>
+        <p:spPr/>
+        <p:txBody>
+          <a:bodyPr/>
+          <a:lstStyle/>
+          <a:p>
+            <a:fld id="{B8C3BB88-DD29-4D42-B62E-D7D541DB4348}" type="slidenum">
+              <a:rPr lang="fr-FR" smtClean="0"/>
+              <a:t>20</a:t>
+            </a:fld>
+            <a:endParaRPr lang="fr-FR"/>
+          </a:p>
+        </p:txBody>
+      </p:sp>
+      <p:sp>
+        <p:nvSpPr>
+          <p:cNvPr id="6" name="ZoneTexte 5">
+            <a:extLst>
+              <a:ext uri="{FF2B5EF4-FFF2-40B4-BE49-F238E27FC236}">
+                <a16:creationId xmlns:a16="http://schemas.microsoft.com/office/drawing/2014/main" id="{84F10693-2FE8-EFC8-8DB6-84BFD181D260}"/>
+              </a:ext>
+            </a:extLst>
+          </p:cNvPr>
+          <p:cNvSpPr txBox="1"/>
+          <p:nvPr/>
+        </p:nvSpPr>
+        <p:spPr>
+          <a:xfrm>
+            <a:off x="397564" y="218526"/>
+            <a:ext cx="5795005" cy="461665"/>
+          </a:xfrm>
+          <a:prstGeom prst="rect">
+            <a:avLst/>
+          </a:prstGeom>
+          <a:noFill/>
+        </p:spPr>
+        <p:txBody>
+          <a:bodyPr wrap="square" rtlCol="0">
+            <a:spAutoFit/>
+          </a:bodyPr>
+          <a:lstStyle/>
+          <a:p>
+            <a:r>
+              <a:rPr lang="fr-FR" sz="2400" b="1" dirty="0">
+                <a:latin typeface="Times New Roman" panose="02020603050405020304" pitchFamily="18" charset="0"/>
+                <a:cs typeface="Times New Roman" panose="02020603050405020304" pitchFamily="18" charset="0"/>
+              </a:rPr>
+              <a:t>Exercices</a:t>
+            </a:r>
+          </a:p>
+        </p:txBody>
+      </p:sp>
+      <p:cxnSp>
+        <p:nvCxnSpPr>
+          <p:cNvPr id="3" name="Connecteur droit 2">
+            <a:extLst>
+              <a:ext uri="{FF2B5EF4-FFF2-40B4-BE49-F238E27FC236}">
+                <a16:creationId xmlns:a16="http://schemas.microsoft.com/office/drawing/2014/main" id="{6AC8021D-4898-08B9-18A0-60AC71EF613E}"/>
+              </a:ext>
+            </a:extLst>
+          </p:cNvPr>
+          <p:cNvCxnSpPr>
+            <a:cxnSpLocks/>
+          </p:cNvCxnSpPr>
+          <p:nvPr/>
+        </p:nvCxnSpPr>
+        <p:spPr>
+          <a:xfrm>
+            <a:off x="500932" y="680191"/>
+            <a:ext cx="11178450" cy="0"/>
+          </a:xfrm>
+          <a:prstGeom prst="line">
+            <a:avLst/>
+          </a:prstGeom>
+          <a:ln/>
+        </p:spPr>
+        <p:style>
+          <a:lnRef idx="3">
+            <a:schemeClr val="accent3"/>
+          </a:lnRef>
+          <a:fillRef idx="0">
+            <a:schemeClr val="accent3"/>
+          </a:fillRef>
+          <a:effectRef idx="2">
+            <a:schemeClr val="accent3"/>
+          </a:effectRef>
+          <a:fontRef idx="minor">
+            <a:schemeClr val="tx1"/>
+          </a:fontRef>
+        </p:style>
+      </p:cxnSp>
+      <p:sp>
+        <p:nvSpPr>
+          <p:cNvPr id="2" name="ZoneTexte 1">
+            <a:extLst>
+              <a:ext uri="{FF2B5EF4-FFF2-40B4-BE49-F238E27FC236}">
+                <a16:creationId xmlns:a16="http://schemas.microsoft.com/office/drawing/2014/main" id="{218863FB-835F-3C29-E372-96EEDF5955F7}"/>
+              </a:ext>
+            </a:extLst>
+          </p:cNvPr>
+          <p:cNvSpPr txBox="1"/>
+          <p:nvPr/>
+        </p:nvSpPr>
+        <p:spPr>
+          <a:xfrm>
+            <a:off x="397564" y="840602"/>
+            <a:ext cx="11088982" cy="1323439"/>
+          </a:xfrm>
+          <a:prstGeom prst="rect">
+            <a:avLst/>
+          </a:prstGeom>
+          <a:noFill/>
+        </p:spPr>
+        <p:txBody>
+          <a:bodyPr wrap="square" rtlCol="0">
+            <a:spAutoFit/>
+          </a:bodyPr>
+          <a:lstStyle>
+            <a:defPPr>
+              <a:defRPr lang="en-US"/>
+            </a:defPPr>
+            <a:lvl1pPr>
+              <a:defRPr sz="2000"/>
+            </a:lvl1pPr>
+          </a:lstStyle>
+          <a:p>
+            <a:r>
+              <a:rPr lang="fr-FR" dirty="0">
+                <a:latin typeface="Times New Roman" panose="02020603050405020304" pitchFamily="18" charset="0"/>
+                <a:cs typeface="Times New Roman" panose="02020603050405020304" pitchFamily="18" charset="0"/>
+              </a:rPr>
+              <a:t>L’objectif est d’utiliser l’immuabilité des tuples pour écrire un programme Python qui permettra de déchiffrer/chiffrer un message fourni par un utilisateur avec une clé donnée.</a:t>
+            </a:r>
+          </a:p>
+          <a:p>
+            <a:r>
+              <a:rPr lang="fr-FR" dirty="0">
+                <a:latin typeface="Times New Roman" panose="02020603050405020304" pitchFamily="18" charset="0"/>
+                <a:cs typeface="Times New Roman" panose="02020603050405020304" pitchFamily="18" charset="0"/>
+              </a:rPr>
+              <a:t>Le programme doit pouvoir chiffrer et déchiffrer des messages contenant des lettres majuscules et minuscules ainsi que des nombres.</a:t>
+            </a:r>
+          </a:p>
+        </p:txBody>
+      </p:sp>
+      <p:sp>
+        <p:nvSpPr>
+          <p:cNvPr id="7" name="ZoneTexte 6">
+            <a:extLst>
+              <a:ext uri="{FF2B5EF4-FFF2-40B4-BE49-F238E27FC236}">
+                <a16:creationId xmlns:a16="http://schemas.microsoft.com/office/drawing/2014/main" id="{0013674F-05FF-460F-46AC-C319C49B4842}"/>
+              </a:ext>
+            </a:extLst>
+          </p:cNvPr>
+          <p:cNvSpPr txBox="1"/>
+          <p:nvPr/>
+        </p:nvSpPr>
+        <p:spPr>
+          <a:xfrm>
+            <a:off x="397564" y="2363306"/>
+            <a:ext cx="11088982" cy="1015663"/>
+          </a:xfrm>
+          <a:prstGeom prst="rect">
+            <a:avLst/>
+          </a:prstGeom>
+          <a:noFill/>
+        </p:spPr>
+        <p:txBody>
+          <a:bodyPr wrap="square" rtlCol="0">
+            <a:spAutoFit/>
+          </a:bodyPr>
+          <a:lstStyle>
+            <a:defPPr>
+              <a:defRPr lang="en-US"/>
+            </a:defPPr>
+            <a:lvl1pPr>
+              <a:defRPr sz="2000"/>
+            </a:lvl1pPr>
+          </a:lstStyle>
+          <a:p>
+            <a:r>
+              <a:rPr lang="fr-FR" dirty="0">
+                <a:latin typeface="Times New Roman" panose="02020603050405020304" pitchFamily="18" charset="0"/>
+                <a:cs typeface="Times New Roman" panose="02020603050405020304" pitchFamily="18" charset="0"/>
+              </a:rPr>
+              <a:t>Lorsque le programme démarre, l’utilisateur doit choisir quel type d’opération il veut réaliser (chiffrement ou déchiffrement). Ensuite il doit saisir le texte qu’il veut chiffrer et la clé.</a:t>
+            </a:r>
+          </a:p>
+          <a:p>
+            <a:r>
+              <a:rPr lang="fr-FR" dirty="0">
+                <a:latin typeface="Times New Roman" panose="02020603050405020304" pitchFamily="18" charset="0"/>
+                <a:cs typeface="Times New Roman" panose="02020603050405020304" pitchFamily="18" charset="0"/>
+              </a:rPr>
+              <a:t>Le programme doit afficher le résultat de l’opération.</a:t>
+            </a:r>
+          </a:p>
+        </p:txBody>
+      </p:sp>
+      <p:sp>
+        <p:nvSpPr>
+          <p:cNvPr id="12" name="ZoneTexte 11">
+            <a:extLst>
+              <a:ext uri="{FF2B5EF4-FFF2-40B4-BE49-F238E27FC236}">
+                <a16:creationId xmlns:a16="http://schemas.microsoft.com/office/drawing/2014/main" id="{D6DD0778-C36E-1EA9-42D5-2CDADF55E9F7}"/>
+              </a:ext>
+            </a:extLst>
+          </p:cNvPr>
+          <p:cNvSpPr txBox="1"/>
+          <p:nvPr/>
+        </p:nvSpPr>
+        <p:spPr>
+          <a:xfrm>
+            <a:off x="397564" y="3522138"/>
+            <a:ext cx="11088982" cy="400110"/>
+          </a:xfrm>
+          <a:prstGeom prst="rect">
+            <a:avLst/>
+          </a:prstGeom>
+          <a:noFill/>
+        </p:spPr>
+        <p:txBody>
+          <a:bodyPr wrap="square" rtlCol="0">
+            <a:spAutoFit/>
+          </a:bodyPr>
+          <a:lstStyle>
+            <a:defPPr>
+              <a:defRPr lang="en-US"/>
+            </a:defPPr>
+            <a:lvl1pPr>
+              <a:defRPr sz="2000"/>
+            </a:lvl1pPr>
+          </a:lstStyle>
+          <a:p>
+            <a:r>
+              <a:rPr lang="fr-FR" dirty="0">
+                <a:latin typeface="Times New Roman" panose="02020603050405020304" pitchFamily="18" charset="0"/>
+                <a:cs typeface="Times New Roman" panose="02020603050405020304" pitchFamily="18" charset="0"/>
+              </a:rPr>
+              <a:t>Ci-dessous un exemple d’exécution (votre version peut être différente):</a:t>
+            </a:r>
+          </a:p>
+        </p:txBody>
+      </p:sp>
+      <p:pic>
+        <p:nvPicPr>
+          <p:cNvPr id="13" name="Image 12">
+            <a:extLst>
+              <a:ext uri="{FF2B5EF4-FFF2-40B4-BE49-F238E27FC236}">
+                <a16:creationId xmlns:a16="http://schemas.microsoft.com/office/drawing/2014/main" id="{1CCF12D0-7CE0-76AA-E98F-C35B69CCC68F}"/>
+              </a:ext>
+            </a:extLst>
+          </p:cNvPr>
+          <p:cNvPicPr>
+            <a:picLocks noChangeAspect="1"/>
+          </p:cNvPicPr>
+          <p:nvPr/>
+        </p:nvPicPr>
+        <p:blipFill>
+          <a:blip r:embed="rId2"/>
+          <a:stretch>
+            <a:fillRect/>
+          </a:stretch>
+        </p:blipFill>
+        <p:spPr>
+          <a:xfrm>
+            <a:off x="727269" y="4065417"/>
+            <a:ext cx="3899052" cy="2170791"/>
+          </a:xfrm>
+          <a:prstGeom prst="rect">
+            <a:avLst/>
+          </a:prstGeom>
+        </p:spPr>
+      </p:pic>
+      <p:pic>
+        <p:nvPicPr>
+          <p:cNvPr id="14" name="Image 13">
+            <a:extLst>
+              <a:ext uri="{FF2B5EF4-FFF2-40B4-BE49-F238E27FC236}">
+                <a16:creationId xmlns:a16="http://schemas.microsoft.com/office/drawing/2014/main" id="{A10C9E07-D42D-46F7-F5F9-9EFF8FF9FA9D}"/>
+              </a:ext>
+            </a:extLst>
+          </p:cNvPr>
+          <p:cNvPicPr>
+            <a:picLocks noChangeAspect="1"/>
+          </p:cNvPicPr>
+          <p:nvPr/>
+        </p:nvPicPr>
+        <p:blipFill>
+          <a:blip r:embed="rId3"/>
+          <a:stretch>
+            <a:fillRect/>
+          </a:stretch>
+        </p:blipFill>
+        <p:spPr>
+          <a:xfrm>
+            <a:off x="5494276" y="4078522"/>
+            <a:ext cx="3635880" cy="2157686"/>
+          </a:xfrm>
+          <a:prstGeom prst="rect">
+            <a:avLst/>
+          </a:prstGeom>
+        </p:spPr>
+      </p:pic>
+    </p:spTree>
+    <p:extLst>
+      <p:ext uri="{BB962C8B-B14F-4D97-AF65-F5344CB8AC3E}">
+        <p14:creationId xmlns:p14="http://schemas.microsoft.com/office/powerpoint/2010/main" val="88089300"/>
+      </p:ext>
+    </p:extLst>
+  </p:cSld>
+  <p:clrMapOvr>
+    <a:masterClrMapping/>
+  </p:clrMapOvr>
+</p:sld>
+</file>
+
+<file path=ppt/slides/slide21.xml><?xml version="1.0" encoding="utf-8"?>
 <p:sld xmlns:a="http://schemas.openxmlformats.org/drawingml/2006/main" xmlns:r="http://schemas.openxmlformats.org/officeDocument/2006/relationships" xmlns:p="http://schemas.openxmlformats.org/presentationml/2006/main">
   <p:cSld>
     <p:spTree>
@@ -6205,237 +8124,6 @@
       <p:bldP spid="6" grpId="0" animBg="1"/>
     </p:bldLst>
   </p:timing>
-</p:sld>
-</file>
-
-<file path=ppt/slides/slide2.xml><?xml version="1.0" encoding="utf-8"?>
-<p:sld xmlns:a="http://schemas.openxmlformats.org/drawingml/2006/main" xmlns:r="http://schemas.openxmlformats.org/officeDocument/2006/relationships" xmlns:p="http://schemas.openxmlformats.org/presentationml/2006/main">
-  <p:cSld>
-    <p:spTree>
-      <p:nvGrpSpPr>
-        <p:cNvPr id="1" name=""/>
-        <p:cNvGrpSpPr/>
-        <p:nvPr/>
-      </p:nvGrpSpPr>
-      <p:grpSpPr>
-        <a:xfrm>
-          <a:off x="0" y="0"/>
-          <a:ext cx="0" cy="0"/>
-          <a:chOff x="0" y="0"/>
-          <a:chExt cx="0" cy="0"/>
-        </a:xfrm>
-      </p:grpSpPr>
-      <p:sp>
-        <p:nvSpPr>
-          <p:cNvPr id="4" name="Espace réservé du pied de page 3">
-            <a:extLst>
-              <a:ext uri="{FF2B5EF4-FFF2-40B4-BE49-F238E27FC236}">
-                <a16:creationId xmlns:a16="http://schemas.microsoft.com/office/drawing/2014/main" id="{8FEEC940-4BFF-956C-713A-1CE73C436B6F}"/>
-              </a:ext>
-            </a:extLst>
-          </p:cNvPr>
-          <p:cNvSpPr>
-            <a:spLocks noGrp="1"/>
-          </p:cNvSpPr>
-          <p:nvPr>
-            <p:ph type="ftr" sz="quarter" idx="11"/>
-          </p:nvPr>
-        </p:nvSpPr>
-        <p:spPr/>
-        <p:txBody>
-          <a:bodyPr/>
-          <a:lstStyle/>
-          <a:p>
-            <a:r>
-              <a:rPr lang="fr-FR"/>
-              <a:t>Cours: Python | Auteur: TUO N. Ismaël Maurice 
-</a:t>
-            </a:r>
-            <a:endParaRPr lang="fr-FR" dirty="0"/>
-          </a:p>
-        </p:txBody>
-      </p:sp>
-      <p:sp>
-        <p:nvSpPr>
-          <p:cNvPr id="5" name="Espace réservé du numéro de diapositive 4">
-            <a:extLst>
-              <a:ext uri="{FF2B5EF4-FFF2-40B4-BE49-F238E27FC236}">
-                <a16:creationId xmlns:a16="http://schemas.microsoft.com/office/drawing/2014/main" id="{CE50FB16-F89F-D7CA-C6AA-CFC075094990}"/>
-              </a:ext>
-            </a:extLst>
-          </p:cNvPr>
-          <p:cNvSpPr>
-            <a:spLocks noGrp="1"/>
-          </p:cNvSpPr>
-          <p:nvPr>
-            <p:ph type="sldNum" sz="quarter" idx="12"/>
-          </p:nvPr>
-        </p:nvSpPr>
-        <p:spPr/>
-        <p:txBody>
-          <a:bodyPr/>
-          <a:lstStyle/>
-          <a:p>
-            <a:fld id="{B8C3BB88-DD29-4D42-B62E-D7D541DB4348}" type="slidenum">
-              <a:rPr lang="fr-FR" smtClean="0"/>
-              <a:t>2</a:t>
-            </a:fld>
-            <a:endParaRPr lang="fr-FR" dirty="0"/>
-          </a:p>
-        </p:txBody>
-      </p:sp>
-      <p:sp>
-        <p:nvSpPr>
-          <p:cNvPr id="6" name="ZoneTexte 5">
-            <a:extLst>
-              <a:ext uri="{FF2B5EF4-FFF2-40B4-BE49-F238E27FC236}">
-                <a16:creationId xmlns:a16="http://schemas.microsoft.com/office/drawing/2014/main" id="{84F10693-2FE8-EFC8-8DB6-84BFD181D260}"/>
-              </a:ext>
-            </a:extLst>
-          </p:cNvPr>
-          <p:cNvSpPr txBox="1"/>
-          <p:nvPr/>
-        </p:nvSpPr>
-        <p:spPr>
-          <a:xfrm>
-            <a:off x="397565" y="95416"/>
-            <a:ext cx="3069204" cy="523220"/>
-          </a:xfrm>
-          <a:prstGeom prst="rect">
-            <a:avLst/>
-          </a:prstGeom>
-          <a:noFill/>
-        </p:spPr>
-        <p:txBody>
-          <a:bodyPr wrap="square" rtlCol="0">
-            <a:spAutoFit/>
-          </a:bodyPr>
-          <a:lstStyle/>
-          <a:p>
-            <a:r>
-              <a:rPr lang="fr-FR" sz="2800" b="1" dirty="0">
-                <a:latin typeface="Times New Roman" panose="02020603050405020304" pitchFamily="18" charset="0"/>
-                <a:cs typeface="Times New Roman" panose="02020603050405020304" pitchFamily="18" charset="0"/>
-              </a:rPr>
-              <a:t>Sommaire</a:t>
-            </a:r>
-          </a:p>
-        </p:txBody>
-      </p:sp>
-      <p:sp>
-        <p:nvSpPr>
-          <p:cNvPr id="11" name="ZoneTexte 10">
-            <a:extLst>
-              <a:ext uri="{FF2B5EF4-FFF2-40B4-BE49-F238E27FC236}">
-                <a16:creationId xmlns:a16="http://schemas.microsoft.com/office/drawing/2014/main" id="{C27A3656-3CB0-8161-AE9F-B92FBE4F5083}"/>
-              </a:ext>
-            </a:extLst>
-          </p:cNvPr>
-          <p:cNvSpPr txBox="1"/>
-          <p:nvPr/>
-        </p:nvSpPr>
-        <p:spPr>
-          <a:xfrm>
-            <a:off x="397565" y="948002"/>
-            <a:ext cx="9192515" cy="830997"/>
-          </a:xfrm>
-          <a:prstGeom prst="rect">
-            <a:avLst/>
-          </a:prstGeom>
-          <a:noFill/>
-        </p:spPr>
-        <p:txBody>
-          <a:bodyPr wrap="square" rtlCol="0">
-            <a:spAutoFit/>
-          </a:bodyPr>
-          <a:lstStyle/>
-          <a:p>
-            <a:pPr marL="342900" indent="-342900">
-              <a:buFont typeface="+mj-lt"/>
-              <a:buAutoNum type="arabicPeriod"/>
-            </a:pPr>
-            <a:r>
-              <a:rPr lang="fr-FR" sz="2400" dirty="0">
-                <a:latin typeface="Times New Roman" panose="02020603050405020304" pitchFamily="18" charset="0"/>
-                <a:cs typeface="Times New Roman" panose="02020603050405020304" pitchFamily="18" charset="0"/>
-                <a:hlinkClick r:id="rId2" action="ppaction://hlinksldjump"/>
-              </a:rPr>
-              <a:t>Définition</a:t>
-            </a:r>
-            <a:endParaRPr lang="fr-FR" sz="2400" dirty="0">
-              <a:latin typeface="Times New Roman" panose="02020603050405020304" pitchFamily="18" charset="0"/>
-              <a:cs typeface="Times New Roman" panose="02020603050405020304" pitchFamily="18" charset="0"/>
-            </a:endParaRPr>
-          </a:p>
-          <a:p>
-            <a:pPr marL="342900" indent="-342900">
-              <a:buFont typeface="+mj-lt"/>
-              <a:buAutoNum type="arabicPeriod"/>
-            </a:pPr>
-            <a:r>
-              <a:rPr lang="fr-FR" sz="2400" dirty="0">
-                <a:latin typeface="Times New Roman" panose="02020603050405020304" pitchFamily="18" charset="0"/>
-                <a:cs typeface="Times New Roman" panose="02020603050405020304" pitchFamily="18" charset="0"/>
-                <a:hlinkClick r:id="rId3" action="ppaction://hlinksldjump"/>
-              </a:rPr>
-              <a:t>Exercices</a:t>
-            </a:r>
-            <a:endParaRPr lang="fr-FR" sz="2400" dirty="0">
-              <a:latin typeface="Times New Roman" panose="02020603050405020304" pitchFamily="18" charset="0"/>
-              <a:cs typeface="Times New Roman" panose="02020603050405020304" pitchFamily="18" charset="0"/>
-            </a:endParaRPr>
-          </a:p>
-        </p:txBody>
-      </p:sp>
-      <p:cxnSp>
-        <p:nvCxnSpPr>
-          <p:cNvPr id="3" name="Connecteur droit 2">
-            <a:extLst>
-              <a:ext uri="{FF2B5EF4-FFF2-40B4-BE49-F238E27FC236}">
-                <a16:creationId xmlns:a16="http://schemas.microsoft.com/office/drawing/2014/main" id="{F5400574-BA21-AA27-C7D0-975B208CF325}"/>
-              </a:ext>
-            </a:extLst>
-          </p:cNvPr>
-          <p:cNvCxnSpPr>
-            <a:cxnSpLocks/>
-          </p:cNvCxnSpPr>
-          <p:nvPr/>
-        </p:nvCxnSpPr>
-        <p:spPr>
-          <a:xfrm>
-            <a:off x="500932" y="680191"/>
-            <a:ext cx="11178450" cy="0"/>
-          </a:xfrm>
-          <a:prstGeom prst="line">
-            <a:avLst/>
-          </a:prstGeom>
-          <a:ln/>
-        </p:spPr>
-        <p:style>
-          <a:lnRef idx="3">
-            <a:schemeClr val="accent3"/>
-          </a:lnRef>
-          <a:fillRef idx="0">
-            <a:schemeClr val="accent3"/>
-          </a:fillRef>
-          <a:effectRef idx="2">
-            <a:schemeClr val="accent3"/>
-          </a:effectRef>
-          <a:fontRef idx="minor">
-            <a:schemeClr val="tx1"/>
-          </a:fontRef>
-        </p:style>
-      </p:cxnSp>
-    </p:spTree>
-    <p:extLst>
-      <p:ext uri="{BB962C8B-B14F-4D97-AF65-F5344CB8AC3E}">
-        <p14:creationId xmlns:p14="http://schemas.microsoft.com/office/powerpoint/2010/main" val="1268069196"/>
-      </p:ext>
-    </p:extLst>
-  </p:cSld>
-  <p:clrMapOvr>
-    <a:masterClrMapping/>
-  </p:clrMapOvr>
 </p:sld>
 </file>
 

</xml_diff>

<commit_message>
Fix: Correction des fautes exercices
</commit_message>
<xml_diff>
--- a/source/Chapitre 10 - Les tuples.pptx
+++ b/source/Chapitre 10 - Les tuples.pptx
@@ -138,7 +138,7 @@
 <file path=ppt/revisionInfo.xml><?xml version="1.0" encoding="utf-8"?>
 <p1510:revInfo xmlns:a="http://schemas.openxmlformats.org/drawingml/2006/main" xmlns:r="http://schemas.openxmlformats.org/officeDocument/2006/relationships" xmlns:p1510="http://schemas.microsoft.com/office/powerpoint/2015/10/main">
   <p1510:revLst>
-    <p1510:client id="{20AE7FCD-B62D-499A-891E-30FD03C16E0C}" v="17" dt="2024-03-22T14:13:03.807"/>
+    <p1510:client id="{20AE7FCD-B62D-499A-891E-30FD03C16E0C}" v="19" dt="2024-05-22T16:21:49.107"/>
   </p1510:revLst>
 </p1510:revInfo>
 </file>
@@ -148,7 +148,7 @@
   <pc:docChgLst>
     <pc:chgData name="Ismaël Tuo" userId="fca7baf0e513a1e6" providerId="LiveId" clId="{20AE7FCD-B62D-499A-891E-30FD03C16E0C}"/>
     <pc:docChg chg="custSel addSld delSld modSld sldOrd">
-      <pc:chgData name="Ismaël Tuo" userId="fca7baf0e513a1e6" providerId="LiveId" clId="{20AE7FCD-B62D-499A-891E-30FD03C16E0C}" dt="2024-03-22T14:17:01.220" v="1060" actId="20577"/>
+      <pc:chgData name="Ismaël Tuo" userId="fca7baf0e513a1e6" providerId="LiveId" clId="{20AE7FCD-B62D-499A-891E-30FD03C16E0C}" dt="2024-05-22T16:21:49.107" v="1062"/>
       <pc:docMkLst>
         <pc:docMk/>
       </pc:docMkLst>
@@ -503,7 +503,7 @@
         </pc:spChg>
       </pc:sldChg>
       <pc:sldChg chg="addSp delSp modSp add mod">
-        <pc:chgData name="Ismaël Tuo" userId="fca7baf0e513a1e6" providerId="LiveId" clId="{20AE7FCD-B62D-499A-891E-30FD03C16E0C}" dt="2024-03-22T14:04:07.869" v="648"/>
+        <pc:chgData name="Ismaël Tuo" userId="fca7baf0e513a1e6" providerId="LiveId" clId="{20AE7FCD-B62D-499A-891E-30FD03C16E0C}" dt="2024-05-22T16:21:49.107" v="1062"/>
         <pc:sldMkLst>
           <pc:docMk/>
           <pc:sldMk cId="1218833506" sldId="309"/>
@@ -549,7 +549,7 @@
           </ac:spMkLst>
         </pc:spChg>
         <pc:spChg chg="add mod">
-          <ac:chgData name="Ismaël Tuo" userId="fca7baf0e513a1e6" providerId="LiveId" clId="{20AE7FCD-B62D-499A-891E-30FD03C16E0C}" dt="2024-03-22T14:04:07.869" v="648"/>
+          <ac:chgData name="Ismaël Tuo" userId="fca7baf0e513a1e6" providerId="LiveId" clId="{20AE7FCD-B62D-499A-891E-30FD03C16E0C}" dt="2024-05-22T16:21:49.107" v="1062"/>
           <ac:spMkLst>
             <pc:docMk/>
             <pc:sldMk cId="1218833506" sldId="309"/>
@@ -723,7 +723,7 @@
           <a:p>
             <a:fld id="{5D1B8971-FAD5-A544-A565-5C81831E2E08}" type="datetimeFigureOut">
               <a:rPr lang="fr-FR" smtClean="0"/>
-              <a:t>22/03/2024</a:t>
+              <a:t>22/05/2024</a:t>
             </a:fld>
             <a:endParaRPr lang="fr-FR"/>
           </a:p>
@@ -1153,7 +1153,7 @@
           <a:p>
             <a:fld id="{446AF453-C717-E044-9B61-C449088DBB9F}" type="datetime1">
               <a:rPr lang="fr-FR" smtClean="0"/>
-              <a:t>22/03/2024</a:t>
+              <a:t>22/05/2024</a:t>
             </a:fld>
             <a:endParaRPr lang="fr-FR"/>
           </a:p>
@@ -1327,7 +1327,7 @@
           <a:p>
             <a:fld id="{0AD74B8B-4B66-A54B-A7E1-EB9F6C09CE67}" type="datetime1">
               <a:rPr lang="fr-FR" smtClean="0"/>
-              <a:t>22/03/2024</a:t>
+              <a:t>22/05/2024</a:t>
             </a:fld>
             <a:endParaRPr lang="fr-FR"/>
           </a:p>
@@ -1511,7 +1511,7 @@
           <a:p>
             <a:fld id="{9584F9F2-42A0-CD42-8013-986AEAF97421}" type="datetime1">
               <a:rPr lang="fr-FR" smtClean="0"/>
-              <a:t>22/03/2024</a:t>
+              <a:t>22/05/2024</a:t>
             </a:fld>
             <a:endParaRPr lang="fr-FR"/>
           </a:p>
@@ -1685,7 +1685,7 @@
           <a:p>
             <a:fld id="{DAB9BD9F-3179-BB4C-96AB-C40862581685}" type="datetime1">
               <a:rPr lang="fr-FR" smtClean="0"/>
-              <a:t>22/03/2024</a:t>
+              <a:t>22/05/2024</a:t>
             </a:fld>
             <a:endParaRPr lang="fr-FR"/>
           </a:p>
@@ -1957,7 +1957,7 @@
           <a:p>
             <a:fld id="{A664DE96-64FF-BC43-8A9C-18ED43A528D6}" type="datetime1">
               <a:rPr lang="fr-FR" smtClean="0"/>
-              <a:t>22/03/2024</a:t>
+              <a:t>22/05/2024</a:t>
             </a:fld>
             <a:endParaRPr lang="fr-FR"/>
           </a:p>
@@ -2193,7 +2193,7 @@
           <a:p>
             <a:fld id="{2C8FE800-9F9B-1C4F-A1CD-9EF46842C4CA}" type="datetime1">
               <a:rPr lang="fr-FR" smtClean="0"/>
-              <a:t>22/03/2024</a:t>
+              <a:t>22/05/2024</a:t>
             </a:fld>
             <a:endParaRPr lang="fr-FR"/>
           </a:p>
@@ -2556,7 +2556,7 @@
           <a:p>
             <a:fld id="{0F7DED4E-8CB4-EF40-A349-EFC02EC7784E}" type="datetime1">
               <a:rPr lang="fr-FR" smtClean="0"/>
-              <a:t>22/03/2024</a:t>
+              <a:t>22/05/2024</a:t>
             </a:fld>
             <a:endParaRPr lang="fr-FR"/>
           </a:p>
@@ -2701,7 +2701,7 @@
           <a:p>
             <a:fld id="{5BB88D77-E8A2-E24F-81D2-817E60779F3E}" type="datetime1">
               <a:rPr lang="fr-FR" smtClean="0"/>
-              <a:t>22/03/2024</a:t>
+              <a:t>22/05/2024</a:t>
             </a:fld>
             <a:endParaRPr lang="fr-FR"/>
           </a:p>
@@ -2800,7 +2800,7 @@
           <a:p>
             <a:fld id="{817F964E-5B57-884A-A1B8-925BFA5276AF}" type="datetime1">
               <a:rPr lang="fr-FR" smtClean="0"/>
-              <a:t>22/03/2024</a:t>
+              <a:t>22/05/2024</a:t>
             </a:fld>
             <a:endParaRPr lang="fr-FR"/>
           </a:p>
@@ -3161,7 +3161,7 @@
           <a:p>
             <a:fld id="{D5636CD0-A2E6-1543-A0E5-C829C16FEE55}" type="datetime1">
               <a:rPr lang="fr-FR" smtClean="0"/>
-              <a:t>22/03/2024</a:t>
+              <a:t>22/05/2024</a:t>
             </a:fld>
             <a:endParaRPr lang="fr-FR"/>
           </a:p>
@@ -3522,7 +3522,7 @@
           <a:p>
             <a:fld id="{CEE5CE4A-5B1A-1846-BA66-722BDB7A9525}" type="datetime1">
               <a:rPr lang="fr-FR" smtClean="0"/>
-              <a:t>22/03/2024</a:t>
+              <a:t>22/05/2024</a:t>
             </a:fld>
             <a:endParaRPr lang="fr-FR"/>
           </a:p>
@@ -3769,7 +3769,7 @@
           <a:p>
             <a:fld id="{55A13D9C-CA6E-9C45-8634-4423EBFFD553}" type="datetime1">
               <a:rPr lang="fr-FR" smtClean="0"/>
-              <a:t>22/03/2024</a:t>
+              <a:t>22/05/2024</a:t>
             </a:fld>
             <a:endParaRPr lang="fr-FR"/>
           </a:p>
@@ -6998,8 +6998,8 @@
           </a:p>
         </p:txBody>
       </p:sp>
-      <mc:AlternateContent xmlns:mc="http://schemas.openxmlformats.org/markup-compatibility/2006">
-        <mc:Choice xmlns:a14="http://schemas.microsoft.com/office/drawing/2010/main" Requires="a14">
+      <mc:AlternateContent xmlns:mc="http://schemas.openxmlformats.org/markup-compatibility/2006" xmlns:a14="http://schemas.microsoft.com/office/drawing/2010/main">
+        <mc:Choice Requires="a14">
           <p:sp>
             <p:nvSpPr>
               <p:cNvPr id="10" name="ZoneTexte 9">
@@ -7163,7 +7163,7 @@
             </p:txBody>
           </p:sp>
         </mc:Choice>
-        <mc:Fallback>
+        <mc:Fallback xmlns="">
           <p:sp>
             <p:nvSpPr>
               <p:cNvPr id="10" name="ZoneTexte 9">
@@ -7286,8 +7286,19 @@
                     <a:latin typeface="Times New Roman" panose="02020603050405020304" pitchFamily="18" charset="0"/>
                     <a:cs typeface="Times New Roman" panose="02020603050405020304" pitchFamily="18" charset="0"/>
                   </a:rPr>
-                  <a:t> caractères avant la lettre dans l’alphabet.</a:t>
+                  <a:t> caractères avant la lettre dans l’alphabet. </a:t>
                 </a:r>
+                <a:r>
+                  <a:rPr lang="fr-FR" b="1" dirty="0">
+                    <a:latin typeface="Times New Roman" panose="02020603050405020304" pitchFamily="18" charset="0"/>
+                    <a:cs typeface="Times New Roman" panose="02020603050405020304" pitchFamily="18" charset="0"/>
+                  </a:rPr>
+                  <a:t>Le chiffre de César est aujourd’hui abandonné car non sécurisé.</a:t>
+                </a:r>
+                <a:endParaRPr lang="fr-FR" dirty="0">
+                  <a:latin typeface="Times New Roman" panose="02020603050405020304" pitchFamily="18" charset="0"/>
+                  <a:cs typeface="Times New Roman" panose="02020603050405020304" pitchFamily="18" charset="0"/>
+                </a:endParaRPr>
               </a:p>
             </p:txBody>
           </p:sp>

</xml_diff>

<commit_message>
Feat(mini-projet): Chiffre de Vigenère dans les listes et tuples
</commit_message>
<xml_diff>
--- a/source/Chapitre 10 - Les tuples.pptx
+++ b/source/Chapitre 10 - Les tuples.pptx
@@ -5,7 +5,7 @@
     <p:sldMasterId id="2147483804" r:id="rId1"/>
   </p:sldMasterIdLst>
   <p:notesMasterIdLst>
-    <p:notesMasterId r:id="rId23"/>
+    <p:notesMasterId r:id="rId26"/>
   </p:notesMasterIdLst>
   <p:sldIdLst>
     <p:sldId id="257" r:id="rId2"/>
@@ -28,7 +28,10 @@
     <p:sldId id="293" r:id="rId19"/>
     <p:sldId id="309" r:id="rId20"/>
     <p:sldId id="310" r:id="rId21"/>
-    <p:sldId id="284" r:id="rId22"/>
+    <p:sldId id="311" r:id="rId22"/>
+    <p:sldId id="323" r:id="rId23"/>
+    <p:sldId id="324" r:id="rId24"/>
+    <p:sldId id="284" r:id="rId25"/>
   </p:sldIdLst>
   <p:sldSz cx="12192000" cy="6858000"/>
   <p:notesSz cx="6858000" cy="9144000"/>
@@ -138,13 +141,75 @@
 <file path=ppt/revisionInfo.xml><?xml version="1.0" encoding="utf-8"?>
 <p1510:revInfo xmlns:a="http://schemas.openxmlformats.org/drawingml/2006/main" xmlns:r="http://schemas.openxmlformats.org/officeDocument/2006/relationships" xmlns:p1510="http://schemas.microsoft.com/office/powerpoint/2015/10/main">
   <p1510:revLst>
-    <p1510:client id="{20AE7FCD-B62D-499A-891E-30FD03C16E0C}" v="19" dt="2024-05-22T16:21:49.107"/>
+    <p1510:client id="{C24C7611-574E-4CC7-94C7-E5F5155FBBAC}" v="1" dt="2024-09-21T08:08:26.630"/>
   </p1510:revLst>
 </p1510:revInfo>
 </file>
 
 <file path=ppt/changesInfos/changesInfo1.xml><?xml version="1.0" encoding="utf-8"?>
 <pc:chgInfo xmlns:a="http://schemas.openxmlformats.org/drawingml/2006/main" xmlns:r="http://schemas.openxmlformats.org/officeDocument/2006/relationships" xmlns:ac="http://schemas.microsoft.com/office/drawing/2013/main/command" xmlns:pc="http://schemas.microsoft.com/office/powerpoint/2013/main/command">
+  <pc:docChgLst>
+    <pc:chgData name="Ismaël Tuo" userId="fca7baf0e513a1e6" providerId="LiveId" clId="{C24C7611-574E-4CC7-94C7-E5F5155FBBAC}"/>
+    <pc:docChg chg="modSld">
+      <pc:chgData name="Ismaël Tuo" userId="fca7baf0e513a1e6" providerId="LiveId" clId="{C24C7611-574E-4CC7-94C7-E5F5155FBBAC}" dt="2024-09-21T08:10:28.279" v="10" actId="20577"/>
+      <pc:docMkLst>
+        <pc:docMk/>
+      </pc:docMkLst>
+      <pc:sldChg chg="modSp mod">
+        <pc:chgData name="Ismaël Tuo" userId="fca7baf0e513a1e6" providerId="LiveId" clId="{C24C7611-574E-4CC7-94C7-E5F5155FBBAC}" dt="2024-09-21T08:08:30.813" v="1" actId="20577"/>
+        <pc:sldMkLst>
+          <pc:docMk/>
+          <pc:sldMk cId="2204220729" sldId="311"/>
+        </pc:sldMkLst>
+        <pc:spChg chg="mod">
+          <ac:chgData name="Ismaël Tuo" userId="fca7baf0e513a1e6" providerId="LiveId" clId="{C24C7611-574E-4CC7-94C7-E5F5155FBBAC}" dt="2024-09-21T08:08:30.813" v="1" actId="20577"/>
+          <ac:spMkLst>
+            <pc:docMk/>
+            <pc:sldMk cId="2204220729" sldId="311"/>
+            <ac:spMk id="2" creationId="{598CC1F4-92B5-97D6-5630-8A3701211AA4}"/>
+          </ac:spMkLst>
+        </pc:spChg>
+      </pc:sldChg>
+      <pc:sldChg chg="modSp mod">
+        <pc:chgData name="Ismaël Tuo" userId="fca7baf0e513a1e6" providerId="LiveId" clId="{C24C7611-574E-4CC7-94C7-E5F5155FBBAC}" dt="2024-09-21T08:08:35.519" v="3" actId="20577"/>
+        <pc:sldMkLst>
+          <pc:docMk/>
+          <pc:sldMk cId="1835164876" sldId="323"/>
+        </pc:sldMkLst>
+        <pc:spChg chg="mod">
+          <ac:chgData name="Ismaël Tuo" userId="fca7baf0e513a1e6" providerId="LiveId" clId="{C24C7611-574E-4CC7-94C7-E5F5155FBBAC}" dt="2024-09-21T08:08:35.519" v="3" actId="20577"/>
+          <ac:spMkLst>
+            <pc:docMk/>
+            <pc:sldMk cId="1835164876" sldId="323"/>
+            <ac:spMk id="2" creationId="{598CC1F4-92B5-97D6-5630-8A3701211AA4}"/>
+          </ac:spMkLst>
+        </pc:spChg>
+      </pc:sldChg>
+      <pc:sldChg chg="modSp mod">
+        <pc:chgData name="Ismaël Tuo" userId="fca7baf0e513a1e6" providerId="LiveId" clId="{C24C7611-574E-4CC7-94C7-E5F5155FBBAC}" dt="2024-09-21T08:10:28.279" v="10" actId="20577"/>
+        <pc:sldMkLst>
+          <pc:docMk/>
+          <pc:sldMk cId="864656457" sldId="324"/>
+        </pc:sldMkLst>
+        <pc:spChg chg="mod">
+          <ac:chgData name="Ismaël Tuo" userId="fca7baf0e513a1e6" providerId="LiveId" clId="{C24C7611-574E-4CC7-94C7-E5F5155FBBAC}" dt="2024-09-21T08:10:28.279" v="10" actId="20577"/>
+          <ac:spMkLst>
+            <pc:docMk/>
+            <pc:sldMk cId="864656457" sldId="324"/>
+            <ac:spMk id="7" creationId="{990321CC-02EF-ED64-0AA9-789ED60F60B1}"/>
+          </ac:spMkLst>
+        </pc:spChg>
+        <pc:spChg chg="mod">
+          <ac:chgData name="Ismaël Tuo" userId="fca7baf0e513a1e6" providerId="LiveId" clId="{C24C7611-574E-4CC7-94C7-E5F5155FBBAC}" dt="2024-09-21T08:10:24.855" v="4" actId="1076"/>
+          <ac:spMkLst>
+            <pc:docMk/>
+            <pc:sldMk cId="864656457" sldId="324"/>
+            <ac:spMk id="10" creationId="{24D98DAF-178C-EE92-6768-D47D152A08B6}"/>
+          </ac:spMkLst>
+        </pc:spChg>
+      </pc:sldChg>
+    </pc:docChg>
+  </pc:docChgLst>
   <pc:docChgLst>
     <pc:chgData name="Ismaël Tuo" userId="fca7baf0e513a1e6" providerId="LiveId" clId="{20AE7FCD-B62D-499A-891E-30FD03C16E0C}"/>
     <pc:docChg chg="custSel addSld delSld modSld sldOrd">
@@ -723,7 +788,7 @@
           <a:p>
             <a:fld id="{5D1B8971-FAD5-A544-A565-5C81831E2E08}" type="datetimeFigureOut">
               <a:rPr lang="fr-FR" smtClean="0"/>
-              <a:t>22/05/2024</a:t>
+              <a:t>21/09/2024</a:t>
             </a:fld>
             <a:endParaRPr lang="fr-FR"/>
           </a:p>
@@ -1153,7 +1218,7 @@
           <a:p>
             <a:fld id="{446AF453-C717-E044-9B61-C449088DBB9F}" type="datetime1">
               <a:rPr lang="fr-FR" smtClean="0"/>
-              <a:t>22/05/2024</a:t>
+              <a:t>21/09/2024</a:t>
             </a:fld>
             <a:endParaRPr lang="fr-FR"/>
           </a:p>
@@ -1327,7 +1392,7 @@
           <a:p>
             <a:fld id="{0AD74B8B-4B66-A54B-A7E1-EB9F6C09CE67}" type="datetime1">
               <a:rPr lang="fr-FR" smtClean="0"/>
-              <a:t>22/05/2024</a:t>
+              <a:t>21/09/2024</a:t>
             </a:fld>
             <a:endParaRPr lang="fr-FR"/>
           </a:p>
@@ -1511,7 +1576,7 @@
           <a:p>
             <a:fld id="{9584F9F2-42A0-CD42-8013-986AEAF97421}" type="datetime1">
               <a:rPr lang="fr-FR" smtClean="0"/>
-              <a:t>22/05/2024</a:t>
+              <a:t>21/09/2024</a:t>
             </a:fld>
             <a:endParaRPr lang="fr-FR"/>
           </a:p>
@@ -1685,7 +1750,7 @@
           <a:p>
             <a:fld id="{DAB9BD9F-3179-BB4C-96AB-C40862581685}" type="datetime1">
               <a:rPr lang="fr-FR" smtClean="0"/>
-              <a:t>22/05/2024</a:t>
+              <a:t>21/09/2024</a:t>
             </a:fld>
             <a:endParaRPr lang="fr-FR"/>
           </a:p>
@@ -1957,7 +2022,7 @@
           <a:p>
             <a:fld id="{A664DE96-64FF-BC43-8A9C-18ED43A528D6}" type="datetime1">
               <a:rPr lang="fr-FR" smtClean="0"/>
-              <a:t>22/05/2024</a:t>
+              <a:t>21/09/2024</a:t>
             </a:fld>
             <a:endParaRPr lang="fr-FR"/>
           </a:p>
@@ -2193,7 +2258,7 @@
           <a:p>
             <a:fld id="{2C8FE800-9F9B-1C4F-A1CD-9EF46842C4CA}" type="datetime1">
               <a:rPr lang="fr-FR" smtClean="0"/>
-              <a:t>22/05/2024</a:t>
+              <a:t>21/09/2024</a:t>
             </a:fld>
             <a:endParaRPr lang="fr-FR"/>
           </a:p>
@@ -2556,7 +2621,7 @@
           <a:p>
             <a:fld id="{0F7DED4E-8CB4-EF40-A349-EFC02EC7784E}" type="datetime1">
               <a:rPr lang="fr-FR" smtClean="0"/>
-              <a:t>22/05/2024</a:t>
+              <a:t>21/09/2024</a:t>
             </a:fld>
             <a:endParaRPr lang="fr-FR"/>
           </a:p>
@@ -2701,7 +2766,7 @@
           <a:p>
             <a:fld id="{5BB88D77-E8A2-E24F-81D2-817E60779F3E}" type="datetime1">
               <a:rPr lang="fr-FR" smtClean="0"/>
-              <a:t>22/05/2024</a:t>
+              <a:t>21/09/2024</a:t>
             </a:fld>
             <a:endParaRPr lang="fr-FR"/>
           </a:p>
@@ -2800,7 +2865,7 @@
           <a:p>
             <a:fld id="{817F964E-5B57-884A-A1B8-925BFA5276AF}" type="datetime1">
               <a:rPr lang="fr-FR" smtClean="0"/>
-              <a:t>22/05/2024</a:t>
+              <a:t>21/09/2024</a:t>
             </a:fld>
             <a:endParaRPr lang="fr-FR"/>
           </a:p>
@@ -3161,7 +3226,7 @@
           <a:p>
             <a:fld id="{D5636CD0-A2E6-1543-A0E5-C829C16FEE55}" type="datetime1">
               <a:rPr lang="fr-FR" smtClean="0"/>
-              <a:t>22/05/2024</a:t>
+              <a:t>21/09/2024</a:t>
             </a:fld>
             <a:endParaRPr lang="fr-FR"/>
           </a:p>
@@ -3522,7 +3587,7 @@
           <a:p>
             <a:fld id="{CEE5CE4A-5B1A-1846-BA66-722BDB7A9525}" type="datetime1">
               <a:rPr lang="fr-FR" smtClean="0"/>
-              <a:t>22/05/2024</a:t>
+              <a:t>21/09/2024</a:t>
             </a:fld>
             <a:endParaRPr lang="fr-FR"/>
           </a:p>
@@ -3769,7 +3834,7 @@
           <a:p>
             <a:fld id="{55A13D9C-CA6E-9C45-8634-4423EBFFD553}" type="datetime1">
               <a:rPr lang="fr-FR" smtClean="0"/>
-              <a:t>22/05/2024</a:t>
+              <a:t>21/09/2024</a:t>
             </a:fld>
             <a:endParaRPr lang="fr-FR"/>
           </a:p>
@@ -7208,8 +7273,8 @@
           </p:sp>
         </mc:Fallback>
       </mc:AlternateContent>
-      <mc:AlternateContent xmlns:mc="http://schemas.openxmlformats.org/markup-compatibility/2006">
-        <mc:Choice xmlns:a14="http://schemas.microsoft.com/office/drawing/2010/main" Requires="a14">
+      <mc:AlternateContent xmlns:mc="http://schemas.openxmlformats.org/markup-compatibility/2006" xmlns:a14="http://schemas.microsoft.com/office/drawing/2010/main">
+        <mc:Choice Requires="a14">
           <p:sp>
             <p:nvSpPr>
               <p:cNvPr id="11" name="ZoneTexte 10">
@@ -7303,7 +7368,7 @@
             </p:txBody>
           </p:sp>
         </mc:Choice>
-        <mc:Fallback>
+        <mc:Fallback xmlns="">
           <p:sp>
             <p:nvSpPr>
               <p:cNvPr id="11" name="ZoneTexte 10">
@@ -7971,6 +8036,2006 @@
 </file>
 
 <file path=ppt/slides/slide21.xml><?xml version="1.0" encoding="utf-8"?>
+<p:sld xmlns:a="http://schemas.openxmlformats.org/drawingml/2006/main" xmlns:r="http://schemas.openxmlformats.org/officeDocument/2006/relationships" xmlns:p="http://schemas.openxmlformats.org/presentationml/2006/main">
+  <p:cSld>
+    <p:spTree>
+      <p:nvGrpSpPr>
+        <p:cNvPr id="1" name=""/>
+        <p:cNvGrpSpPr/>
+        <p:nvPr/>
+      </p:nvGrpSpPr>
+      <p:grpSpPr>
+        <a:xfrm>
+          <a:off x="0" y="0"/>
+          <a:ext cx="0" cy="0"/>
+          <a:chOff x="0" y="0"/>
+          <a:chExt cx="0" cy="0"/>
+        </a:xfrm>
+      </p:grpSpPr>
+      <p:sp>
+        <p:nvSpPr>
+          <p:cNvPr id="4" name="Espace réservé du pied de page 3">
+            <a:extLst>
+              <a:ext uri="{FF2B5EF4-FFF2-40B4-BE49-F238E27FC236}">
+                <a16:creationId xmlns:a16="http://schemas.microsoft.com/office/drawing/2014/main" id="{8FEEC940-4BFF-956C-713A-1CE73C436B6F}"/>
+              </a:ext>
+            </a:extLst>
+          </p:cNvPr>
+          <p:cNvSpPr>
+            <a:spLocks noGrp="1"/>
+          </p:cNvSpPr>
+          <p:nvPr>
+            <p:ph type="ftr" sz="quarter" idx="11"/>
+          </p:nvPr>
+        </p:nvSpPr>
+        <p:spPr/>
+        <p:txBody>
+          <a:bodyPr/>
+          <a:lstStyle/>
+          <a:p>
+            <a:r>
+              <a:rPr lang="fr-FR"/>
+              <a:t>Cours: Python | Auteur: TUO N. Ismaël Maurice 
+</a:t>
+            </a:r>
+          </a:p>
+        </p:txBody>
+      </p:sp>
+      <p:sp>
+        <p:nvSpPr>
+          <p:cNvPr id="5" name="Espace réservé du numéro de diapositive 4">
+            <a:extLst>
+              <a:ext uri="{FF2B5EF4-FFF2-40B4-BE49-F238E27FC236}">
+                <a16:creationId xmlns:a16="http://schemas.microsoft.com/office/drawing/2014/main" id="{CE50FB16-F89F-D7CA-C6AA-CFC075094990}"/>
+              </a:ext>
+            </a:extLst>
+          </p:cNvPr>
+          <p:cNvSpPr>
+            <a:spLocks noGrp="1"/>
+          </p:cNvSpPr>
+          <p:nvPr>
+            <p:ph type="sldNum" sz="quarter" idx="12"/>
+          </p:nvPr>
+        </p:nvSpPr>
+        <p:spPr/>
+        <p:txBody>
+          <a:bodyPr/>
+          <a:lstStyle/>
+          <a:p>
+            <a:fld id="{B8C3BB88-DD29-4D42-B62E-D7D541DB4348}" type="slidenum">
+              <a:rPr lang="fr-FR" smtClean="0"/>
+              <a:t>21</a:t>
+            </a:fld>
+            <a:endParaRPr lang="fr-FR"/>
+          </a:p>
+        </p:txBody>
+      </p:sp>
+      <p:sp>
+        <p:nvSpPr>
+          <p:cNvPr id="6" name="ZoneTexte 5">
+            <a:extLst>
+              <a:ext uri="{FF2B5EF4-FFF2-40B4-BE49-F238E27FC236}">
+                <a16:creationId xmlns:a16="http://schemas.microsoft.com/office/drawing/2014/main" id="{84F10693-2FE8-EFC8-8DB6-84BFD181D260}"/>
+              </a:ext>
+            </a:extLst>
+          </p:cNvPr>
+          <p:cNvSpPr txBox="1"/>
+          <p:nvPr/>
+        </p:nvSpPr>
+        <p:spPr>
+          <a:xfrm>
+            <a:off x="397564" y="218526"/>
+            <a:ext cx="5795005" cy="461665"/>
+          </a:xfrm>
+          <a:prstGeom prst="rect">
+            <a:avLst/>
+          </a:prstGeom>
+          <a:noFill/>
+        </p:spPr>
+        <p:txBody>
+          <a:bodyPr wrap="square" rtlCol="0">
+            <a:spAutoFit/>
+          </a:bodyPr>
+          <a:lstStyle/>
+          <a:p>
+            <a:r>
+              <a:rPr lang="fr-FR" sz="2400" b="1" dirty="0">
+                <a:latin typeface="Times New Roman" panose="02020603050405020304" pitchFamily="18" charset="0"/>
+                <a:cs typeface="Times New Roman" panose="02020603050405020304" pitchFamily="18" charset="0"/>
+              </a:rPr>
+              <a:t>Exercices</a:t>
+            </a:r>
+          </a:p>
+        </p:txBody>
+      </p:sp>
+      <p:cxnSp>
+        <p:nvCxnSpPr>
+          <p:cNvPr id="3" name="Connecteur droit 2">
+            <a:extLst>
+              <a:ext uri="{FF2B5EF4-FFF2-40B4-BE49-F238E27FC236}">
+                <a16:creationId xmlns:a16="http://schemas.microsoft.com/office/drawing/2014/main" id="{6AC8021D-4898-08B9-18A0-60AC71EF613E}"/>
+              </a:ext>
+            </a:extLst>
+          </p:cNvPr>
+          <p:cNvCxnSpPr>
+            <a:cxnSpLocks/>
+          </p:cNvCxnSpPr>
+          <p:nvPr/>
+        </p:nvCxnSpPr>
+        <p:spPr>
+          <a:xfrm>
+            <a:off x="500932" y="680191"/>
+            <a:ext cx="11178450" cy="0"/>
+          </a:xfrm>
+          <a:prstGeom prst="line">
+            <a:avLst/>
+          </a:prstGeom>
+          <a:ln/>
+        </p:spPr>
+        <p:style>
+          <a:lnRef idx="3">
+            <a:schemeClr val="accent3"/>
+          </a:lnRef>
+          <a:fillRef idx="0">
+            <a:schemeClr val="accent3"/>
+          </a:fillRef>
+          <a:effectRef idx="2">
+            <a:schemeClr val="accent3"/>
+          </a:effectRef>
+          <a:fontRef idx="minor">
+            <a:schemeClr val="tx1"/>
+          </a:fontRef>
+        </p:style>
+      </p:cxnSp>
+      <p:sp>
+        <p:nvSpPr>
+          <p:cNvPr id="2" name="ZoneTexte 1">
+            <a:extLst>
+              <a:ext uri="{FF2B5EF4-FFF2-40B4-BE49-F238E27FC236}">
+                <a16:creationId xmlns:a16="http://schemas.microsoft.com/office/drawing/2014/main" id="{598CC1F4-92B5-97D6-5630-8A3701211AA4}"/>
+              </a:ext>
+            </a:extLst>
+          </p:cNvPr>
+          <p:cNvSpPr txBox="1"/>
+          <p:nvPr/>
+        </p:nvSpPr>
+        <p:spPr>
+          <a:xfrm>
+            <a:off x="397564" y="711780"/>
+            <a:ext cx="11569148" cy="400110"/>
+          </a:xfrm>
+          <a:prstGeom prst="rect">
+            <a:avLst/>
+          </a:prstGeom>
+          <a:noFill/>
+        </p:spPr>
+        <p:txBody>
+          <a:bodyPr wrap="square" rtlCol="0">
+            <a:spAutoFit/>
+          </a:bodyPr>
+          <a:lstStyle/>
+          <a:p>
+            <a:r>
+              <a:rPr lang="fr-FR" sz="2000" b="1" u="sng" dirty="0">
+                <a:latin typeface="Times New Roman" panose="02020603050405020304" pitchFamily="18" charset="0"/>
+                <a:cs typeface="Times New Roman" panose="02020603050405020304" pitchFamily="18" charset="0"/>
+              </a:rPr>
+              <a:t>Mini-Projet 2</a:t>
+            </a:r>
+          </a:p>
+        </p:txBody>
+      </p:sp>
+      <p:sp>
+        <p:nvSpPr>
+          <p:cNvPr id="7" name="ZoneTexte 6">
+            <a:extLst>
+              <a:ext uri="{FF2B5EF4-FFF2-40B4-BE49-F238E27FC236}">
+                <a16:creationId xmlns:a16="http://schemas.microsoft.com/office/drawing/2014/main" id="{990321CC-02EF-ED64-0AA9-789ED60F60B1}"/>
+              </a:ext>
+            </a:extLst>
+          </p:cNvPr>
+          <p:cNvSpPr txBox="1"/>
+          <p:nvPr/>
+        </p:nvSpPr>
+        <p:spPr>
+          <a:xfrm>
+            <a:off x="397564" y="1090885"/>
+            <a:ext cx="11088982" cy="1938992"/>
+          </a:xfrm>
+          <a:prstGeom prst="rect">
+            <a:avLst/>
+          </a:prstGeom>
+          <a:noFill/>
+        </p:spPr>
+        <p:txBody>
+          <a:bodyPr wrap="square" rtlCol="0">
+            <a:spAutoFit/>
+          </a:bodyPr>
+          <a:lstStyle>
+            <a:defPPr>
+              <a:defRPr lang="en-US"/>
+            </a:defPPr>
+            <a:lvl1pPr>
+              <a:defRPr sz="2000"/>
+            </a:lvl1pPr>
+          </a:lstStyle>
+          <a:p>
+            <a:r>
+              <a:rPr lang="fr-FR" dirty="0">
+                <a:latin typeface="Times New Roman" panose="02020603050405020304" pitchFamily="18" charset="0"/>
+                <a:cs typeface="Times New Roman" panose="02020603050405020304" pitchFamily="18" charset="0"/>
+              </a:rPr>
+              <a:t>Le chiffre de Vigenère est un algorithme de chiffrement établi par le cryptographe français BLAISE DE Vigenère. C’est un crypto système poly-alphabétique (contrairement au chiffre de César qui est mono alphabétique), c’est-à-dire qu’il consiste à changer une lettre par une autre, mais cette dernière n’est pas toujours la même. Cela permet une plus grande sécurité. Cet algorithme utilise une clé dans notre cas sous la forme d’un mot ou d’une phrase que l’on choisira. Plus la clé sera longue, plus le cryptogramme sera sécurisé.</a:t>
+            </a:r>
+          </a:p>
+        </p:txBody>
+      </p:sp>
+      <p:sp>
+        <p:nvSpPr>
+          <p:cNvPr id="8" name="ZoneTexte 7">
+            <a:extLst>
+              <a:ext uri="{FF2B5EF4-FFF2-40B4-BE49-F238E27FC236}">
+                <a16:creationId xmlns:a16="http://schemas.microsoft.com/office/drawing/2014/main" id="{99BF4A4F-48CD-150B-FAE0-EE98BCF14AA6}"/>
+              </a:ext>
+            </a:extLst>
+          </p:cNvPr>
+          <p:cNvSpPr txBox="1"/>
+          <p:nvPr/>
+        </p:nvSpPr>
+        <p:spPr>
+          <a:xfrm>
+            <a:off x="397564" y="2953840"/>
+            <a:ext cx="11088982" cy="1323439"/>
+          </a:xfrm>
+          <a:prstGeom prst="rect">
+            <a:avLst/>
+          </a:prstGeom>
+          <a:noFill/>
+        </p:spPr>
+        <p:txBody>
+          <a:bodyPr wrap="square" rtlCol="0">
+            <a:spAutoFit/>
+          </a:bodyPr>
+          <a:lstStyle>
+            <a:defPPr>
+              <a:defRPr lang="en-US"/>
+            </a:defPPr>
+            <a:lvl1pPr>
+              <a:defRPr sz="2000"/>
+            </a:lvl1pPr>
+          </a:lstStyle>
+          <a:p>
+            <a:r>
+              <a:rPr lang="fr-FR" dirty="0">
+                <a:latin typeface="Times New Roman" panose="02020603050405020304" pitchFamily="18" charset="0"/>
+                <a:cs typeface="Times New Roman" panose="02020603050405020304" pitchFamily="18" charset="0"/>
+              </a:rPr>
+              <a:t>Pour utiliser le chiffre de Vigenère on dispose de deux méthodes de chiffrement/déchiffrement:</a:t>
+            </a:r>
+          </a:p>
+          <a:p>
+            <a:pPr marL="342900" indent="-342900">
+              <a:buFont typeface="Arial" panose="020B0604020202020204" pitchFamily="34" charset="0"/>
+              <a:buChar char="•"/>
+            </a:pPr>
+            <a:r>
+              <a:rPr lang="fr-FR" dirty="0">
+                <a:latin typeface="Times New Roman" panose="02020603050405020304" pitchFamily="18" charset="0"/>
+                <a:cs typeface="Times New Roman" panose="02020603050405020304" pitchFamily="18" charset="0"/>
+              </a:rPr>
+              <a:t>Soit on utilise la table de Vigenère voir </a:t>
+            </a:r>
+            <a:r>
+              <a:rPr lang="fr-FR" dirty="0">
+                <a:latin typeface="Times New Roman" panose="02020603050405020304" pitchFamily="18" charset="0"/>
+                <a:cs typeface="Times New Roman" panose="02020603050405020304" pitchFamily="18" charset="0"/>
+                <a:hlinkClick r:id="rId2"/>
+              </a:rPr>
+              <a:t>Chiffre de Vigenère</a:t>
+            </a:r>
+            <a:r>
+              <a:rPr lang="fr-FR" dirty="0">
+                <a:latin typeface="Times New Roman" panose="02020603050405020304" pitchFamily="18" charset="0"/>
+                <a:cs typeface="Times New Roman" panose="02020603050405020304" pitchFamily="18" charset="0"/>
+              </a:rPr>
+              <a:t>.</a:t>
+            </a:r>
+          </a:p>
+          <a:p>
+            <a:pPr marL="342900" indent="-342900">
+              <a:buFont typeface="Arial" panose="020B0604020202020204" pitchFamily="34" charset="0"/>
+              <a:buChar char="•"/>
+            </a:pPr>
+            <a:r>
+              <a:rPr lang="fr-FR" dirty="0">
+                <a:latin typeface="Times New Roman" panose="02020603050405020304" pitchFamily="18" charset="0"/>
+                <a:cs typeface="Times New Roman" panose="02020603050405020304" pitchFamily="18" charset="0"/>
+              </a:rPr>
+              <a:t>Soit on utilise la méthode mathématique. </a:t>
+            </a:r>
+          </a:p>
+          <a:p>
+            <a:r>
+              <a:rPr lang="fr-FR" dirty="0">
+                <a:latin typeface="Times New Roman" panose="02020603050405020304" pitchFamily="18" charset="0"/>
+                <a:cs typeface="Times New Roman" panose="02020603050405020304" pitchFamily="18" charset="0"/>
+              </a:rPr>
+              <a:t>Nous utiliserons dans cet exercice la méthode mathématique.</a:t>
+            </a:r>
+          </a:p>
+        </p:txBody>
+      </p:sp>
+      <mc:AlternateContent xmlns:mc="http://schemas.openxmlformats.org/markup-compatibility/2006" xmlns:a14="http://schemas.microsoft.com/office/drawing/2010/main">
+        <mc:Choice Requires="a14">
+          <p:sp>
+            <p:nvSpPr>
+              <p:cNvPr id="9" name="ZoneTexte 8">
+                <a:extLst>
+                  <a:ext uri="{FF2B5EF4-FFF2-40B4-BE49-F238E27FC236}">
+                    <a16:creationId xmlns:a16="http://schemas.microsoft.com/office/drawing/2014/main" id="{6A914AF3-291D-FD71-E5B9-008DC9BB840F}"/>
+                  </a:ext>
+                </a:extLst>
+              </p:cNvPr>
+              <p:cNvSpPr txBox="1"/>
+              <p:nvPr/>
+            </p:nvSpPr>
+            <p:spPr>
+              <a:xfrm>
+                <a:off x="332682" y="4254199"/>
+                <a:ext cx="10866456" cy="1938992"/>
+              </a:xfrm>
+              <a:prstGeom prst="rect">
+                <a:avLst/>
+              </a:prstGeom>
+              <a:noFill/>
+            </p:spPr>
+            <p:txBody>
+              <a:bodyPr wrap="square" rtlCol="0">
+                <a:spAutoFit/>
+              </a:bodyPr>
+              <a:lstStyle>
+                <a:defPPr>
+                  <a:defRPr lang="en-US"/>
+                </a:defPPr>
+                <a:lvl1pPr>
+                  <a:defRPr sz="2000"/>
+                </a:lvl1pPr>
+              </a:lstStyle>
+              <a:p>
+                <a:r>
+                  <a:rPr lang="fr-FR" dirty="0">
+                    <a:latin typeface="Times New Roman" panose="02020603050405020304" pitchFamily="18" charset="0"/>
+                    <a:cs typeface="Times New Roman" panose="02020603050405020304" pitchFamily="18" charset="0"/>
+                  </a:rPr>
+                  <a:t>Avec la méthode mathématique, on part d’un tableau comme le chiffre de César composé des lettres de A à Z ayant respectivement les indices de 0 à 25.</a:t>
+                </a:r>
+              </a:p>
+              <a:p>
+                <a:r>
+                  <a:rPr lang="fr-FR" dirty="0">
+                    <a:latin typeface="Times New Roman" panose="02020603050405020304" pitchFamily="18" charset="0"/>
+                    <a:cs typeface="Times New Roman" panose="02020603050405020304" pitchFamily="18" charset="0"/>
+                  </a:rPr>
+                  <a:t>Supposons:</a:t>
+                </a:r>
+              </a:p>
+              <a:p>
+                <a:pPr marL="342900" indent="-342900">
+                  <a:buFont typeface="Arial" panose="020B0604020202020204" pitchFamily="34" charset="0"/>
+                  <a:buChar char="•"/>
+                </a:pPr>
+                <a14:m>
+                  <m:oMath xmlns:m="http://schemas.openxmlformats.org/officeDocument/2006/math">
+                    <m:r>
+                      <a:rPr lang="fr-FR" i="1">
+                        <a:latin typeface="Cambria Math" panose="02040503050406030204" pitchFamily="18" charset="0"/>
+                        <a:cs typeface="Times New Roman" panose="02020603050405020304" pitchFamily="18" charset="0"/>
+                      </a:rPr>
+                      <m:t>𝑥</m:t>
+                    </m:r>
+                    <m:r>
+                      <a:rPr lang="fr-FR" i="1">
+                        <a:latin typeface="Cambria Math" panose="02040503050406030204" pitchFamily="18" charset="0"/>
+                        <a:cs typeface="Times New Roman" panose="02020603050405020304" pitchFamily="18" charset="0"/>
+                      </a:rPr>
+                      <m:t> :</m:t>
+                    </m:r>
+                  </m:oMath>
+                </a14:m>
+                <a:r>
+                  <a:rPr lang="fr-FR" i="1" dirty="0">
+                    <a:latin typeface="Cambria Math" panose="02040503050406030204" pitchFamily="18" charset="0"/>
+                    <a:cs typeface="Times New Roman" panose="02020603050405020304" pitchFamily="18" charset="0"/>
+                  </a:rPr>
+                  <a:t> </a:t>
+                </a:r>
+                <a:r>
+                  <a:rPr lang="fr-FR" dirty="0">
+                    <a:latin typeface="Cambria Math" panose="02040503050406030204" pitchFamily="18" charset="0"/>
+                    <a:cs typeface="Times New Roman" panose="02020603050405020304" pitchFamily="18" charset="0"/>
+                  </a:rPr>
+                  <a:t>l’indice de la lettre de la clé</a:t>
+                </a:r>
+              </a:p>
+              <a:p>
+                <a:pPr marL="342900" indent="-342900">
+                  <a:buFont typeface="Arial" panose="020B0604020202020204" pitchFamily="34" charset="0"/>
+                  <a:buChar char="•"/>
+                </a:pPr>
+                <a14:m>
+                  <m:oMath xmlns:m="http://schemas.openxmlformats.org/officeDocument/2006/math">
+                    <m:r>
+                      <a:rPr lang="fr-FR" b="0" i="1" smtClean="0">
+                        <a:latin typeface="Cambria Math" panose="02040503050406030204" pitchFamily="18" charset="0"/>
+                        <a:cs typeface="Times New Roman" panose="02020603050405020304" pitchFamily="18" charset="0"/>
+                      </a:rPr>
+                      <m:t>𝑦</m:t>
+                    </m:r>
+                    <m:r>
+                      <a:rPr lang="fr-FR" b="0" i="1" smtClean="0">
+                        <a:latin typeface="Cambria Math" panose="02040503050406030204" pitchFamily="18" charset="0"/>
+                        <a:cs typeface="Times New Roman" panose="02020603050405020304" pitchFamily="18" charset="0"/>
+                      </a:rPr>
+                      <m:t> :</m:t>
+                    </m:r>
+                  </m:oMath>
+                </a14:m>
+                <a:r>
+                  <a:rPr lang="fr-FR" i="1" dirty="0">
+                    <a:latin typeface="Cambria Math" panose="02040503050406030204" pitchFamily="18" charset="0"/>
+                    <a:cs typeface="Times New Roman" panose="02020603050405020304" pitchFamily="18" charset="0"/>
+                  </a:rPr>
+                  <a:t> </a:t>
+                </a:r>
+                <a:r>
+                  <a:rPr lang="fr-FR" dirty="0">
+                    <a:latin typeface="Cambria Math" panose="02040503050406030204" pitchFamily="18" charset="0"/>
+                    <a:cs typeface="Times New Roman" panose="02020603050405020304" pitchFamily="18" charset="0"/>
+                  </a:rPr>
+                  <a:t>l’indice de la lettre chiffrée</a:t>
+                </a:r>
+              </a:p>
+              <a:p>
+                <a:pPr marL="342900" indent="-342900">
+                  <a:buFont typeface="Arial" panose="020B0604020202020204" pitchFamily="34" charset="0"/>
+                  <a:buChar char="•"/>
+                </a:pPr>
+                <a14:m>
+                  <m:oMath xmlns:m="http://schemas.openxmlformats.org/officeDocument/2006/math">
+                    <m:r>
+                      <a:rPr lang="fr-FR" b="0" i="1" smtClean="0">
+                        <a:latin typeface="Cambria Math" panose="02040503050406030204" pitchFamily="18" charset="0"/>
+                        <a:cs typeface="Times New Roman" panose="02020603050405020304" pitchFamily="18" charset="0"/>
+                      </a:rPr>
+                      <m:t>𝑧</m:t>
+                    </m:r>
+                    <m:r>
+                      <a:rPr lang="fr-FR" b="0" i="1" smtClean="0">
+                        <a:latin typeface="Cambria Math" panose="02040503050406030204" pitchFamily="18" charset="0"/>
+                        <a:cs typeface="Times New Roman" panose="02020603050405020304" pitchFamily="18" charset="0"/>
+                      </a:rPr>
+                      <m:t>:</m:t>
+                    </m:r>
+                  </m:oMath>
+                </a14:m>
+                <a:r>
+                  <a:rPr lang="fr-FR" i="1" dirty="0">
+                    <a:latin typeface="Cambria Math" panose="02040503050406030204" pitchFamily="18" charset="0"/>
+                    <a:cs typeface="Times New Roman" panose="02020603050405020304" pitchFamily="18" charset="0"/>
+                  </a:rPr>
+                  <a:t> </a:t>
+                </a:r>
+                <a:r>
+                  <a:rPr lang="fr-FR" dirty="0">
+                    <a:latin typeface="Cambria Math" panose="02040503050406030204" pitchFamily="18" charset="0"/>
+                    <a:cs typeface="Times New Roman" panose="02020603050405020304" pitchFamily="18" charset="0"/>
+                  </a:rPr>
+                  <a:t>l’indice de la lettre du texte en clair</a:t>
+                </a:r>
+                <a:endParaRPr lang="fr-FR" i="1" dirty="0">
+                  <a:latin typeface="Cambria Math" panose="02040503050406030204" pitchFamily="18" charset="0"/>
+                  <a:cs typeface="Times New Roman" panose="02020603050405020304" pitchFamily="18" charset="0"/>
+                </a:endParaRPr>
+              </a:p>
+            </p:txBody>
+          </p:sp>
+        </mc:Choice>
+        <mc:Fallback xmlns="">
+          <p:sp>
+            <p:nvSpPr>
+              <p:cNvPr id="9" name="ZoneTexte 8">
+                <a:extLst>
+                  <a:ext uri="{FF2B5EF4-FFF2-40B4-BE49-F238E27FC236}">
+                    <a16:creationId xmlns:a16="http://schemas.microsoft.com/office/drawing/2014/main" id="{6A914AF3-291D-FD71-E5B9-008DC9BB840F}"/>
+                  </a:ext>
+                </a:extLst>
+              </p:cNvPr>
+              <p:cNvSpPr txBox="1">
+                <a:spLocks noRot="1" noChangeAspect="1" noMove="1" noResize="1" noEditPoints="1" noAdjustHandles="1" noChangeArrowheads="1" noChangeShapeType="1" noTextEdit="1"/>
+              </p:cNvSpPr>
+              <p:nvPr/>
+            </p:nvSpPr>
+            <p:spPr>
+              <a:xfrm>
+                <a:off x="332682" y="4254199"/>
+                <a:ext cx="10866456" cy="1938992"/>
+              </a:xfrm>
+              <a:prstGeom prst="rect">
+                <a:avLst/>
+              </a:prstGeom>
+              <a:blipFill>
+                <a:blip r:embed="rId3"/>
+                <a:stretch>
+                  <a:fillRect l="-617" t="-1887" r="-1010" b="-4717"/>
+                </a:stretch>
+              </a:blipFill>
+            </p:spPr>
+            <p:txBody>
+              <a:bodyPr/>
+              <a:lstStyle/>
+              <a:p>
+                <a:r>
+                  <a:rPr lang="fr-FR">
+                    <a:noFill/>
+                  </a:rPr>
+                  <a:t> </a:t>
+                </a:r>
+              </a:p>
+            </p:txBody>
+          </p:sp>
+        </mc:Fallback>
+      </mc:AlternateContent>
+    </p:spTree>
+    <p:extLst>
+      <p:ext uri="{BB962C8B-B14F-4D97-AF65-F5344CB8AC3E}">
+        <p14:creationId xmlns:p14="http://schemas.microsoft.com/office/powerpoint/2010/main" val="2204220729"/>
+      </p:ext>
+    </p:extLst>
+  </p:cSld>
+  <p:clrMapOvr>
+    <a:masterClrMapping/>
+  </p:clrMapOvr>
+</p:sld>
+</file>
+
+<file path=ppt/slides/slide22.xml><?xml version="1.0" encoding="utf-8"?>
+<p:sld xmlns:a="http://schemas.openxmlformats.org/drawingml/2006/main" xmlns:r="http://schemas.openxmlformats.org/officeDocument/2006/relationships" xmlns:p="http://schemas.openxmlformats.org/presentationml/2006/main">
+  <p:cSld>
+    <p:spTree>
+      <p:nvGrpSpPr>
+        <p:cNvPr id="1" name=""/>
+        <p:cNvGrpSpPr/>
+        <p:nvPr/>
+      </p:nvGrpSpPr>
+      <p:grpSpPr>
+        <a:xfrm>
+          <a:off x="0" y="0"/>
+          <a:ext cx="0" cy="0"/>
+          <a:chOff x="0" y="0"/>
+          <a:chExt cx="0" cy="0"/>
+        </a:xfrm>
+      </p:grpSpPr>
+      <p:sp>
+        <p:nvSpPr>
+          <p:cNvPr id="4" name="Espace réservé du pied de page 3">
+            <a:extLst>
+              <a:ext uri="{FF2B5EF4-FFF2-40B4-BE49-F238E27FC236}">
+                <a16:creationId xmlns:a16="http://schemas.microsoft.com/office/drawing/2014/main" id="{8FEEC940-4BFF-956C-713A-1CE73C436B6F}"/>
+              </a:ext>
+            </a:extLst>
+          </p:cNvPr>
+          <p:cNvSpPr>
+            <a:spLocks noGrp="1"/>
+          </p:cNvSpPr>
+          <p:nvPr>
+            <p:ph type="ftr" sz="quarter" idx="11"/>
+          </p:nvPr>
+        </p:nvSpPr>
+        <p:spPr/>
+        <p:txBody>
+          <a:bodyPr/>
+          <a:lstStyle/>
+          <a:p>
+            <a:r>
+              <a:rPr lang="fr-FR"/>
+              <a:t>Cours: Python | Auteur: TUO N. Ismaël Maurice 
+</a:t>
+            </a:r>
+          </a:p>
+        </p:txBody>
+      </p:sp>
+      <p:sp>
+        <p:nvSpPr>
+          <p:cNvPr id="5" name="Espace réservé du numéro de diapositive 4">
+            <a:extLst>
+              <a:ext uri="{FF2B5EF4-FFF2-40B4-BE49-F238E27FC236}">
+                <a16:creationId xmlns:a16="http://schemas.microsoft.com/office/drawing/2014/main" id="{CE50FB16-F89F-D7CA-C6AA-CFC075094990}"/>
+              </a:ext>
+            </a:extLst>
+          </p:cNvPr>
+          <p:cNvSpPr>
+            <a:spLocks noGrp="1"/>
+          </p:cNvSpPr>
+          <p:nvPr>
+            <p:ph type="sldNum" sz="quarter" idx="12"/>
+          </p:nvPr>
+        </p:nvSpPr>
+        <p:spPr/>
+        <p:txBody>
+          <a:bodyPr/>
+          <a:lstStyle/>
+          <a:p>
+            <a:fld id="{B8C3BB88-DD29-4D42-B62E-D7D541DB4348}" type="slidenum">
+              <a:rPr lang="fr-FR" smtClean="0"/>
+              <a:t>22</a:t>
+            </a:fld>
+            <a:endParaRPr lang="fr-FR"/>
+          </a:p>
+        </p:txBody>
+      </p:sp>
+      <p:sp>
+        <p:nvSpPr>
+          <p:cNvPr id="6" name="ZoneTexte 5">
+            <a:extLst>
+              <a:ext uri="{FF2B5EF4-FFF2-40B4-BE49-F238E27FC236}">
+                <a16:creationId xmlns:a16="http://schemas.microsoft.com/office/drawing/2014/main" id="{84F10693-2FE8-EFC8-8DB6-84BFD181D260}"/>
+              </a:ext>
+            </a:extLst>
+          </p:cNvPr>
+          <p:cNvSpPr txBox="1"/>
+          <p:nvPr/>
+        </p:nvSpPr>
+        <p:spPr>
+          <a:xfrm>
+            <a:off x="397564" y="218526"/>
+            <a:ext cx="5795005" cy="461665"/>
+          </a:xfrm>
+          <a:prstGeom prst="rect">
+            <a:avLst/>
+          </a:prstGeom>
+          <a:noFill/>
+        </p:spPr>
+        <p:txBody>
+          <a:bodyPr wrap="square" rtlCol="0">
+            <a:spAutoFit/>
+          </a:bodyPr>
+          <a:lstStyle/>
+          <a:p>
+            <a:r>
+              <a:rPr lang="fr-FR" sz="2400" b="1" dirty="0">
+                <a:latin typeface="Times New Roman" panose="02020603050405020304" pitchFamily="18" charset="0"/>
+                <a:cs typeface="Times New Roman" panose="02020603050405020304" pitchFamily="18" charset="0"/>
+              </a:rPr>
+              <a:t>Exercices</a:t>
+            </a:r>
+          </a:p>
+        </p:txBody>
+      </p:sp>
+      <p:cxnSp>
+        <p:nvCxnSpPr>
+          <p:cNvPr id="3" name="Connecteur droit 2">
+            <a:extLst>
+              <a:ext uri="{FF2B5EF4-FFF2-40B4-BE49-F238E27FC236}">
+                <a16:creationId xmlns:a16="http://schemas.microsoft.com/office/drawing/2014/main" id="{6AC8021D-4898-08B9-18A0-60AC71EF613E}"/>
+              </a:ext>
+            </a:extLst>
+          </p:cNvPr>
+          <p:cNvCxnSpPr>
+            <a:cxnSpLocks/>
+          </p:cNvCxnSpPr>
+          <p:nvPr/>
+        </p:nvCxnSpPr>
+        <p:spPr>
+          <a:xfrm>
+            <a:off x="500932" y="680191"/>
+            <a:ext cx="11178450" cy="0"/>
+          </a:xfrm>
+          <a:prstGeom prst="line">
+            <a:avLst/>
+          </a:prstGeom>
+          <a:ln/>
+        </p:spPr>
+        <p:style>
+          <a:lnRef idx="3">
+            <a:schemeClr val="accent3"/>
+          </a:lnRef>
+          <a:fillRef idx="0">
+            <a:schemeClr val="accent3"/>
+          </a:fillRef>
+          <a:effectRef idx="2">
+            <a:schemeClr val="accent3"/>
+          </a:effectRef>
+          <a:fontRef idx="minor">
+            <a:schemeClr val="tx1"/>
+          </a:fontRef>
+        </p:style>
+      </p:cxnSp>
+      <p:sp>
+        <p:nvSpPr>
+          <p:cNvPr id="2" name="ZoneTexte 1">
+            <a:extLst>
+              <a:ext uri="{FF2B5EF4-FFF2-40B4-BE49-F238E27FC236}">
+                <a16:creationId xmlns:a16="http://schemas.microsoft.com/office/drawing/2014/main" id="{598CC1F4-92B5-97D6-5630-8A3701211AA4}"/>
+              </a:ext>
+            </a:extLst>
+          </p:cNvPr>
+          <p:cNvSpPr txBox="1"/>
+          <p:nvPr/>
+        </p:nvSpPr>
+        <p:spPr>
+          <a:xfrm>
+            <a:off x="397564" y="711780"/>
+            <a:ext cx="11569148" cy="400110"/>
+          </a:xfrm>
+          <a:prstGeom prst="rect">
+            <a:avLst/>
+          </a:prstGeom>
+          <a:noFill/>
+        </p:spPr>
+        <p:txBody>
+          <a:bodyPr wrap="square" rtlCol="0">
+            <a:spAutoFit/>
+          </a:bodyPr>
+          <a:lstStyle/>
+          <a:p>
+            <a:r>
+              <a:rPr lang="fr-FR" sz="2000" b="1" u="sng">
+                <a:latin typeface="Times New Roman" panose="02020603050405020304" pitchFamily="18" charset="0"/>
+                <a:cs typeface="Times New Roman" panose="02020603050405020304" pitchFamily="18" charset="0"/>
+              </a:rPr>
+              <a:t>Mini-Projet 2</a:t>
+            </a:r>
+            <a:endParaRPr lang="fr-FR" sz="2000" b="1" u="sng" dirty="0">
+              <a:latin typeface="Times New Roman" panose="02020603050405020304" pitchFamily="18" charset="0"/>
+              <a:cs typeface="Times New Roman" panose="02020603050405020304" pitchFamily="18" charset="0"/>
+            </a:endParaRPr>
+          </a:p>
+        </p:txBody>
+      </p:sp>
+      <mc:AlternateContent xmlns:mc="http://schemas.openxmlformats.org/markup-compatibility/2006" xmlns:a14="http://schemas.microsoft.com/office/drawing/2010/main">
+        <mc:Choice Requires="a14">
+          <p:sp>
+            <p:nvSpPr>
+              <p:cNvPr id="7" name="ZoneTexte 6">
+                <a:extLst>
+                  <a:ext uri="{FF2B5EF4-FFF2-40B4-BE49-F238E27FC236}">
+                    <a16:creationId xmlns:a16="http://schemas.microsoft.com/office/drawing/2014/main" id="{990321CC-02EF-ED64-0AA9-789ED60F60B1}"/>
+                  </a:ext>
+                </a:extLst>
+              </p:cNvPr>
+              <p:cNvSpPr txBox="1"/>
+              <p:nvPr/>
+            </p:nvSpPr>
+            <p:spPr>
+              <a:xfrm>
+                <a:off x="397564" y="1141856"/>
+                <a:ext cx="11088982" cy="1938992"/>
+              </a:xfrm>
+              <a:prstGeom prst="rect">
+                <a:avLst/>
+              </a:prstGeom>
+              <a:noFill/>
+            </p:spPr>
+            <p:txBody>
+              <a:bodyPr wrap="square" rtlCol="0">
+                <a:spAutoFit/>
+              </a:bodyPr>
+              <a:lstStyle>
+                <a:defPPr>
+                  <a:defRPr lang="en-US"/>
+                </a:defPPr>
+                <a:lvl1pPr>
+                  <a:defRPr sz="2000"/>
+                </a:lvl1pPr>
+              </a:lstStyle>
+              <a:p>
+                <a:r>
+                  <a:rPr lang="fr-FR" dirty="0">
+                    <a:latin typeface="Times New Roman" panose="02020603050405020304" pitchFamily="18" charset="0"/>
+                    <a:cs typeface="Times New Roman" panose="02020603050405020304" pitchFamily="18" charset="0"/>
+                  </a:rPr>
+                  <a:t>Si on veut chiffrer, on obtient l’indice de la lettre chiffrée par la formule:</a:t>
+                </a:r>
+              </a:p>
+              <a:p>
+                <a:pPr/>
+                <a14:m>
+                  <m:oMathPara xmlns:m="http://schemas.openxmlformats.org/officeDocument/2006/math">
+                    <m:oMathParaPr>
+                      <m:jc m:val="centerGroup"/>
+                    </m:oMathParaPr>
+                    <m:oMath xmlns:m="http://schemas.openxmlformats.org/officeDocument/2006/math">
+                      <m:r>
+                        <a:rPr lang="fr-FR" b="0" i="1" smtClean="0">
+                          <a:latin typeface="Cambria Math" panose="02040503050406030204" pitchFamily="18" charset="0"/>
+                          <a:cs typeface="Times New Roman" panose="02020603050405020304" pitchFamily="18" charset="0"/>
+                        </a:rPr>
+                        <m:t>𝑦</m:t>
+                      </m:r>
+                      <m:r>
+                        <a:rPr lang="fr-FR" b="0" i="1" smtClean="0">
+                          <a:latin typeface="Cambria Math" panose="02040503050406030204" pitchFamily="18" charset="0"/>
+                          <a:cs typeface="Times New Roman" panose="02020603050405020304" pitchFamily="18" charset="0"/>
+                        </a:rPr>
+                        <m:t>=</m:t>
+                      </m:r>
+                      <m:d>
+                        <m:dPr>
+                          <m:ctrlPr>
+                            <a:rPr lang="fr-FR" b="0" i="1" smtClean="0">
+                              <a:latin typeface="Cambria Math" panose="02040503050406030204" pitchFamily="18" charset="0"/>
+                              <a:cs typeface="Times New Roman" panose="02020603050405020304" pitchFamily="18" charset="0"/>
+                            </a:rPr>
+                          </m:ctrlPr>
+                        </m:dPr>
+                        <m:e>
+                          <m:r>
+                            <a:rPr lang="fr-FR" b="0" i="1" smtClean="0">
+                              <a:latin typeface="Cambria Math" panose="02040503050406030204" pitchFamily="18" charset="0"/>
+                              <a:cs typeface="Times New Roman" panose="02020603050405020304" pitchFamily="18" charset="0"/>
+                            </a:rPr>
+                            <m:t>𝑥</m:t>
+                          </m:r>
+                          <m:r>
+                            <a:rPr lang="fr-FR" b="0" i="1" smtClean="0">
+                              <a:latin typeface="Cambria Math" panose="02040503050406030204" pitchFamily="18" charset="0"/>
+                              <a:cs typeface="Times New Roman" panose="02020603050405020304" pitchFamily="18" charset="0"/>
+                            </a:rPr>
+                            <m:t>+</m:t>
+                          </m:r>
+                          <m:r>
+                            <a:rPr lang="fr-FR" b="0" i="1" smtClean="0">
+                              <a:latin typeface="Cambria Math" panose="02040503050406030204" pitchFamily="18" charset="0"/>
+                              <a:cs typeface="Times New Roman" panose="02020603050405020304" pitchFamily="18" charset="0"/>
+                            </a:rPr>
+                            <m:t>𝑧</m:t>
+                          </m:r>
+                        </m:e>
+                      </m:d>
+                      <m:r>
+                        <a:rPr lang="fr-FR" b="0" i="1" smtClean="0">
+                          <a:latin typeface="Cambria Math" panose="02040503050406030204" pitchFamily="18" charset="0"/>
+                          <a:cs typeface="Times New Roman" panose="02020603050405020304" pitchFamily="18" charset="0"/>
+                        </a:rPr>
+                        <m:t> </m:t>
+                      </m:r>
+                      <m:r>
+                        <a:rPr lang="fr-FR" b="0" i="1" smtClean="0">
+                          <a:latin typeface="Cambria Math" panose="02040503050406030204" pitchFamily="18" charset="0"/>
+                          <a:cs typeface="Times New Roman" panose="02020603050405020304" pitchFamily="18" charset="0"/>
+                        </a:rPr>
+                        <m:t>𝑚𝑜𝑑𝑢𝑙𝑜</m:t>
+                      </m:r>
+                      <m:r>
+                        <a:rPr lang="fr-FR" b="0" i="1" smtClean="0">
+                          <a:latin typeface="Cambria Math" panose="02040503050406030204" pitchFamily="18" charset="0"/>
+                          <a:cs typeface="Times New Roman" panose="02020603050405020304" pitchFamily="18" charset="0"/>
+                        </a:rPr>
+                        <m:t> 26</m:t>
+                      </m:r>
+                    </m:oMath>
+                  </m:oMathPara>
+                </a14:m>
+                <a:endParaRPr lang="fr-FR" dirty="0">
+                  <a:latin typeface="Times New Roman" panose="02020603050405020304" pitchFamily="18" charset="0"/>
+                  <a:cs typeface="Times New Roman" panose="02020603050405020304" pitchFamily="18" charset="0"/>
+                </a:endParaRPr>
+              </a:p>
+              <a:p>
+                <a:r>
+                  <a:rPr lang="fr-FR" dirty="0">
+                    <a:latin typeface="Times New Roman" panose="02020603050405020304" pitchFamily="18" charset="0"/>
+                    <a:cs typeface="Times New Roman" panose="02020603050405020304" pitchFamily="18" charset="0"/>
+                  </a:rPr>
+                  <a:t>Par exemple pour chiffrer la lettre B (indice 1) du message avec la lettre de la clé H (indice 7) on aura:</a:t>
+                </a:r>
+              </a:p>
+              <a:p>
+                <a:pPr/>
+                <a14:m>
+                  <m:oMathPara xmlns:m="http://schemas.openxmlformats.org/officeDocument/2006/math">
+                    <m:oMathParaPr>
+                      <m:jc m:val="centerGroup"/>
+                    </m:oMathParaPr>
+                    <m:oMath xmlns:m="http://schemas.openxmlformats.org/officeDocument/2006/math">
+                      <m:r>
+                        <a:rPr lang="fr-FR" b="0" i="1" smtClean="0">
+                          <a:latin typeface="Cambria Math" panose="02040503050406030204" pitchFamily="18" charset="0"/>
+                          <a:cs typeface="Times New Roman" panose="02020603050405020304" pitchFamily="18" charset="0"/>
+                        </a:rPr>
+                        <m:t>𝑦</m:t>
+                      </m:r>
+                      <m:r>
+                        <a:rPr lang="fr-FR" b="0" i="1" smtClean="0">
+                          <a:latin typeface="Cambria Math" panose="02040503050406030204" pitchFamily="18" charset="0"/>
+                          <a:cs typeface="Times New Roman" panose="02020603050405020304" pitchFamily="18" charset="0"/>
+                        </a:rPr>
+                        <m:t>=</m:t>
+                      </m:r>
+                      <m:d>
+                        <m:dPr>
+                          <m:ctrlPr>
+                            <a:rPr lang="fr-FR" b="0" i="1" smtClean="0">
+                              <a:latin typeface="Cambria Math" panose="02040503050406030204" pitchFamily="18" charset="0"/>
+                              <a:cs typeface="Times New Roman" panose="02020603050405020304" pitchFamily="18" charset="0"/>
+                            </a:rPr>
+                          </m:ctrlPr>
+                        </m:dPr>
+                        <m:e>
+                          <m:r>
+                            <a:rPr lang="fr-FR" b="0" i="1" smtClean="0">
+                              <a:latin typeface="Cambria Math" panose="02040503050406030204" pitchFamily="18" charset="0"/>
+                              <a:cs typeface="Times New Roman" panose="02020603050405020304" pitchFamily="18" charset="0"/>
+                            </a:rPr>
+                            <m:t>1+7</m:t>
+                          </m:r>
+                        </m:e>
+                      </m:d>
+                      <m:r>
+                        <a:rPr lang="fr-FR" b="0" i="1" smtClean="0">
+                          <a:latin typeface="Cambria Math" panose="02040503050406030204" pitchFamily="18" charset="0"/>
+                          <a:cs typeface="Times New Roman" panose="02020603050405020304" pitchFamily="18" charset="0"/>
+                        </a:rPr>
+                        <m:t> </m:t>
+                      </m:r>
+                      <m:r>
+                        <a:rPr lang="fr-FR" b="0" i="1" smtClean="0">
+                          <a:latin typeface="Cambria Math" panose="02040503050406030204" pitchFamily="18" charset="0"/>
+                          <a:cs typeface="Times New Roman" panose="02020603050405020304" pitchFamily="18" charset="0"/>
+                        </a:rPr>
+                        <m:t>𝑚𝑜𝑑𝑢𝑙𝑜</m:t>
+                      </m:r>
+                      <m:r>
+                        <a:rPr lang="fr-FR" b="0" i="1" smtClean="0">
+                          <a:latin typeface="Cambria Math" panose="02040503050406030204" pitchFamily="18" charset="0"/>
+                          <a:cs typeface="Times New Roman" panose="02020603050405020304" pitchFamily="18" charset="0"/>
+                        </a:rPr>
+                        <m:t> 26=8 </m:t>
+                      </m:r>
+                      <m:r>
+                        <a:rPr lang="fr-FR" b="0" i="1" smtClean="0">
+                          <a:latin typeface="Cambria Math" panose="02040503050406030204" pitchFamily="18" charset="0"/>
+                          <a:cs typeface="Times New Roman" panose="02020603050405020304" pitchFamily="18" charset="0"/>
+                        </a:rPr>
+                        <m:t>𝑚𝑜𝑑𝑢𝑙𝑜</m:t>
+                      </m:r>
+                      <m:r>
+                        <a:rPr lang="fr-FR" b="0" i="1" smtClean="0">
+                          <a:latin typeface="Cambria Math" panose="02040503050406030204" pitchFamily="18" charset="0"/>
+                          <a:cs typeface="Times New Roman" panose="02020603050405020304" pitchFamily="18" charset="0"/>
+                        </a:rPr>
+                        <m:t> 26=8 </m:t>
+                      </m:r>
+                      <m:r>
+                        <a:rPr lang="fr-FR" b="0" i="1" smtClean="0">
+                          <a:latin typeface="Cambria Math" panose="02040503050406030204" pitchFamily="18" charset="0"/>
+                          <a:cs typeface="Times New Roman" panose="02020603050405020304" pitchFamily="18" charset="0"/>
+                        </a:rPr>
+                        <m:t>𝑠𝑜𝑖𝑡</m:t>
+                      </m:r>
+                      <m:r>
+                        <a:rPr lang="fr-FR" b="0" i="1" smtClean="0">
+                          <a:latin typeface="Cambria Math" panose="02040503050406030204" pitchFamily="18" charset="0"/>
+                          <a:cs typeface="Times New Roman" panose="02020603050405020304" pitchFamily="18" charset="0"/>
+                        </a:rPr>
+                        <m:t> </m:t>
+                      </m:r>
+                      <m:r>
+                        <a:rPr lang="fr-FR" b="0" i="1" smtClean="0">
+                          <a:latin typeface="Cambria Math" panose="02040503050406030204" pitchFamily="18" charset="0"/>
+                          <a:cs typeface="Times New Roman" panose="02020603050405020304" pitchFamily="18" charset="0"/>
+                        </a:rPr>
+                        <m:t>𝑙𝑎</m:t>
+                      </m:r>
+                      <m:r>
+                        <a:rPr lang="fr-FR" b="0" i="1" smtClean="0">
+                          <a:latin typeface="Cambria Math" panose="02040503050406030204" pitchFamily="18" charset="0"/>
+                          <a:cs typeface="Times New Roman" panose="02020603050405020304" pitchFamily="18" charset="0"/>
+                        </a:rPr>
+                        <m:t> </m:t>
+                      </m:r>
+                      <m:r>
+                        <a:rPr lang="fr-FR" b="0" i="1" smtClean="0">
+                          <a:latin typeface="Cambria Math" panose="02040503050406030204" pitchFamily="18" charset="0"/>
+                          <a:cs typeface="Times New Roman" panose="02020603050405020304" pitchFamily="18" charset="0"/>
+                        </a:rPr>
+                        <m:t>𝑙𝑒𝑡𝑡𝑟𝑒</m:t>
+                      </m:r>
+                      <m:r>
+                        <a:rPr lang="fr-FR" b="0" i="1" smtClean="0">
+                          <a:latin typeface="Cambria Math" panose="02040503050406030204" pitchFamily="18" charset="0"/>
+                          <a:cs typeface="Times New Roman" panose="02020603050405020304" pitchFamily="18" charset="0"/>
+                        </a:rPr>
+                        <m:t> </m:t>
+                      </m:r>
+                      <m:r>
+                        <a:rPr lang="fr-FR" b="0" i="1" smtClean="0">
+                          <a:latin typeface="Cambria Math" panose="02040503050406030204" pitchFamily="18" charset="0"/>
+                          <a:cs typeface="Times New Roman" panose="02020603050405020304" pitchFamily="18" charset="0"/>
+                        </a:rPr>
+                        <m:t>𝐼</m:t>
+                      </m:r>
+                    </m:oMath>
+                  </m:oMathPara>
+                </a14:m>
+                <a:endParaRPr lang="fr-FR" dirty="0">
+                  <a:latin typeface="Times New Roman" panose="02020603050405020304" pitchFamily="18" charset="0"/>
+                  <a:cs typeface="Times New Roman" panose="02020603050405020304" pitchFamily="18" charset="0"/>
+                </a:endParaRPr>
+              </a:p>
+              <a:p>
+                <a:r>
+                  <a:rPr lang="fr-FR" b="1" dirty="0">
+                    <a:latin typeface="Times New Roman" panose="02020603050405020304" pitchFamily="18" charset="0"/>
+                    <a:cs typeface="Times New Roman" panose="02020603050405020304" pitchFamily="18" charset="0"/>
+                  </a:rPr>
+                  <a:t>Le modulo est le reste de la division euclidienne en Python il est représenté par %.</a:t>
+                </a:r>
+              </a:p>
+              <a:p>
+                <a:r>
+                  <a:rPr lang="fr-FR" b="1" dirty="0">
+                    <a:latin typeface="Times New Roman" panose="02020603050405020304" pitchFamily="18" charset="0"/>
+                    <a:cs typeface="Times New Roman" panose="02020603050405020304" pitchFamily="18" charset="0"/>
+                  </a:rPr>
+                  <a:t>Par exemple 2%1=0 et 5%2=1</a:t>
+                </a:r>
+              </a:p>
+            </p:txBody>
+          </p:sp>
+        </mc:Choice>
+        <mc:Fallback xmlns="">
+          <p:sp>
+            <p:nvSpPr>
+              <p:cNvPr id="7" name="ZoneTexte 6">
+                <a:extLst>
+                  <a:ext uri="{FF2B5EF4-FFF2-40B4-BE49-F238E27FC236}">
+                    <a16:creationId xmlns:a16="http://schemas.microsoft.com/office/drawing/2014/main" id="{990321CC-02EF-ED64-0AA9-789ED60F60B1}"/>
+                  </a:ext>
+                </a:extLst>
+              </p:cNvPr>
+              <p:cNvSpPr txBox="1">
+                <a:spLocks noRot="1" noChangeAspect="1" noMove="1" noResize="1" noEditPoints="1" noAdjustHandles="1" noChangeArrowheads="1" noChangeShapeType="1" noTextEdit="1"/>
+              </p:cNvSpPr>
+              <p:nvPr/>
+            </p:nvSpPr>
+            <p:spPr>
+              <a:xfrm>
+                <a:off x="397564" y="1141856"/>
+                <a:ext cx="11088982" cy="1938992"/>
+              </a:xfrm>
+              <a:prstGeom prst="rect">
+                <a:avLst/>
+              </a:prstGeom>
+              <a:blipFill>
+                <a:blip r:embed="rId2"/>
+                <a:stretch>
+                  <a:fillRect l="-550" t="-1572" b="-4717"/>
+                </a:stretch>
+              </a:blipFill>
+            </p:spPr>
+            <p:txBody>
+              <a:bodyPr/>
+              <a:lstStyle/>
+              <a:p>
+                <a:r>
+                  <a:rPr lang="fr-FR">
+                    <a:noFill/>
+                  </a:rPr>
+                  <a:t> </a:t>
+                </a:r>
+              </a:p>
+            </p:txBody>
+          </p:sp>
+        </mc:Fallback>
+      </mc:AlternateContent>
+      <mc:AlternateContent xmlns:mc="http://schemas.openxmlformats.org/markup-compatibility/2006" xmlns:a14="http://schemas.microsoft.com/office/drawing/2010/main">
+        <mc:Choice Requires="a14">
+          <p:sp>
+            <p:nvSpPr>
+              <p:cNvPr id="10" name="ZoneTexte 9">
+                <a:extLst>
+                  <a:ext uri="{FF2B5EF4-FFF2-40B4-BE49-F238E27FC236}">
+                    <a16:creationId xmlns:a16="http://schemas.microsoft.com/office/drawing/2014/main" id="{183593BF-4B80-C0DA-D5C3-DAFAD01F2291}"/>
+                  </a:ext>
+                </a:extLst>
+              </p:cNvPr>
+              <p:cNvSpPr txBox="1"/>
+              <p:nvPr/>
+            </p:nvSpPr>
+            <p:spPr>
+              <a:xfrm>
+                <a:off x="314574" y="3293862"/>
+                <a:ext cx="11088982" cy="1938992"/>
+              </a:xfrm>
+              <a:prstGeom prst="rect">
+                <a:avLst/>
+              </a:prstGeom>
+              <a:noFill/>
+            </p:spPr>
+            <p:txBody>
+              <a:bodyPr wrap="square" rtlCol="0">
+                <a:spAutoFit/>
+              </a:bodyPr>
+              <a:lstStyle>
+                <a:defPPr>
+                  <a:defRPr lang="en-US"/>
+                </a:defPPr>
+                <a:lvl1pPr>
+                  <a:defRPr sz="2000"/>
+                </a:lvl1pPr>
+              </a:lstStyle>
+              <a:p>
+                <a:r>
+                  <a:rPr lang="fr-FR" dirty="0">
+                    <a:latin typeface="Times New Roman" panose="02020603050405020304" pitchFamily="18" charset="0"/>
+                    <a:cs typeface="Times New Roman" panose="02020603050405020304" pitchFamily="18" charset="0"/>
+                  </a:rPr>
+                  <a:t>Quand on veut déchiffrer on cherche l’indice </a:t>
+                </a:r>
+                <a14:m>
+                  <m:oMath xmlns:m="http://schemas.openxmlformats.org/officeDocument/2006/math">
+                    <m:r>
+                      <a:rPr lang="fr-FR" b="0" i="1" smtClean="0">
+                        <a:latin typeface="Cambria Math" panose="02040503050406030204" pitchFamily="18" charset="0"/>
+                        <a:cs typeface="Times New Roman" panose="02020603050405020304" pitchFamily="18" charset="0"/>
+                      </a:rPr>
+                      <m:t>𝑧</m:t>
+                    </m:r>
+                  </m:oMath>
+                </a14:m>
+                <a:r>
+                  <a:rPr lang="fr-FR" b="1" dirty="0">
+                    <a:latin typeface="Times New Roman" panose="02020603050405020304" pitchFamily="18" charset="0"/>
+                    <a:cs typeface="Times New Roman" panose="02020603050405020304" pitchFamily="18" charset="0"/>
+                  </a:rPr>
+                  <a:t> </a:t>
+                </a:r>
+                <a:r>
+                  <a:rPr lang="fr-FR" dirty="0">
+                    <a:latin typeface="Times New Roman" panose="02020603050405020304" pitchFamily="18" charset="0"/>
+                    <a:cs typeface="Times New Roman" panose="02020603050405020304" pitchFamily="18" charset="0"/>
+                  </a:rPr>
+                  <a:t>par les formules suivantes:</a:t>
+                </a:r>
+              </a:p>
+              <a:p>
+                <a:pPr marL="342900" indent="-342900">
+                  <a:buFont typeface="Arial" panose="020B0604020202020204" pitchFamily="34" charset="0"/>
+                  <a:buChar char="•"/>
+                </a:pPr>
+                <a:r>
+                  <a:rPr lang="fr-FR" dirty="0">
+                    <a:latin typeface="Times New Roman" panose="02020603050405020304" pitchFamily="18" charset="0"/>
+                    <a:cs typeface="Times New Roman" panose="02020603050405020304" pitchFamily="18" charset="0"/>
+                  </a:rPr>
+                  <a:t>Si </a:t>
+                </a:r>
+                <a14:m>
+                  <m:oMath xmlns:m="http://schemas.openxmlformats.org/officeDocument/2006/math">
+                    <m:r>
+                      <a:rPr lang="fr-FR" b="0" i="1" smtClean="0">
+                        <a:latin typeface="Cambria Math" panose="02040503050406030204" pitchFamily="18" charset="0"/>
+                        <a:cs typeface="Times New Roman" panose="02020603050405020304" pitchFamily="18" charset="0"/>
+                      </a:rPr>
+                      <m:t>𝑥</m:t>
+                    </m:r>
+                    <m:r>
+                      <a:rPr lang="fr-FR" b="0" i="1" smtClean="0">
+                        <a:latin typeface="Cambria Math" panose="02040503050406030204" pitchFamily="18" charset="0"/>
+                        <a:cs typeface="Times New Roman" panose="02020603050405020304" pitchFamily="18" charset="0"/>
+                      </a:rPr>
+                      <m:t>&gt;</m:t>
+                    </m:r>
+                    <m:r>
+                      <a:rPr lang="fr-FR" b="0" i="1" smtClean="0">
+                        <a:latin typeface="Cambria Math" panose="02040503050406030204" pitchFamily="18" charset="0"/>
+                        <a:cs typeface="Times New Roman" panose="02020603050405020304" pitchFamily="18" charset="0"/>
+                      </a:rPr>
+                      <m:t>𝑦</m:t>
+                    </m:r>
+                  </m:oMath>
+                </a14:m>
+                <a:r>
+                  <a:rPr lang="fr-FR" dirty="0">
+                    <a:latin typeface="Times New Roman" panose="02020603050405020304" pitchFamily="18" charset="0"/>
+                    <a:cs typeface="Times New Roman" panose="02020603050405020304" pitchFamily="18" charset="0"/>
+                  </a:rPr>
+                  <a:t> alors </a:t>
+                </a:r>
+                <a14:m>
+                  <m:oMath xmlns:m="http://schemas.openxmlformats.org/officeDocument/2006/math">
+                    <m:r>
+                      <a:rPr lang="fr-FR" b="0" i="1" smtClean="0">
+                        <a:latin typeface="Cambria Math" panose="02040503050406030204" pitchFamily="18" charset="0"/>
+                        <a:cs typeface="Times New Roman" panose="02020603050405020304" pitchFamily="18" charset="0"/>
+                      </a:rPr>
+                      <m:t>𝑧</m:t>
+                    </m:r>
+                    <m:r>
+                      <a:rPr lang="fr-FR" b="0" i="1" smtClean="0">
+                        <a:latin typeface="Cambria Math" panose="02040503050406030204" pitchFamily="18" charset="0"/>
+                        <a:cs typeface="Times New Roman" panose="02020603050405020304" pitchFamily="18" charset="0"/>
+                      </a:rPr>
+                      <m:t>=</m:t>
+                    </m:r>
+                    <m:d>
+                      <m:dPr>
+                        <m:ctrlPr>
+                          <a:rPr lang="fr-FR" b="0" i="1" smtClean="0">
+                            <a:latin typeface="Cambria Math" panose="02040503050406030204" pitchFamily="18" charset="0"/>
+                            <a:cs typeface="Times New Roman" panose="02020603050405020304" pitchFamily="18" charset="0"/>
+                          </a:rPr>
+                        </m:ctrlPr>
+                      </m:dPr>
+                      <m:e>
+                        <m:r>
+                          <a:rPr lang="fr-FR" b="0" i="1" smtClean="0">
+                            <a:latin typeface="Cambria Math" panose="02040503050406030204" pitchFamily="18" charset="0"/>
+                            <a:cs typeface="Times New Roman" panose="02020603050405020304" pitchFamily="18" charset="0"/>
+                          </a:rPr>
+                          <m:t>26 −</m:t>
+                        </m:r>
+                        <m:r>
+                          <a:rPr lang="fr-FR" b="0" i="1" smtClean="0">
+                            <a:latin typeface="Cambria Math" panose="02040503050406030204" pitchFamily="18" charset="0"/>
+                            <a:cs typeface="Times New Roman" panose="02020603050405020304" pitchFamily="18" charset="0"/>
+                          </a:rPr>
+                          <m:t>𝑥</m:t>
+                        </m:r>
+                      </m:e>
+                    </m:d>
+                    <m:r>
+                      <a:rPr lang="fr-FR" b="0" i="1" smtClean="0">
+                        <a:latin typeface="Cambria Math" panose="02040503050406030204" pitchFamily="18" charset="0"/>
+                        <a:cs typeface="Times New Roman" panose="02020603050405020304" pitchFamily="18" charset="0"/>
+                      </a:rPr>
+                      <m:t>+</m:t>
+                    </m:r>
+                    <m:r>
+                      <a:rPr lang="fr-FR" b="0" i="1" smtClean="0">
+                        <a:latin typeface="Cambria Math" panose="02040503050406030204" pitchFamily="18" charset="0"/>
+                        <a:cs typeface="Times New Roman" panose="02020603050405020304" pitchFamily="18" charset="0"/>
+                      </a:rPr>
+                      <m:t>𝑦</m:t>
+                    </m:r>
+                  </m:oMath>
+                </a14:m>
+                <a:endParaRPr lang="fr-FR" dirty="0">
+                  <a:latin typeface="Times New Roman" panose="02020603050405020304" pitchFamily="18" charset="0"/>
+                  <a:cs typeface="Times New Roman" panose="02020603050405020304" pitchFamily="18" charset="0"/>
+                </a:endParaRPr>
+              </a:p>
+              <a:p>
+                <a:pPr marL="342900" indent="-342900">
+                  <a:buFont typeface="Arial" panose="020B0604020202020204" pitchFamily="34" charset="0"/>
+                  <a:buChar char="•"/>
+                </a:pPr>
+                <a:r>
+                  <a:rPr lang="fr-FR" dirty="0">
+                    <a:latin typeface="Times New Roman" panose="02020603050405020304" pitchFamily="18" charset="0"/>
+                    <a:cs typeface="Times New Roman" panose="02020603050405020304" pitchFamily="18" charset="0"/>
+                  </a:rPr>
+                  <a:t>Sinon </a:t>
+                </a:r>
+                <a14:m>
+                  <m:oMath xmlns:m="http://schemas.openxmlformats.org/officeDocument/2006/math">
+                    <m:r>
+                      <a:rPr lang="fr-FR" b="0" i="1" smtClean="0">
+                        <a:latin typeface="Cambria Math" panose="02040503050406030204" pitchFamily="18" charset="0"/>
+                        <a:cs typeface="Times New Roman" panose="02020603050405020304" pitchFamily="18" charset="0"/>
+                      </a:rPr>
+                      <m:t>𝑧</m:t>
+                    </m:r>
+                    <m:r>
+                      <a:rPr lang="fr-FR" b="0" i="1" smtClean="0">
+                        <a:latin typeface="Cambria Math" panose="02040503050406030204" pitchFamily="18" charset="0"/>
+                        <a:cs typeface="Times New Roman" panose="02020603050405020304" pitchFamily="18" charset="0"/>
+                      </a:rPr>
+                      <m:t>=</m:t>
+                    </m:r>
+                    <m:r>
+                      <a:rPr lang="fr-FR" b="0" i="1" smtClean="0">
+                        <a:latin typeface="Cambria Math" panose="02040503050406030204" pitchFamily="18" charset="0"/>
+                        <a:cs typeface="Times New Roman" panose="02020603050405020304" pitchFamily="18" charset="0"/>
+                      </a:rPr>
+                      <m:t>𝑦</m:t>
+                    </m:r>
+                    <m:r>
+                      <a:rPr lang="fr-FR" b="0" i="1" smtClean="0">
+                        <a:latin typeface="Cambria Math" panose="02040503050406030204" pitchFamily="18" charset="0"/>
+                        <a:cs typeface="Times New Roman" panose="02020603050405020304" pitchFamily="18" charset="0"/>
+                      </a:rPr>
+                      <m:t>−</m:t>
+                    </m:r>
+                    <m:r>
+                      <a:rPr lang="fr-FR" b="0" i="1" smtClean="0">
+                        <a:latin typeface="Cambria Math" panose="02040503050406030204" pitchFamily="18" charset="0"/>
+                        <a:cs typeface="Times New Roman" panose="02020603050405020304" pitchFamily="18" charset="0"/>
+                      </a:rPr>
+                      <m:t>𝑥</m:t>
+                    </m:r>
+                  </m:oMath>
+                </a14:m>
+                <a:endParaRPr lang="fr-FR" dirty="0">
+                  <a:latin typeface="Times New Roman" panose="02020603050405020304" pitchFamily="18" charset="0"/>
+                  <a:cs typeface="Times New Roman" panose="02020603050405020304" pitchFamily="18" charset="0"/>
+                </a:endParaRPr>
+              </a:p>
+              <a:p>
+                <a:r>
+                  <a:rPr lang="fr-FR" dirty="0">
+                    <a:latin typeface="Times New Roman" panose="02020603050405020304" pitchFamily="18" charset="0"/>
+                    <a:cs typeface="Times New Roman" panose="02020603050405020304" pitchFamily="18" charset="0"/>
+                  </a:rPr>
+                  <a:t>Par exemple pour déchiffrer la lettre I (indice 8) du message chiffré avec la lettre de la clé H (indice 7) on aura:</a:t>
+                </a:r>
+              </a:p>
+              <a:p>
+                <a:pPr/>
+                <a14:m>
+                  <m:oMathPara xmlns:m="http://schemas.openxmlformats.org/officeDocument/2006/math">
+                    <m:oMathParaPr>
+                      <m:jc m:val="centerGroup"/>
+                    </m:oMathParaPr>
+                    <m:oMath xmlns:m="http://schemas.openxmlformats.org/officeDocument/2006/math">
+                      <m:r>
+                        <a:rPr lang="fr-FR" b="0" i="1" smtClean="0">
+                          <a:latin typeface="Cambria Math" panose="02040503050406030204" pitchFamily="18" charset="0"/>
+                          <a:cs typeface="Times New Roman" panose="02020603050405020304" pitchFamily="18" charset="0"/>
+                        </a:rPr>
+                        <m:t>𝑥</m:t>
+                      </m:r>
+                      <m:r>
+                        <a:rPr lang="fr-FR" b="0" i="1" smtClean="0">
+                          <a:latin typeface="Cambria Math" panose="02040503050406030204" pitchFamily="18" charset="0"/>
+                          <a:cs typeface="Times New Roman" panose="02020603050405020304" pitchFamily="18" charset="0"/>
+                        </a:rPr>
+                        <m:t>=7&lt;</m:t>
+                      </m:r>
+                      <m:r>
+                        <a:rPr lang="fr-FR" b="0" i="1" smtClean="0">
+                          <a:latin typeface="Cambria Math" panose="02040503050406030204" pitchFamily="18" charset="0"/>
+                          <a:cs typeface="Times New Roman" panose="02020603050405020304" pitchFamily="18" charset="0"/>
+                        </a:rPr>
+                        <m:t>𝑦</m:t>
+                      </m:r>
+                      <m:r>
+                        <a:rPr lang="fr-FR" b="0" i="1" smtClean="0">
+                          <a:latin typeface="Cambria Math" panose="02040503050406030204" pitchFamily="18" charset="0"/>
+                          <a:cs typeface="Times New Roman" panose="02020603050405020304" pitchFamily="18" charset="0"/>
+                        </a:rPr>
+                        <m:t>=8 </m:t>
+                      </m:r>
+                      <m:r>
+                        <a:rPr lang="fr-FR" b="0" i="1" smtClean="0">
+                          <a:latin typeface="Cambria Math" panose="02040503050406030204" pitchFamily="18" charset="0"/>
+                          <a:cs typeface="Times New Roman" panose="02020603050405020304" pitchFamily="18" charset="0"/>
+                        </a:rPr>
+                        <m:t>𝑎𝑙𝑜𝑟𝑠</m:t>
+                      </m:r>
+                      <m:r>
+                        <a:rPr lang="fr-FR" b="0" i="1" smtClean="0">
+                          <a:latin typeface="Cambria Math" panose="02040503050406030204" pitchFamily="18" charset="0"/>
+                          <a:cs typeface="Times New Roman" panose="02020603050405020304" pitchFamily="18" charset="0"/>
+                        </a:rPr>
+                        <m:t> </m:t>
+                      </m:r>
+                      <m:r>
+                        <a:rPr lang="fr-FR" b="0" i="1" smtClean="0">
+                          <a:latin typeface="Cambria Math" panose="02040503050406030204" pitchFamily="18" charset="0"/>
+                          <a:cs typeface="Times New Roman" panose="02020603050405020304" pitchFamily="18" charset="0"/>
+                        </a:rPr>
+                        <m:t>𝑧</m:t>
+                      </m:r>
+                      <m:r>
+                        <a:rPr lang="fr-FR" b="0" i="1" smtClean="0">
+                          <a:latin typeface="Cambria Math" panose="02040503050406030204" pitchFamily="18" charset="0"/>
+                          <a:cs typeface="Times New Roman" panose="02020603050405020304" pitchFamily="18" charset="0"/>
+                        </a:rPr>
+                        <m:t>=8−7=1 </m:t>
+                      </m:r>
+                      <m:r>
+                        <a:rPr lang="fr-FR" b="0" i="1" smtClean="0">
+                          <a:latin typeface="Cambria Math" panose="02040503050406030204" pitchFamily="18" charset="0"/>
+                          <a:cs typeface="Times New Roman" panose="02020603050405020304" pitchFamily="18" charset="0"/>
+                        </a:rPr>
+                        <m:t>𝑠𝑜𝑖𝑡</m:t>
+                      </m:r>
+                      <m:r>
+                        <a:rPr lang="fr-FR" b="0" i="1" smtClean="0">
+                          <a:latin typeface="Cambria Math" panose="02040503050406030204" pitchFamily="18" charset="0"/>
+                          <a:cs typeface="Times New Roman" panose="02020603050405020304" pitchFamily="18" charset="0"/>
+                        </a:rPr>
+                        <m:t> </m:t>
+                      </m:r>
+                      <m:r>
+                        <a:rPr lang="fr-FR" b="0" i="1" smtClean="0">
+                          <a:latin typeface="Cambria Math" panose="02040503050406030204" pitchFamily="18" charset="0"/>
+                          <a:cs typeface="Times New Roman" panose="02020603050405020304" pitchFamily="18" charset="0"/>
+                        </a:rPr>
+                        <m:t>𝑙𝑎</m:t>
+                      </m:r>
+                      <m:r>
+                        <a:rPr lang="fr-FR" b="0" i="1" smtClean="0">
+                          <a:latin typeface="Cambria Math" panose="02040503050406030204" pitchFamily="18" charset="0"/>
+                          <a:cs typeface="Times New Roman" panose="02020603050405020304" pitchFamily="18" charset="0"/>
+                        </a:rPr>
+                        <m:t> </m:t>
+                      </m:r>
+                      <m:r>
+                        <a:rPr lang="fr-FR" b="0" i="1" smtClean="0">
+                          <a:latin typeface="Cambria Math" panose="02040503050406030204" pitchFamily="18" charset="0"/>
+                          <a:cs typeface="Times New Roman" panose="02020603050405020304" pitchFamily="18" charset="0"/>
+                        </a:rPr>
+                        <m:t>𝑙𝑒𝑡𝑡𝑟𝑒</m:t>
+                      </m:r>
+                      <m:r>
+                        <a:rPr lang="fr-FR" b="0" i="1" smtClean="0">
+                          <a:latin typeface="Cambria Math" panose="02040503050406030204" pitchFamily="18" charset="0"/>
+                          <a:cs typeface="Times New Roman" panose="02020603050405020304" pitchFamily="18" charset="0"/>
+                        </a:rPr>
+                        <m:t> </m:t>
+                      </m:r>
+                      <m:r>
+                        <a:rPr lang="fr-FR" b="0" i="1" smtClean="0">
+                          <a:latin typeface="Cambria Math" panose="02040503050406030204" pitchFamily="18" charset="0"/>
+                          <a:cs typeface="Times New Roman" panose="02020603050405020304" pitchFamily="18" charset="0"/>
+                        </a:rPr>
+                        <m:t>𝐵</m:t>
+                      </m:r>
+                    </m:oMath>
+                  </m:oMathPara>
+                </a14:m>
+                <a:endParaRPr lang="fr-FR" dirty="0">
+                  <a:latin typeface="Times New Roman" panose="02020603050405020304" pitchFamily="18" charset="0"/>
+                  <a:cs typeface="Times New Roman" panose="02020603050405020304" pitchFamily="18" charset="0"/>
+                </a:endParaRPr>
+              </a:p>
+            </p:txBody>
+          </p:sp>
+        </mc:Choice>
+        <mc:Fallback xmlns="">
+          <p:sp>
+            <p:nvSpPr>
+              <p:cNvPr id="10" name="ZoneTexte 9">
+                <a:extLst>
+                  <a:ext uri="{FF2B5EF4-FFF2-40B4-BE49-F238E27FC236}">
+                    <a16:creationId xmlns:a16="http://schemas.microsoft.com/office/drawing/2014/main" id="{183593BF-4B80-C0DA-D5C3-DAFAD01F2291}"/>
+                  </a:ext>
+                </a:extLst>
+              </p:cNvPr>
+              <p:cNvSpPr txBox="1">
+                <a:spLocks noRot="1" noChangeAspect="1" noMove="1" noResize="1" noEditPoints="1" noAdjustHandles="1" noChangeArrowheads="1" noChangeShapeType="1" noTextEdit="1"/>
+              </p:cNvSpPr>
+              <p:nvPr/>
+            </p:nvSpPr>
+            <p:spPr>
+              <a:xfrm>
+                <a:off x="314574" y="3293862"/>
+                <a:ext cx="11088982" cy="1938992"/>
+              </a:xfrm>
+              <a:prstGeom prst="rect">
+                <a:avLst/>
+              </a:prstGeom>
+              <a:blipFill>
+                <a:blip r:embed="rId3"/>
+                <a:stretch>
+                  <a:fillRect l="-605" t="-1572" b="-1258"/>
+                </a:stretch>
+              </a:blipFill>
+            </p:spPr>
+            <p:txBody>
+              <a:bodyPr/>
+              <a:lstStyle/>
+              <a:p>
+                <a:r>
+                  <a:rPr lang="fr-FR">
+                    <a:noFill/>
+                  </a:rPr>
+                  <a:t> </a:t>
+                </a:r>
+              </a:p>
+            </p:txBody>
+          </p:sp>
+        </mc:Fallback>
+      </mc:AlternateContent>
+      <p:sp>
+        <p:nvSpPr>
+          <p:cNvPr id="11" name="ZoneTexte 10">
+            <a:extLst>
+              <a:ext uri="{FF2B5EF4-FFF2-40B4-BE49-F238E27FC236}">
+                <a16:creationId xmlns:a16="http://schemas.microsoft.com/office/drawing/2014/main" id="{35C67A25-83F3-E82B-588F-A89F004A2A99}"/>
+              </a:ext>
+            </a:extLst>
+          </p:cNvPr>
+          <p:cNvSpPr txBox="1"/>
+          <p:nvPr/>
+        </p:nvSpPr>
+        <p:spPr>
+          <a:xfrm>
+            <a:off x="314574" y="5362300"/>
+            <a:ext cx="11088982" cy="707886"/>
+          </a:xfrm>
+          <a:prstGeom prst="rect">
+            <a:avLst/>
+          </a:prstGeom>
+          <a:noFill/>
+        </p:spPr>
+        <p:txBody>
+          <a:bodyPr wrap="square" rtlCol="0">
+            <a:spAutoFit/>
+          </a:bodyPr>
+          <a:lstStyle>
+            <a:defPPr>
+              <a:defRPr lang="en-US"/>
+            </a:defPPr>
+            <a:lvl1pPr>
+              <a:defRPr sz="2000"/>
+            </a:lvl1pPr>
+          </a:lstStyle>
+          <a:p>
+            <a:r>
+              <a:rPr lang="fr-FR" b="1" dirty="0">
+                <a:latin typeface="Times New Roman" panose="02020603050405020304" pitchFamily="18" charset="0"/>
+                <a:cs typeface="Times New Roman" panose="02020603050405020304" pitchFamily="18" charset="0"/>
+              </a:rPr>
+              <a:t>Les chiffres de César et Vigenère appartiennent à la famille du chiffrement symétrique car on utilise la même clé pour chiffrer et déchiffrer le message. </a:t>
+            </a:r>
+          </a:p>
+        </p:txBody>
+      </p:sp>
+    </p:spTree>
+    <p:extLst>
+      <p:ext uri="{BB962C8B-B14F-4D97-AF65-F5344CB8AC3E}">
+        <p14:creationId xmlns:p14="http://schemas.microsoft.com/office/powerpoint/2010/main" val="1835164876"/>
+      </p:ext>
+    </p:extLst>
+  </p:cSld>
+  <p:clrMapOvr>
+    <a:masterClrMapping/>
+  </p:clrMapOvr>
+</p:sld>
+</file>
+
+<file path=ppt/slides/slide23.xml><?xml version="1.0" encoding="utf-8"?>
+<p:sld xmlns:a="http://schemas.openxmlformats.org/drawingml/2006/main" xmlns:r="http://schemas.openxmlformats.org/officeDocument/2006/relationships" xmlns:p="http://schemas.openxmlformats.org/presentationml/2006/main">
+  <p:cSld>
+    <p:spTree>
+      <p:nvGrpSpPr>
+        <p:cNvPr id="1" name=""/>
+        <p:cNvGrpSpPr/>
+        <p:nvPr/>
+      </p:nvGrpSpPr>
+      <p:grpSpPr>
+        <a:xfrm>
+          <a:off x="0" y="0"/>
+          <a:ext cx="0" cy="0"/>
+          <a:chOff x="0" y="0"/>
+          <a:chExt cx="0" cy="0"/>
+        </a:xfrm>
+      </p:grpSpPr>
+      <p:sp>
+        <p:nvSpPr>
+          <p:cNvPr id="4" name="Espace réservé du pied de page 3">
+            <a:extLst>
+              <a:ext uri="{FF2B5EF4-FFF2-40B4-BE49-F238E27FC236}">
+                <a16:creationId xmlns:a16="http://schemas.microsoft.com/office/drawing/2014/main" id="{8FEEC940-4BFF-956C-713A-1CE73C436B6F}"/>
+              </a:ext>
+            </a:extLst>
+          </p:cNvPr>
+          <p:cNvSpPr>
+            <a:spLocks noGrp="1"/>
+          </p:cNvSpPr>
+          <p:nvPr>
+            <p:ph type="ftr" sz="quarter" idx="11"/>
+          </p:nvPr>
+        </p:nvSpPr>
+        <p:spPr/>
+        <p:txBody>
+          <a:bodyPr/>
+          <a:lstStyle/>
+          <a:p>
+            <a:r>
+              <a:rPr lang="fr-FR"/>
+              <a:t>Cours: Python | Auteur: TUO N. Ismaël Maurice 
+</a:t>
+            </a:r>
+          </a:p>
+        </p:txBody>
+      </p:sp>
+      <p:sp>
+        <p:nvSpPr>
+          <p:cNvPr id="5" name="Espace réservé du numéro de diapositive 4">
+            <a:extLst>
+              <a:ext uri="{FF2B5EF4-FFF2-40B4-BE49-F238E27FC236}">
+                <a16:creationId xmlns:a16="http://schemas.microsoft.com/office/drawing/2014/main" id="{CE50FB16-F89F-D7CA-C6AA-CFC075094990}"/>
+              </a:ext>
+            </a:extLst>
+          </p:cNvPr>
+          <p:cNvSpPr>
+            <a:spLocks noGrp="1"/>
+          </p:cNvSpPr>
+          <p:nvPr>
+            <p:ph type="sldNum" sz="quarter" idx="12"/>
+          </p:nvPr>
+        </p:nvSpPr>
+        <p:spPr/>
+        <p:txBody>
+          <a:bodyPr/>
+          <a:lstStyle/>
+          <a:p>
+            <a:fld id="{B8C3BB88-DD29-4D42-B62E-D7D541DB4348}" type="slidenum">
+              <a:rPr lang="fr-FR" smtClean="0"/>
+              <a:t>23</a:t>
+            </a:fld>
+            <a:endParaRPr lang="fr-FR"/>
+          </a:p>
+        </p:txBody>
+      </p:sp>
+      <p:sp>
+        <p:nvSpPr>
+          <p:cNvPr id="6" name="ZoneTexte 5">
+            <a:extLst>
+              <a:ext uri="{FF2B5EF4-FFF2-40B4-BE49-F238E27FC236}">
+                <a16:creationId xmlns:a16="http://schemas.microsoft.com/office/drawing/2014/main" id="{84F10693-2FE8-EFC8-8DB6-84BFD181D260}"/>
+              </a:ext>
+            </a:extLst>
+          </p:cNvPr>
+          <p:cNvSpPr txBox="1"/>
+          <p:nvPr/>
+        </p:nvSpPr>
+        <p:spPr>
+          <a:xfrm>
+            <a:off x="397564" y="218526"/>
+            <a:ext cx="5795005" cy="461665"/>
+          </a:xfrm>
+          <a:prstGeom prst="rect">
+            <a:avLst/>
+          </a:prstGeom>
+          <a:noFill/>
+        </p:spPr>
+        <p:txBody>
+          <a:bodyPr wrap="square" rtlCol="0">
+            <a:spAutoFit/>
+          </a:bodyPr>
+          <a:lstStyle/>
+          <a:p>
+            <a:r>
+              <a:rPr lang="fr-FR" sz="2400" b="1" dirty="0">
+                <a:latin typeface="Times New Roman" panose="02020603050405020304" pitchFamily="18" charset="0"/>
+                <a:cs typeface="Times New Roman" panose="02020603050405020304" pitchFamily="18" charset="0"/>
+              </a:rPr>
+              <a:t>Exercices</a:t>
+            </a:r>
+          </a:p>
+        </p:txBody>
+      </p:sp>
+      <p:cxnSp>
+        <p:nvCxnSpPr>
+          <p:cNvPr id="3" name="Connecteur droit 2">
+            <a:extLst>
+              <a:ext uri="{FF2B5EF4-FFF2-40B4-BE49-F238E27FC236}">
+                <a16:creationId xmlns:a16="http://schemas.microsoft.com/office/drawing/2014/main" id="{6AC8021D-4898-08B9-18A0-60AC71EF613E}"/>
+              </a:ext>
+            </a:extLst>
+          </p:cNvPr>
+          <p:cNvCxnSpPr>
+            <a:cxnSpLocks/>
+          </p:cNvCxnSpPr>
+          <p:nvPr/>
+        </p:nvCxnSpPr>
+        <p:spPr>
+          <a:xfrm>
+            <a:off x="500932" y="680191"/>
+            <a:ext cx="11178450" cy="0"/>
+          </a:xfrm>
+          <a:prstGeom prst="line">
+            <a:avLst/>
+          </a:prstGeom>
+          <a:ln/>
+        </p:spPr>
+        <p:style>
+          <a:lnRef idx="3">
+            <a:schemeClr val="accent3"/>
+          </a:lnRef>
+          <a:fillRef idx="0">
+            <a:schemeClr val="accent3"/>
+          </a:fillRef>
+          <a:effectRef idx="2">
+            <a:schemeClr val="accent3"/>
+          </a:effectRef>
+          <a:fontRef idx="minor">
+            <a:schemeClr val="tx1"/>
+          </a:fontRef>
+        </p:style>
+      </p:cxnSp>
+      <p:sp>
+        <p:nvSpPr>
+          <p:cNvPr id="7" name="ZoneTexte 6">
+            <a:extLst>
+              <a:ext uri="{FF2B5EF4-FFF2-40B4-BE49-F238E27FC236}">
+                <a16:creationId xmlns:a16="http://schemas.microsoft.com/office/drawing/2014/main" id="{990321CC-02EF-ED64-0AA9-789ED60F60B1}"/>
+              </a:ext>
+            </a:extLst>
+          </p:cNvPr>
+          <p:cNvSpPr txBox="1"/>
+          <p:nvPr/>
+        </p:nvSpPr>
+        <p:spPr>
+          <a:xfrm>
+            <a:off x="419649" y="810461"/>
+            <a:ext cx="11088982" cy="1323439"/>
+          </a:xfrm>
+          <a:prstGeom prst="rect">
+            <a:avLst/>
+          </a:prstGeom>
+          <a:noFill/>
+        </p:spPr>
+        <p:txBody>
+          <a:bodyPr wrap="square" rtlCol="0">
+            <a:spAutoFit/>
+          </a:bodyPr>
+          <a:lstStyle>
+            <a:defPPr>
+              <a:defRPr lang="en-US"/>
+            </a:defPPr>
+            <a:lvl1pPr>
+              <a:defRPr sz="2000"/>
+            </a:lvl1pPr>
+          </a:lstStyle>
+          <a:p>
+            <a:r>
+              <a:rPr lang="fr-FR" dirty="0">
+                <a:latin typeface="Times New Roman" panose="02020603050405020304" pitchFamily="18" charset="0"/>
+                <a:cs typeface="Times New Roman" panose="02020603050405020304" pitchFamily="18" charset="0"/>
+              </a:rPr>
+              <a:t>L’objectif est d’utiliser les connaissances apprises sur </a:t>
+            </a:r>
+            <a:r>
+              <a:rPr lang="fr-FR">
+                <a:latin typeface="Times New Roman" panose="02020603050405020304" pitchFamily="18" charset="0"/>
+                <a:cs typeface="Times New Roman" panose="02020603050405020304" pitchFamily="18" charset="0"/>
+              </a:rPr>
+              <a:t>les tuples </a:t>
+            </a:r>
+            <a:r>
+              <a:rPr lang="fr-FR" dirty="0">
+                <a:latin typeface="Times New Roman" panose="02020603050405020304" pitchFamily="18" charset="0"/>
+                <a:cs typeface="Times New Roman" panose="02020603050405020304" pitchFamily="18" charset="0"/>
+              </a:rPr>
+              <a:t>pour écrire un programme Python qui permettra de déchiffrer/chiffrer un message fourni par un utilisateur avec une clé donnée.</a:t>
+            </a:r>
+          </a:p>
+          <a:p>
+            <a:r>
+              <a:rPr lang="fr-FR" dirty="0">
+                <a:latin typeface="Times New Roman" panose="02020603050405020304" pitchFamily="18" charset="0"/>
+                <a:cs typeface="Times New Roman" panose="02020603050405020304" pitchFamily="18" charset="0"/>
+              </a:rPr>
+              <a:t>Le programme doit pouvoir chiffrer et déchiffrer des messages contenant des lettres majuscules et minuscules ainsi que des nombres.</a:t>
+            </a:r>
+          </a:p>
+        </p:txBody>
+      </p:sp>
+      <p:sp>
+        <p:nvSpPr>
+          <p:cNvPr id="8" name="ZoneTexte 7">
+            <a:extLst>
+              <a:ext uri="{FF2B5EF4-FFF2-40B4-BE49-F238E27FC236}">
+                <a16:creationId xmlns:a16="http://schemas.microsoft.com/office/drawing/2014/main" id="{BEECF3A8-73CE-9EC0-B923-08D73787138E}"/>
+              </a:ext>
+            </a:extLst>
+          </p:cNvPr>
+          <p:cNvSpPr txBox="1"/>
+          <p:nvPr/>
+        </p:nvSpPr>
+        <p:spPr>
+          <a:xfrm>
+            <a:off x="397564" y="3139670"/>
+            <a:ext cx="11088982" cy="400110"/>
+          </a:xfrm>
+          <a:prstGeom prst="rect">
+            <a:avLst/>
+          </a:prstGeom>
+          <a:noFill/>
+        </p:spPr>
+        <p:txBody>
+          <a:bodyPr wrap="square" rtlCol="0">
+            <a:spAutoFit/>
+          </a:bodyPr>
+          <a:lstStyle>
+            <a:defPPr>
+              <a:defRPr lang="en-US"/>
+            </a:defPPr>
+            <a:lvl1pPr>
+              <a:defRPr sz="2000"/>
+            </a:lvl1pPr>
+          </a:lstStyle>
+          <a:p>
+            <a:r>
+              <a:rPr lang="fr-FR" dirty="0">
+                <a:latin typeface="Times New Roman" panose="02020603050405020304" pitchFamily="18" charset="0"/>
+                <a:cs typeface="Times New Roman" panose="02020603050405020304" pitchFamily="18" charset="0"/>
+              </a:rPr>
+              <a:t>Ecrire le fichier Algorithme et ensuite le programme en Python.</a:t>
+            </a:r>
+          </a:p>
+        </p:txBody>
+      </p:sp>
+      <p:sp>
+        <p:nvSpPr>
+          <p:cNvPr id="10" name="ZoneTexte 9">
+            <a:extLst>
+              <a:ext uri="{FF2B5EF4-FFF2-40B4-BE49-F238E27FC236}">
+                <a16:creationId xmlns:a16="http://schemas.microsoft.com/office/drawing/2014/main" id="{24D98DAF-178C-EE92-6768-D47D152A08B6}"/>
+              </a:ext>
+            </a:extLst>
+          </p:cNvPr>
+          <p:cNvSpPr txBox="1"/>
+          <p:nvPr/>
+        </p:nvSpPr>
+        <p:spPr>
+          <a:xfrm>
+            <a:off x="455862" y="2121289"/>
+            <a:ext cx="11088982" cy="1015663"/>
+          </a:xfrm>
+          <a:prstGeom prst="rect">
+            <a:avLst/>
+          </a:prstGeom>
+          <a:noFill/>
+        </p:spPr>
+        <p:txBody>
+          <a:bodyPr wrap="square" rtlCol="0">
+            <a:spAutoFit/>
+          </a:bodyPr>
+          <a:lstStyle>
+            <a:defPPr>
+              <a:defRPr lang="en-US"/>
+            </a:defPPr>
+            <a:lvl1pPr>
+              <a:defRPr sz="2000"/>
+            </a:lvl1pPr>
+          </a:lstStyle>
+          <a:p>
+            <a:r>
+              <a:rPr lang="fr-FR" dirty="0">
+                <a:latin typeface="Times New Roman" panose="02020603050405020304" pitchFamily="18" charset="0"/>
+                <a:cs typeface="Times New Roman" panose="02020603050405020304" pitchFamily="18" charset="0"/>
+              </a:rPr>
+              <a:t>Lorsque le programme démarre, l’utilisateur doit choisir quel type d’opération il veut réaliser (chiffrement ou déchiffrement). Ensuite il doit saisir le texte qu’il veut chiffrer et la clé.</a:t>
+            </a:r>
+          </a:p>
+          <a:p>
+            <a:r>
+              <a:rPr lang="fr-FR" dirty="0">
+                <a:latin typeface="Times New Roman" panose="02020603050405020304" pitchFamily="18" charset="0"/>
+                <a:cs typeface="Times New Roman" panose="02020603050405020304" pitchFamily="18" charset="0"/>
+              </a:rPr>
+              <a:t>Le programme doit afficher le résultat de l’opération.</a:t>
+            </a:r>
+          </a:p>
+        </p:txBody>
+      </p:sp>
+      <p:sp>
+        <p:nvSpPr>
+          <p:cNvPr id="12" name="ZoneTexte 11">
+            <a:extLst>
+              <a:ext uri="{FF2B5EF4-FFF2-40B4-BE49-F238E27FC236}">
+                <a16:creationId xmlns:a16="http://schemas.microsoft.com/office/drawing/2014/main" id="{19CB152B-9880-A07F-BB5E-1B89D0E262F0}"/>
+              </a:ext>
+            </a:extLst>
+          </p:cNvPr>
+          <p:cNvSpPr txBox="1"/>
+          <p:nvPr/>
+        </p:nvSpPr>
+        <p:spPr>
+          <a:xfrm>
+            <a:off x="419649" y="3560027"/>
+            <a:ext cx="11088982" cy="400110"/>
+          </a:xfrm>
+          <a:prstGeom prst="rect">
+            <a:avLst/>
+          </a:prstGeom>
+          <a:noFill/>
+        </p:spPr>
+        <p:txBody>
+          <a:bodyPr wrap="square" rtlCol="0">
+            <a:spAutoFit/>
+          </a:bodyPr>
+          <a:lstStyle>
+            <a:defPPr>
+              <a:defRPr lang="en-US"/>
+            </a:defPPr>
+            <a:lvl1pPr>
+              <a:defRPr sz="2000"/>
+            </a:lvl1pPr>
+          </a:lstStyle>
+          <a:p>
+            <a:r>
+              <a:rPr lang="fr-FR" dirty="0">
+                <a:latin typeface="Times New Roman" panose="02020603050405020304" pitchFamily="18" charset="0"/>
+                <a:cs typeface="Times New Roman" panose="02020603050405020304" pitchFamily="18" charset="0"/>
+              </a:rPr>
+              <a:t>Ci-dessous un exemple d’exécution (votre version peut être différente):</a:t>
+            </a:r>
+          </a:p>
+        </p:txBody>
+      </p:sp>
+      <p:pic>
+        <p:nvPicPr>
+          <p:cNvPr id="9" name="Image 8">
+            <a:extLst>
+              <a:ext uri="{FF2B5EF4-FFF2-40B4-BE49-F238E27FC236}">
+                <a16:creationId xmlns:a16="http://schemas.microsoft.com/office/drawing/2014/main" id="{62D8BB4F-61C9-490C-9332-A67E847D5FBE}"/>
+              </a:ext>
+            </a:extLst>
+          </p:cNvPr>
+          <p:cNvPicPr>
+            <a:picLocks noChangeAspect="1"/>
+          </p:cNvPicPr>
+          <p:nvPr/>
+        </p:nvPicPr>
+        <p:blipFill>
+          <a:blip r:embed="rId2"/>
+          <a:stretch>
+            <a:fillRect/>
+          </a:stretch>
+        </p:blipFill>
+        <p:spPr>
+          <a:xfrm>
+            <a:off x="892912" y="3996188"/>
+            <a:ext cx="3967287" cy="2202696"/>
+          </a:xfrm>
+          <a:prstGeom prst="rect">
+            <a:avLst/>
+          </a:prstGeom>
+        </p:spPr>
+      </p:pic>
+      <p:pic>
+        <p:nvPicPr>
+          <p:cNvPr id="13" name="Image 12">
+            <a:extLst>
+              <a:ext uri="{FF2B5EF4-FFF2-40B4-BE49-F238E27FC236}">
+                <a16:creationId xmlns:a16="http://schemas.microsoft.com/office/drawing/2014/main" id="{8A9117C4-0426-C41D-6428-ABEFEA93CDA3}"/>
+              </a:ext>
+            </a:extLst>
+          </p:cNvPr>
+          <p:cNvPicPr>
+            <a:picLocks noChangeAspect="1"/>
+          </p:cNvPicPr>
+          <p:nvPr/>
+        </p:nvPicPr>
+        <p:blipFill>
+          <a:blip r:embed="rId3"/>
+          <a:stretch>
+            <a:fillRect/>
+          </a:stretch>
+        </p:blipFill>
+        <p:spPr>
+          <a:xfrm>
+            <a:off x="5333461" y="3943120"/>
+            <a:ext cx="3883182" cy="2291815"/>
+          </a:xfrm>
+          <a:prstGeom prst="rect">
+            <a:avLst/>
+          </a:prstGeom>
+        </p:spPr>
+      </p:pic>
+    </p:spTree>
+    <p:extLst>
+      <p:ext uri="{BB962C8B-B14F-4D97-AF65-F5344CB8AC3E}">
+        <p14:creationId xmlns:p14="http://schemas.microsoft.com/office/powerpoint/2010/main" val="864656457"/>
+      </p:ext>
+    </p:extLst>
+  </p:cSld>
+  <p:clrMapOvr>
+    <a:masterClrMapping/>
+  </p:clrMapOvr>
+</p:sld>
+</file>
+
+<file path=ppt/slides/slide24.xml><?xml version="1.0" encoding="utf-8"?>
 <p:sld xmlns:a="http://schemas.openxmlformats.org/drawingml/2006/main" xmlns:r="http://schemas.openxmlformats.org/officeDocument/2006/relationships" xmlns:p="http://schemas.openxmlformats.org/presentationml/2006/main">
   <p:cSld>
     <p:spTree>

</xml_diff>